<commit_message>
Documentation: Updated title figure.
</commit_message>
<xml_diff>
--- a/documentation/figures/title.pptx
+++ b/documentation/figures/title.pptx
@@ -4893,8 +4893,8 @@
         </p:nvSpPr>
         <p:spPr bwMode="auto">
           <a:xfrm>
-            <a:off x="5608290" y="2546003"/>
-            <a:ext cx="848221" cy="767705"/>
+            <a:off x="5651873" y="2534319"/>
+            <a:ext cx="771029" cy="770400"/>
           </a:xfrm>
           <a:prstGeom prst="ellipse">
             <a:avLst/>
@@ -23667,1581 +23667,6 @@
           </a:p>
         </p:txBody>
       </p:sp>
-      <p:grpSp>
-        <p:nvGrpSpPr>
-          <p:cNvPr id="5" name="Group 4"/>
-          <p:cNvGrpSpPr/>
-          <p:nvPr/>
-        </p:nvGrpSpPr>
-        <p:grpSpPr>
-          <a:xfrm>
-            <a:off x="5730874" y="2622550"/>
-            <a:ext cx="640929" cy="637183"/>
-            <a:chOff x="-1613901" y="7718905"/>
-            <a:chExt cx="1169997" cy="1169135"/>
-          </a:xfrm>
-        </p:grpSpPr>
-        <p:sp>
-          <p:nvSpPr>
-            <p:cNvPr id="338" name="Rounded Rectangle 337"/>
-            <p:cNvSpPr/>
-            <p:nvPr/>
-          </p:nvSpPr>
-          <p:spPr bwMode="auto">
-            <a:xfrm>
-              <a:off x="-1330168" y="7721176"/>
-              <a:ext cx="71903" cy="606129"/>
-            </a:xfrm>
-            <a:prstGeom prst="roundRect">
-              <a:avLst/>
-            </a:prstGeom>
-            <a:solidFill>
-              <a:srgbClr val="FFFFFF"/>
-            </a:solidFill>
-            <a:ln w="9525" cap="flat" cmpd="sng" algn="ctr">
-              <a:solidFill>
-                <a:srgbClr val="000000"/>
-              </a:solidFill>
-              <a:prstDash val="solid"/>
-              <a:round/>
-              <a:headEnd type="none" w="med" len="med"/>
-              <a:tailEnd type="none" w="med" len="med"/>
-            </a:ln>
-            <a:effectLst/>
-          </p:spPr>
-          <p:txBody>
-            <a:bodyPr vert="horz" wrap="square" lIns="91440" tIns="45720" rIns="91440" bIns="45720" numCol="1" rtlCol="0" anchor="t" anchorCtr="0" compatLnSpc="1">
-              <a:prstTxWarp prst="textNoShape">
-                <a:avLst/>
-              </a:prstTxWarp>
-            </a:bodyPr>
-            <a:lstStyle/>
-            <a:p>
-              <a:pPr marL="0" marR="0" indent="0" algn="l" defTabSz="914400" rtl="0" eaLnBrk="1" fontAlgn="base" latinLnBrk="0" hangingPunct="1">
-                <a:lnSpc>
-                  <a:spcPct val="100000"/>
-                </a:lnSpc>
-                <a:spcBef>
-                  <a:spcPct val="0"/>
-                </a:spcBef>
-                <a:spcAft>
-                  <a:spcPct val="0"/>
-                </a:spcAft>
-                <a:buClrTx/>
-                <a:buSzTx/>
-                <a:buFontTx/>
-                <a:buNone/>
-                <a:tabLst/>
-              </a:pPr>
-              <a:endParaRPr kumimoji="0" lang="en-GB" sz="1000" b="1" i="0" u="none" strike="noStrike" cap="none" normalizeH="0" baseline="0" smtClean="0">
-                <a:ln>
-                  <a:noFill/>
-                </a:ln>
-                <a:solidFill>
-                  <a:schemeClr val="bg2"/>
-                </a:solidFill>
-                <a:effectLst/>
-                <a:latin typeface="Microsoft Sans Serif" pitchFamily="34" charset="0"/>
-              </a:endParaRPr>
-            </a:p>
-          </p:txBody>
-        </p:sp>
-        <p:sp>
-          <p:nvSpPr>
-            <p:cNvPr id="448" name="Rounded Rectangle 447"/>
-            <p:cNvSpPr/>
-            <p:nvPr/>
-          </p:nvSpPr>
-          <p:spPr bwMode="auto">
-            <a:xfrm rot="16200000">
-              <a:off x="-1333751" y="7707041"/>
-              <a:ext cx="69697" cy="625314"/>
-            </a:xfrm>
-            <a:prstGeom prst="roundRect">
-              <a:avLst/>
-            </a:prstGeom>
-            <a:solidFill>
-              <a:srgbClr val="FFFFFF"/>
-            </a:solidFill>
-            <a:ln w="9525" cap="flat" cmpd="sng" algn="ctr">
-              <a:solidFill>
-                <a:srgbClr val="000000"/>
-              </a:solidFill>
-              <a:prstDash val="solid"/>
-              <a:round/>
-              <a:headEnd type="none" w="med" len="med"/>
-              <a:tailEnd type="none" w="med" len="med"/>
-            </a:ln>
-            <a:effectLst/>
-          </p:spPr>
-          <p:txBody>
-            <a:bodyPr vert="horz" wrap="square" lIns="91440" tIns="45720" rIns="91440" bIns="45720" numCol="1" rtlCol="0" anchor="t" anchorCtr="0" compatLnSpc="1">
-              <a:prstTxWarp prst="textNoShape">
-                <a:avLst/>
-              </a:prstTxWarp>
-            </a:bodyPr>
-            <a:lstStyle/>
-            <a:p>
-              <a:pPr marL="0" marR="0" indent="0" algn="l" defTabSz="914400" rtl="0" eaLnBrk="1" fontAlgn="base" latinLnBrk="0" hangingPunct="1">
-                <a:lnSpc>
-                  <a:spcPct val="100000"/>
-                </a:lnSpc>
-                <a:spcBef>
-                  <a:spcPct val="0"/>
-                </a:spcBef>
-                <a:spcAft>
-                  <a:spcPct val="0"/>
-                </a:spcAft>
-                <a:buClrTx/>
-                <a:buSzTx/>
-                <a:buFontTx/>
-                <a:buNone/>
-                <a:tabLst/>
-              </a:pPr>
-              <a:endParaRPr kumimoji="0" lang="en-GB" sz="1000" b="1" i="0" u="none" strike="noStrike" cap="none" normalizeH="0" baseline="0" smtClean="0">
-                <a:ln>
-                  <a:noFill/>
-                </a:ln>
-                <a:solidFill>
-                  <a:schemeClr val="bg2"/>
-                </a:solidFill>
-                <a:effectLst/>
-                <a:latin typeface="Microsoft Sans Serif" pitchFamily="34" charset="0"/>
-              </a:endParaRPr>
-            </a:p>
-          </p:txBody>
-        </p:sp>
-        <p:sp>
-          <p:nvSpPr>
-            <p:cNvPr id="449" name="Rounded Rectangle 448"/>
-            <p:cNvSpPr/>
-            <p:nvPr/>
-          </p:nvSpPr>
-          <p:spPr bwMode="auto">
-            <a:xfrm rot="18000000">
-              <a:off x="-1331408" y="7707649"/>
-              <a:ext cx="69697" cy="625314"/>
-            </a:xfrm>
-            <a:prstGeom prst="roundRect">
-              <a:avLst/>
-            </a:prstGeom>
-            <a:solidFill>
-              <a:srgbClr val="FFFFFF"/>
-            </a:solidFill>
-            <a:ln w="9525" cap="flat" cmpd="sng" algn="ctr">
-              <a:solidFill>
-                <a:srgbClr val="000000"/>
-              </a:solidFill>
-              <a:prstDash val="solid"/>
-              <a:round/>
-              <a:headEnd type="none" w="med" len="med"/>
-              <a:tailEnd type="none" w="med" len="med"/>
-            </a:ln>
-            <a:effectLst/>
-          </p:spPr>
-          <p:txBody>
-            <a:bodyPr vert="horz" wrap="square" lIns="91440" tIns="45720" rIns="91440" bIns="45720" numCol="1" rtlCol="0" anchor="t" anchorCtr="0" compatLnSpc="1">
-              <a:prstTxWarp prst="textNoShape">
-                <a:avLst/>
-              </a:prstTxWarp>
-            </a:bodyPr>
-            <a:lstStyle/>
-            <a:p>
-              <a:pPr marL="0" marR="0" indent="0" algn="l" defTabSz="914400" rtl="0" eaLnBrk="1" fontAlgn="base" latinLnBrk="0" hangingPunct="1">
-                <a:lnSpc>
-                  <a:spcPct val="100000"/>
-                </a:lnSpc>
-                <a:spcBef>
-                  <a:spcPct val="0"/>
-                </a:spcBef>
-                <a:spcAft>
-                  <a:spcPct val="0"/>
-                </a:spcAft>
-                <a:buClrTx/>
-                <a:buSzTx/>
-                <a:buFontTx/>
-                <a:buNone/>
-                <a:tabLst/>
-              </a:pPr>
-              <a:endParaRPr kumimoji="0" lang="en-GB" sz="1000" b="1" i="0" u="none" strike="noStrike" cap="none" normalizeH="0" baseline="0" smtClean="0">
-                <a:ln>
-                  <a:noFill/>
-                </a:ln>
-                <a:solidFill>
-                  <a:schemeClr val="bg2"/>
-                </a:solidFill>
-                <a:effectLst/>
-                <a:latin typeface="Microsoft Sans Serif" pitchFamily="34" charset="0"/>
-              </a:endParaRPr>
-            </a:p>
-          </p:txBody>
-        </p:sp>
-        <p:sp>
-          <p:nvSpPr>
-            <p:cNvPr id="450" name="Rounded Rectangle 449"/>
-            <p:cNvSpPr/>
-            <p:nvPr/>
-          </p:nvSpPr>
-          <p:spPr bwMode="auto">
-            <a:xfrm rot="19800000">
-              <a:off x="-1330795" y="7718905"/>
-              <a:ext cx="71903" cy="606129"/>
-            </a:xfrm>
-            <a:prstGeom prst="roundRect">
-              <a:avLst/>
-            </a:prstGeom>
-            <a:solidFill>
-              <a:srgbClr val="FFFFFF"/>
-            </a:solidFill>
-            <a:ln w="9525" cap="flat" cmpd="sng" algn="ctr">
-              <a:solidFill>
-                <a:srgbClr val="000000"/>
-              </a:solidFill>
-              <a:prstDash val="solid"/>
-              <a:round/>
-              <a:headEnd type="none" w="med" len="med"/>
-              <a:tailEnd type="none" w="med" len="med"/>
-            </a:ln>
-            <a:effectLst/>
-          </p:spPr>
-          <p:txBody>
-            <a:bodyPr vert="horz" wrap="square" lIns="91440" tIns="45720" rIns="91440" bIns="45720" numCol="1" rtlCol="0" anchor="t" anchorCtr="0" compatLnSpc="1">
-              <a:prstTxWarp prst="textNoShape">
-                <a:avLst/>
-              </a:prstTxWarp>
-            </a:bodyPr>
-            <a:lstStyle/>
-            <a:p>
-              <a:pPr marL="0" marR="0" indent="0" algn="l" defTabSz="914400" rtl="0" eaLnBrk="1" fontAlgn="base" latinLnBrk="0" hangingPunct="1">
-                <a:lnSpc>
-                  <a:spcPct val="100000"/>
-                </a:lnSpc>
-                <a:spcBef>
-                  <a:spcPct val="0"/>
-                </a:spcBef>
-                <a:spcAft>
-                  <a:spcPct val="0"/>
-                </a:spcAft>
-                <a:buClrTx/>
-                <a:buSzTx/>
-                <a:buFontTx/>
-                <a:buNone/>
-                <a:tabLst/>
-              </a:pPr>
-              <a:endParaRPr kumimoji="0" lang="en-GB" sz="1000" b="1" i="0" u="none" strike="noStrike" cap="none" normalizeH="0" baseline="0" smtClean="0">
-                <a:ln>
-                  <a:noFill/>
-                </a:ln>
-                <a:solidFill>
-                  <a:schemeClr val="bg2"/>
-                </a:solidFill>
-                <a:effectLst/>
-                <a:latin typeface="Microsoft Sans Serif" pitchFamily="34" charset="0"/>
-              </a:endParaRPr>
-            </a:p>
-          </p:txBody>
-        </p:sp>
-        <p:sp>
-          <p:nvSpPr>
-            <p:cNvPr id="451" name="Rounded Rectangle 450"/>
-            <p:cNvSpPr/>
-            <p:nvPr/>
-          </p:nvSpPr>
-          <p:spPr bwMode="auto">
-            <a:xfrm rot="14400000">
-              <a:off x="-1336093" y="7707649"/>
-              <a:ext cx="69697" cy="625314"/>
-            </a:xfrm>
-            <a:prstGeom prst="roundRect">
-              <a:avLst/>
-            </a:prstGeom>
-            <a:solidFill>
-              <a:srgbClr val="FFFFFF"/>
-            </a:solidFill>
-            <a:ln w="9525" cap="flat" cmpd="sng" algn="ctr">
-              <a:solidFill>
-                <a:srgbClr val="000000"/>
-              </a:solidFill>
-              <a:prstDash val="solid"/>
-              <a:round/>
-              <a:headEnd type="none" w="med" len="med"/>
-              <a:tailEnd type="none" w="med" len="med"/>
-            </a:ln>
-            <a:effectLst/>
-          </p:spPr>
-          <p:txBody>
-            <a:bodyPr vert="horz" wrap="square" lIns="91440" tIns="45720" rIns="91440" bIns="45720" numCol="1" rtlCol="0" anchor="t" anchorCtr="0" compatLnSpc="1">
-              <a:prstTxWarp prst="textNoShape">
-                <a:avLst/>
-              </a:prstTxWarp>
-            </a:bodyPr>
-            <a:lstStyle/>
-            <a:p>
-              <a:pPr marL="0" marR="0" indent="0" algn="l" defTabSz="914400" rtl="0" eaLnBrk="1" fontAlgn="base" latinLnBrk="0" hangingPunct="1">
-                <a:lnSpc>
-                  <a:spcPct val="100000"/>
-                </a:lnSpc>
-                <a:spcBef>
-                  <a:spcPct val="0"/>
-                </a:spcBef>
-                <a:spcAft>
-                  <a:spcPct val="0"/>
-                </a:spcAft>
-                <a:buClrTx/>
-                <a:buSzTx/>
-                <a:buFontTx/>
-                <a:buNone/>
-                <a:tabLst/>
-              </a:pPr>
-              <a:endParaRPr kumimoji="0" lang="en-GB" sz="1000" b="1" i="0" u="none" strike="noStrike" cap="none" normalizeH="0" baseline="0" smtClean="0">
-                <a:ln>
-                  <a:noFill/>
-                </a:ln>
-                <a:solidFill>
-                  <a:schemeClr val="bg2"/>
-                </a:solidFill>
-                <a:effectLst/>
-                <a:latin typeface="Microsoft Sans Serif" pitchFamily="34" charset="0"/>
-              </a:endParaRPr>
-            </a:p>
-          </p:txBody>
-        </p:sp>
-        <p:sp>
-          <p:nvSpPr>
-            <p:cNvPr id="453" name="Rounded Rectangle 452"/>
-            <p:cNvSpPr/>
-            <p:nvPr/>
-          </p:nvSpPr>
-          <p:spPr bwMode="auto">
-            <a:xfrm rot="12600000">
-              <a:off x="-1338912" y="7718905"/>
-              <a:ext cx="71903" cy="606129"/>
-            </a:xfrm>
-            <a:prstGeom prst="roundRect">
-              <a:avLst/>
-            </a:prstGeom>
-            <a:solidFill>
-              <a:srgbClr val="FFFFFF"/>
-            </a:solidFill>
-            <a:ln w="9525" cap="flat" cmpd="sng" algn="ctr">
-              <a:solidFill>
-                <a:srgbClr val="000000"/>
-              </a:solidFill>
-              <a:prstDash val="solid"/>
-              <a:round/>
-              <a:headEnd type="none" w="med" len="med"/>
-              <a:tailEnd type="none" w="med" len="med"/>
-            </a:ln>
-            <a:effectLst/>
-          </p:spPr>
-          <p:txBody>
-            <a:bodyPr vert="horz" wrap="square" lIns="91440" tIns="45720" rIns="91440" bIns="45720" numCol="1" rtlCol="0" anchor="t" anchorCtr="0" compatLnSpc="1">
-              <a:prstTxWarp prst="textNoShape">
-                <a:avLst/>
-              </a:prstTxWarp>
-            </a:bodyPr>
-            <a:lstStyle/>
-            <a:p>
-              <a:pPr marL="0" marR="0" indent="0" algn="l" defTabSz="914400" rtl="0" eaLnBrk="1" fontAlgn="base" latinLnBrk="0" hangingPunct="1">
-                <a:lnSpc>
-                  <a:spcPct val="100000"/>
-                </a:lnSpc>
-                <a:spcBef>
-                  <a:spcPct val="0"/>
-                </a:spcBef>
-                <a:spcAft>
-                  <a:spcPct val="0"/>
-                </a:spcAft>
-                <a:buClrTx/>
-                <a:buSzTx/>
-                <a:buFontTx/>
-                <a:buNone/>
-                <a:tabLst/>
-              </a:pPr>
-              <a:endParaRPr kumimoji="0" lang="en-GB" sz="1000" b="1" i="0" u="none" strike="noStrike" cap="none" normalizeH="0" baseline="0" smtClean="0">
-                <a:ln>
-                  <a:noFill/>
-                </a:ln>
-                <a:solidFill>
-                  <a:schemeClr val="bg2"/>
-                </a:solidFill>
-                <a:effectLst/>
-                <a:latin typeface="Microsoft Sans Serif" pitchFamily="34" charset="0"/>
-              </a:endParaRPr>
-            </a:p>
-          </p:txBody>
-        </p:sp>
-        <p:sp>
-          <p:nvSpPr>
-            <p:cNvPr id="458" name="Rounded Rectangle 457"/>
-            <p:cNvSpPr/>
-            <p:nvPr/>
-          </p:nvSpPr>
-          <p:spPr bwMode="auto">
-            <a:xfrm>
-              <a:off x="-790170" y="7931396"/>
-              <a:ext cx="71903" cy="606129"/>
-            </a:xfrm>
-            <a:prstGeom prst="roundRect">
-              <a:avLst/>
-            </a:prstGeom>
-            <a:solidFill>
-              <a:schemeClr val="bg1"/>
-            </a:solidFill>
-            <a:ln w="9525" cap="flat" cmpd="sng" algn="ctr">
-              <a:solidFill>
-                <a:schemeClr val="tx1"/>
-              </a:solidFill>
-              <a:prstDash val="solid"/>
-              <a:round/>
-              <a:headEnd type="none" w="med" len="med"/>
-              <a:tailEnd type="none" w="med" len="med"/>
-            </a:ln>
-            <a:effectLst/>
-          </p:spPr>
-          <p:txBody>
-            <a:bodyPr vert="horz" wrap="square" lIns="91440" tIns="45720" rIns="91440" bIns="45720" numCol="1" rtlCol="0" anchor="t" anchorCtr="0" compatLnSpc="1">
-              <a:prstTxWarp prst="textNoShape">
-                <a:avLst/>
-              </a:prstTxWarp>
-            </a:bodyPr>
-            <a:lstStyle/>
-            <a:p>
-              <a:pPr marL="0" marR="0" indent="0" algn="l" defTabSz="914400" rtl="0" eaLnBrk="1" fontAlgn="base" latinLnBrk="0" hangingPunct="1">
-                <a:lnSpc>
-                  <a:spcPct val="100000"/>
-                </a:lnSpc>
-                <a:spcBef>
-                  <a:spcPct val="0"/>
-                </a:spcBef>
-                <a:spcAft>
-                  <a:spcPct val="0"/>
-                </a:spcAft>
-                <a:buClrTx/>
-                <a:buSzTx/>
-                <a:buFontTx/>
-                <a:buNone/>
-                <a:tabLst/>
-              </a:pPr>
-              <a:endParaRPr kumimoji="0" lang="en-GB" sz="1000" b="1" i="0" u="none" strike="noStrike" cap="none" normalizeH="0" baseline="0" smtClean="0">
-                <a:ln>
-                  <a:noFill/>
-                </a:ln>
-                <a:solidFill>
-                  <a:schemeClr val="bg2"/>
-                </a:solidFill>
-                <a:effectLst/>
-                <a:latin typeface="Microsoft Sans Serif" pitchFamily="34" charset="0"/>
-              </a:endParaRPr>
-            </a:p>
-          </p:txBody>
-        </p:sp>
-        <p:sp>
-          <p:nvSpPr>
-            <p:cNvPr id="459" name="Rounded Rectangle 458"/>
-            <p:cNvSpPr/>
-            <p:nvPr/>
-          </p:nvSpPr>
-          <p:spPr bwMode="auto">
-            <a:xfrm rot="16200000">
-              <a:off x="-793753" y="7917261"/>
-              <a:ext cx="69697" cy="625314"/>
-            </a:xfrm>
-            <a:prstGeom prst="roundRect">
-              <a:avLst/>
-            </a:prstGeom>
-            <a:solidFill>
-              <a:schemeClr val="bg1"/>
-            </a:solidFill>
-            <a:ln w="9525" cap="flat" cmpd="sng" algn="ctr">
-              <a:solidFill>
-                <a:schemeClr val="tx1"/>
-              </a:solidFill>
-              <a:prstDash val="solid"/>
-              <a:round/>
-              <a:headEnd type="none" w="med" len="med"/>
-              <a:tailEnd type="none" w="med" len="med"/>
-            </a:ln>
-            <a:effectLst/>
-          </p:spPr>
-          <p:txBody>
-            <a:bodyPr vert="horz" wrap="square" lIns="91440" tIns="45720" rIns="91440" bIns="45720" numCol="1" rtlCol="0" anchor="t" anchorCtr="0" compatLnSpc="1">
-              <a:prstTxWarp prst="textNoShape">
-                <a:avLst/>
-              </a:prstTxWarp>
-            </a:bodyPr>
-            <a:lstStyle/>
-            <a:p>
-              <a:pPr marL="0" marR="0" indent="0" algn="l" defTabSz="914400" rtl="0" eaLnBrk="1" fontAlgn="base" latinLnBrk="0" hangingPunct="1">
-                <a:lnSpc>
-                  <a:spcPct val="100000"/>
-                </a:lnSpc>
-                <a:spcBef>
-                  <a:spcPct val="0"/>
-                </a:spcBef>
-                <a:spcAft>
-                  <a:spcPct val="0"/>
-                </a:spcAft>
-                <a:buClrTx/>
-                <a:buSzTx/>
-                <a:buFontTx/>
-                <a:buNone/>
-                <a:tabLst/>
-              </a:pPr>
-              <a:endParaRPr kumimoji="0" lang="en-GB" sz="1000" b="1" i="0" u="none" strike="noStrike" cap="none" normalizeH="0" baseline="0" smtClean="0">
-                <a:ln>
-                  <a:noFill/>
-                </a:ln>
-                <a:solidFill>
-                  <a:schemeClr val="bg2"/>
-                </a:solidFill>
-                <a:effectLst/>
-                <a:latin typeface="Microsoft Sans Serif" pitchFamily="34" charset="0"/>
-              </a:endParaRPr>
-            </a:p>
-          </p:txBody>
-        </p:sp>
-        <p:sp>
-          <p:nvSpPr>
-            <p:cNvPr id="460" name="Rounded Rectangle 459"/>
-            <p:cNvSpPr/>
-            <p:nvPr/>
-          </p:nvSpPr>
-          <p:spPr bwMode="auto">
-            <a:xfrm rot="18000000">
-              <a:off x="-791410" y="7917869"/>
-              <a:ext cx="69697" cy="625314"/>
-            </a:xfrm>
-            <a:prstGeom prst="roundRect">
-              <a:avLst/>
-            </a:prstGeom>
-            <a:solidFill>
-              <a:schemeClr val="bg1"/>
-            </a:solidFill>
-            <a:ln w="9525" cap="flat" cmpd="sng" algn="ctr">
-              <a:solidFill>
-                <a:schemeClr val="tx1"/>
-              </a:solidFill>
-              <a:prstDash val="solid"/>
-              <a:round/>
-              <a:headEnd type="none" w="med" len="med"/>
-              <a:tailEnd type="none" w="med" len="med"/>
-            </a:ln>
-            <a:effectLst/>
-          </p:spPr>
-          <p:txBody>
-            <a:bodyPr vert="horz" wrap="square" lIns="91440" tIns="45720" rIns="91440" bIns="45720" numCol="1" rtlCol="0" anchor="t" anchorCtr="0" compatLnSpc="1">
-              <a:prstTxWarp prst="textNoShape">
-                <a:avLst/>
-              </a:prstTxWarp>
-            </a:bodyPr>
-            <a:lstStyle/>
-            <a:p>
-              <a:pPr marL="0" marR="0" indent="0" algn="l" defTabSz="914400" rtl="0" eaLnBrk="1" fontAlgn="base" latinLnBrk="0" hangingPunct="1">
-                <a:lnSpc>
-                  <a:spcPct val="100000"/>
-                </a:lnSpc>
-                <a:spcBef>
-                  <a:spcPct val="0"/>
-                </a:spcBef>
-                <a:spcAft>
-                  <a:spcPct val="0"/>
-                </a:spcAft>
-                <a:buClrTx/>
-                <a:buSzTx/>
-                <a:buFontTx/>
-                <a:buNone/>
-                <a:tabLst/>
-              </a:pPr>
-              <a:endParaRPr kumimoji="0" lang="en-GB" sz="1000" b="1" i="0" u="none" strike="noStrike" cap="none" normalizeH="0" baseline="0" smtClean="0">
-                <a:ln>
-                  <a:noFill/>
-                </a:ln>
-                <a:solidFill>
-                  <a:schemeClr val="bg2"/>
-                </a:solidFill>
-                <a:effectLst/>
-                <a:latin typeface="Microsoft Sans Serif" pitchFamily="34" charset="0"/>
-              </a:endParaRPr>
-            </a:p>
-          </p:txBody>
-        </p:sp>
-        <p:sp>
-          <p:nvSpPr>
-            <p:cNvPr id="461" name="Rounded Rectangle 460"/>
-            <p:cNvSpPr/>
-            <p:nvPr/>
-          </p:nvSpPr>
-          <p:spPr bwMode="auto">
-            <a:xfrm rot="19800000">
-              <a:off x="-790797" y="7929125"/>
-              <a:ext cx="71903" cy="606129"/>
-            </a:xfrm>
-            <a:prstGeom prst="roundRect">
-              <a:avLst/>
-            </a:prstGeom>
-            <a:solidFill>
-              <a:schemeClr val="bg1"/>
-            </a:solidFill>
-            <a:ln w="9525" cap="flat" cmpd="sng" algn="ctr">
-              <a:solidFill>
-                <a:schemeClr val="tx1"/>
-              </a:solidFill>
-              <a:prstDash val="solid"/>
-              <a:round/>
-              <a:headEnd type="none" w="med" len="med"/>
-              <a:tailEnd type="none" w="med" len="med"/>
-            </a:ln>
-            <a:effectLst/>
-          </p:spPr>
-          <p:txBody>
-            <a:bodyPr vert="horz" wrap="square" lIns="91440" tIns="45720" rIns="91440" bIns="45720" numCol="1" rtlCol="0" anchor="t" anchorCtr="0" compatLnSpc="1">
-              <a:prstTxWarp prst="textNoShape">
-                <a:avLst/>
-              </a:prstTxWarp>
-            </a:bodyPr>
-            <a:lstStyle/>
-            <a:p>
-              <a:pPr marL="0" marR="0" indent="0" algn="l" defTabSz="914400" rtl="0" eaLnBrk="1" fontAlgn="base" latinLnBrk="0" hangingPunct="1">
-                <a:lnSpc>
-                  <a:spcPct val="100000"/>
-                </a:lnSpc>
-                <a:spcBef>
-                  <a:spcPct val="0"/>
-                </a:spcBef>
-                <a:spcAft>
-                  <a:spcPct val="0"/>
-                </a:spcAft>
-                <a:buClrTx/>
-                <a:buSzTx/>
-                <a:buFontTx/>
-                <a:buNone/>
-                <a:tabLst/>
-              </a:pPr>
-              <a:endParaRPr kumimoji="0" lang="en-GB" sz="1000" b="1" i="0" u="none" strike="noStrike" cap="none" normalizeH="0" baseline="0" smtClean="0">
-                <a:ln>
-                  <a:noFill/>
-                </a:ln>
-                <a:solidFill>
-                  <a:schemeClr val="bg2"/>
-                </a:solidFill>
-                <a:effectLst/>
-                <a:latin typeface="Microsoft Sans Serif" pitchFamily="34" charset="0"/>
-              </a:endParaRPr>
-            </a:p>
-          </p:txBody>
-        </p:sp>
-        <p:sp>
-          <p:nvSpPr>
-            <p:cNvPr id="462" name="Rounded Rectangle 461"/>
-            <p:cNvSpPr/>
-            <p:nvPr/>
-          </p:nvSpPr>
-          <p:spPr bwMode="auto">
-            <a:xfrm rot="14400000">
-              <a:off x="-796095" y="7917869"/>
-              <a:ext cx="69697" cy="625314"/>
-            </a:xfrm>
-            <a:prstGeom prst="roundRect">
-              <a:avLst/>
-            </a:prstGeom>
-            <a:solidFill>
-              <a:schemeClr val="bg1"/>
-            </a:solidFill>
-            <a:ln w="9525" cap="flat" cmpd="sng" algn="ctr">
-              <a:solidFill>
-                <a:schemeClr val="tx1"/>
-              </a:solidFill>
-              <a:prstDash val="solid"/>
-              <a:round/>
-              <a:headEnd type="none" w="med" len="med"/>
-              <a:tailEnd type="none" w="med" len="med"/>
-            </a:ln>
-            <a:effectLst/>
-          </p:spPr>
-          <p:txBody>
-            <a:bodyPr vert="horz" wrap="square" lIns="91440" tIns="45720" rIns="91440" bIns="45720" numCol="1" rtlCol="0" anchor="t" anchorCtr="0" compatLnSpc="1">
-              <a:prstTxWarp prst="textNoShape">
-                <a:avLst/>
-              </a:prstTxWarp>
-            </a:bodyPr>
-            <a:lstStyle/>
-            <a:p>
-              <a:pPr marL="0" marR="0" indent="0" algn="l" defTabSz="914400" rtl="0" eaLnBrk="1" fontAlgn="base" latinLnBrk="0" hangingPunct="1">
-                <a:lnSpc>
-                  <a:spcPct val="100000"/>
-                </a:lnSpc>
-                <a:spcBef>
-                  <a:spcPct val="0"/>
-                </a:spcBef>
-                <a:spcAft>
-                  <a:spcPct val="0"/>
-                </a:spcAft>
-                <a:buClrTx/>
-                <a:buSzTx/>
-                <a:buFontTx/>
-                <a:buNone/>
-                <a:tabLst/>
-              </a:pPr>
-              <a:endParaRPr kumimoji="0" lang="en-GB" sz="1000" b="1" i="0" u="none" strike="noStrike" cap="none" normalizeH="0" baseline="0" smtClean="0">
-                <a:ln>
-                  <a:noFill/>
-                </a:ln>
-                <a:solidFill>
-                  <a:schemeClr val="bg2"/>
-                </a:solidFill>
-                <a:effectLst/>
-                <a:latin typeface="Microsoft Sans Serif" pitchFamily="34" charset="0"/>
-              </a:endParaRPr>
-            </a:p>
-          </p:txBody>
-        </p:sp>
-        <p:sp>
-          <p:nvSpPr>
-            <p:cNvPr id="463" name="Rounded Rectangle 462"/>
-            <p:cNvSpPr/>
-            <p:nvPr/>
-          </p:nvSpPr>
-          <p:spPr bwMode="auto">
-            <a:xfrm rot="12600000">
-              <a:off x="-798914" y="7929125"/>
-              <a:ext cx="71903" cy="606129"/>
-            </a:xfrm>
-            <a:prstGeom prst="roundRect">
-              <a:avLst/>
-            </a:prstGeom>
-            <a:solidFill>
-              <a:schemeClr val="bg1"/>
-            </a:solidFill>
-            <a:ln w="9525" cap="flat" cmpd="sng" algn="ctr">
-              <a:solidFill>
-                <a:schemeClr val="tx1"/>
-              </a:solidFill>
-              <a:prstDash val="solid"/>
-              <a:round/>
-              <a:headEnd type="none" w="med" len="med"/>
-              <a:tailEnd type="none" w="med" len="med"/>
-            </a:ln>
-            <a:effectLst/>
-          </p:spPr>
-          <p:txBody>
-            <a:bodyPr vert="horz" wrap="square" lIns="91440" tIns="45720" rIns="91440" bIns="45720" numCol="1" rtlCol="0" anchor="t" anchorCtr="0" compatLnSpc="1">
-              <a:prstTxWarp prst="textNoShape">
-                <a:avLst/>
-              </a:prstTxWarp>
-            </a:bodyPr>
-            <a:lstStyle/>
-            <a:p>
-              <a:pPr marL="0" marR="0" indent="0" algn="l" defTabSz="914400" rtl="0" eaLnBrk="1" fontAlgn="base" latinLnBrk="0" hangingPunct="1">
-                <a:lnSpc>
-                  <a:spcPct val="100000"/>
-                </a:lnSpc>
-                <a:spcBef>
-                  <a:spcPct val="0"/>
-                </a:spcBef>
-                <a:spcAft>
-                  <a:spcPct val="0"/>
-                </a:spcAft>
-                <a:buClrTx/>
-                <a:buSzTx/>
-                <a:buFontTx/>
-                <a:buNone/>
-                <a:tabLst/>
-              </a:pPr>
-              <a:endParaRPr kumimoji="0" lang="en-GB" sz="1000" b="1" i="0" u="none" strike="noStrike" cap="none" normalizeH="0" baseline="0" smtClean="0">
-                <a:ln>
-                  <a:noFill/>
-                </a:ln>
-                <a:solidFill>
-                  <a:schemeClr val="bg2"/>
-                </a:solidFill>
-                <a:effectLst/>
-                <a:latin typeface="Microsoft Sans Serif" pitchFamily="34" charset="0"/>
-              </a:endParaRPr>
-            </a:p>
-          </p:txBody>
-        </p:sp>
-        <p:sp>
-          <p:nvSpPr>
-            <p:cNvPr id="464" name="Oval 463"/>
-            <p:cNvSpPr/>
-            <p:nvPr/>
-          </p:nvSpPr>
-          <p:spPr bwMode="auto">
-            <a:xfrm>
-              <a:off x="-1017808" y="7978645"/>
-              <a:ext cx="524635" cy="508247"/>
-            </a:xfrm>
-            <a:prstGeom prst="ellipse">
-              <a:avLst/>
-            </a:prstGeom>
-            <a:solidFill>
-              <a:schemeClr val="bg1"/>
-            </a:solidFill>
-            <a:ln w="9525" cap="flat" cmpd="sng" algn="ctr">
-              <a:solidFill>
-                <a:schemeClr val="tx1"/>
-              </a:solidFill>
-              <a:prstDash val="solid"/>
-              <a:round/>
-              <a:headEnd type="none" w="med" len="med"/>
-              <a:tailEnd type="none" w="med" len="med"/>
-            </a:ln>
-            <a:effectLst/>
-          </p:spPr>
-          <p:txBody>
-            <a:bodyPr vert="horz" wrap="square" lIns="91440" tIns="45720" rIns="91440" bIns="45720" numCol="1" rtlCol="0" anchor="t" anchorCtr="0" compatLnSpc="1">
-              <a:prstTxWarp prst="textNoShape">
-                <a:avLst/>
-              </a:prstTxWarp>
-            </a:bodyPr>
-            <a:lstStyle/>
-            <a:p>
-              <a:pPr marL="0" marR="0" indent="0" algn="l" defTabSz="914400" rtl="0" eaLnBrk="1" fontAlgn="base" latinLnBrk="0" hangingPunct="1">
-                <a:lnSpc>
-                  <a:spcPct val="100000"/>
-                </a:lnSpc>
-                <a:spcBef>
-                  <a:spcPct val="0"/>
-                </a:spcBef>
-                <a:spcAft>
-                  <a:spcPct val="0"/>
-                </a:spcAft>
-                <a:buClrTx/>
-                <a:buSzTx/>
-                <a:buFontTx/>
-                <a:buNone/>
-                <a:tabLst/>
-              </a:pPr>
-              <a:endParaRPr kumimoji="0" lang="en-GB" sz="1000" b="1" i="0" u="none" strike="noStrike" cap="none" normalizeH="0" baseline="0" smtClean="0">
-                <a:ln>
-                  <a:noFill/>
-                </a:ln>
-                <a:solidFill>
-                  <a:schemeClr val="bg2"/>
-                </a:solidFill>
-                <a:effectLst/>
-                <a:latin typeface="Microsoft Sans Serif" pitchFamily="34" charset="0"/>
-              </a:endParaRPr>
-            </a:p>
-          </p:txBody>
-        </p:sp>
-        <p:sp>
-          <p:nvSpPr>
-            <p:cNvPr id="465" name="Oval 464"/>
-            <p:cNvSpPr/>
-            <p:nvPr/>
-          </p:nvSpPr>
-          <p:spPr bwMode="auto">
-            <a:xfrm>
-              <a:off x="-941921" y="8052622"/>
-              <a:ext cx="375147" cy="363637"/>
-            </a:xfrm>
-            <a:prstGeom prst="ellipse">
-              <a:avLst/>
-            </a:prstGeom>
-            <a:solidFill>
-              <a:srgbClr val="660066"/>
-            </a:solidFill>
-            <a:ln w="9525" cap="flat" cmpd="sng" algn="ctr">
-              <a:solidFill>
-                <a:srgbClr val="000000"/>
-              </a:solidFill>
-              <a:prstDash val="solid"/>
-              <a:round/>
-              <a:headEnd type="none" w="med" len="med"/>
-              <a:tailEnd type="none" w="med" len="med"/>
-            </a:ln>
-            <a:effectLst/>
-          </p:spPr>
-          <p:txBody>
-            <a:bodyPr vert="horz" wrap="square" lIns="91440" tIns="45720" rIns="91440" bIns="45720" numCol="1" rtlCol="0" anchor="t" anchorCtr="0" compatLnSpc="1">
-              <a:prstTxWarp prst="textNoShape">
-                <a:avLst/>
-              </a:prstTxWarp>
-            </a:bodyPr>
-            <a:lstStyle/>
-            <a:p>
-              <a:pPr marL="0" marR="0" indent="0" algn="l" defTabSz="914400" rtl="0" eaLnBrk="1" fontAlgn="base" latinLnBrk="0" hangingPunct="1">
-                <a:lnSpc>
-                  <a:spcPct val="100000"/>
-                </a:lnSpc>
-                <a:spcBef>
-                  <a:spcPct val="0"/>
-                </a:spcBef>
-                <a:spcAft>
-                  <a:spcPct val="0"/>
-                </a:spcAft>
-                <a:buClrTx/>
-                <a:buSzTx/>
-                <a:buFontTx/>
-                <a:buNone/>
-                <a:tabLst/>
-              </a:pPr>
-              <a:endParaRPr kumimoji="0" lang="en-GB" sz="1000" b="1" i="0" u="none" strike="noStrike" cap="none" normalizeH="0" baseline="0" smtClean="0">
-                <a:ln>
-                  <a:noFill/>
-                </a:ln>
-                <a:solidFill>
-                  <a:schemeClr val="bg2"/>
-                </a:solidFill>
-                <a:effectLst/>
-                <a:latin typeface="Microsoft Sans Serif" pitchFamily="34" charset="0"/>
-              </a:endParaRPr>
-            </a:p>
-          </p:txBody>
-        </p:sp>
-        <p:sp>
-          <p:nvSpPr>
-            <p:cNvPr id="467" name="Rounded Rectangle 466"/>
-            <p:cNvSpPr/>
-            <p:nvPr/>
-          </p:nvSpPr>
-          <p:spPr bwMode="auto">
-            <a:xfrm>
-              <a:off x="-1245460" y="8281911"/>
-              <a:ext cx="71903" cy="606129"/>
-            </a:xfrm>
-            <a:prstGeom prst="roundRect">
-              <a:avLst/>
-            </a:prstGeom>
-            <a:solidFill>
-              <a:srgbClr val="FFFFFF"/>
-            </a:solidFill>
-            <a:ln w="9525" cap="flat" cmpd="sng" algn="ctr">
-              <a:solidFill>
-                <a:srgbClr val="000000"/>
-              </a:solidFill>
-              <a:prstDash val="solid"/>
-              <a:round/>
-              <a:headEnd type="none" w="med" len="med"/>
-              <a:tailEnd type="none" w="med" len="med"/>
-            </a:ln>
-            <a:effectLst/>
-          </p:spPr>
-          <p:txBody>
-            <a:bodyPr vert="horz" wrap="square" lIns="91440" tIns="45720" rIns="91440" bIns="45720" numCol="1" rtlCol="0" anchor="t" anchorCtr="0" compatLnSpc="1">
-              <a:prstTxWarp prst="textNoShape">
-                <a:avLst/>
-              </a:prstTxWarp>
-            </a:bodyPr>
-            <a:lstStyle/>
-            <a:p>
-              <a:pPr marL="0" marR="0" indent="0" algn="l" defTabSz="914400" rtl="0" eaLnBrk="1" fontAlgn="base" latinLnBrk="0" hangingPunct="1">
-                <a:lnSpc>
-                  <a:spcPct val="100000"/>
-                </a:lnSpc>
-                <a:spcBef>
-                  <a:spcPct val="0"/>
-                </a:spcBef>
-                <a:spcAft>
-                  <a:spcPct val="0"/>
-                </a:spcAft>
-                <a:buClrTx/>
-                <a:buSzTx/>
-                <a:buFontTx/>
-                <a:buNone/>
-                <a:tabLst/>
-              </a:pPr>
-              <a:endParaRPr kumimoji="0" lang="en-GB" sz="1000" b="1" i="0" u="none" strike="noStrike" cap="none" normalizeH="0" baseline="0" smtClean="0">
-                <a:ln>
-                  <a:noFill/>
-                </a:ln>
-                <a:solidFill>
-                  <a:schemeClr val="bg2"/>
-                </a:solidFill>
-                <a:effectLst/>
-                <a:latin typeface="Microsoft Sans Serif" pitchFamily="34" charset="0"/>
-              </a:endParaRPr>
-            </a:p>
-          </p:txBody>
-        </p:sp>
-        <p:sp>
-          <p:nvSpPr>
-            <p:cNvPr id="468" name="Rounded Rectangle 467"/>
-            <p:cNvSpPr/>
-            <p:nvPr/>
-          </p:nvSpPr>
-          <p:spPr bwMode="auto">
-            <a:xfrm rot="16200000">
-              <a:off x="-1249043" y="8267776"/>
-              <a:ext cx="69697" cy="625314"/>
-            </a:xfrm>
-            <a:prstGeom prst="roundRect">
-              <a:avLst/>
-            </a:prstGeom>
-            <a:solidFill>
-              <a:srgbClr val="FFFFFF"/>
-            </a:solidFill>
-            <a:ln w="9525" cap="flat" cmpd="sng" algn="ctr">
-              <a:solidFill>
-                <a:srgbClr val="000000"/>
-              </a:solidFill>
-              <a:prstDash val="solid"/>
-              <a:round/>
-              <a:headEnd type="none" w="med" len="med"/>
-              <a:tailEnd type="none" w="med" len="med"/>
-            </a:ln>
-            <a:effectLst/>
-          </p:spPr>
-          <p:txBody>
-            <a:bodyPr vert="horz" wrap="square" lIns="91440" tIns="45720" rIns="91440" bIns="45720" numCol="1" rtlCol="0" anchor="t" anchorCtr="0" compatLnSpc="1">
-              <a:prstTxWarp prst="textNoShape">
-                <a:avLst/>
-              </a:prstTxWarp>
-            </a:bodyPr>
-            <a:lstStyle/>
-            <a:p>
-              <a:pPr marL="0" marR="0" indent="0" algn="l" defTabSz="914400" rtl="0" eaLnBrk="1" fontAlgn="base" latinLnBrk="0" hangingPunct="1">
-                <a:lnSpc>
-                  <a:spcPct val="100000"/>
-                </a:lnSpc>
-                <a:spcBef>
-                  <a:spcPct val="0"/>
-                </a:spcBef>
-                <a:spcAft>
-                  <a:spcPct val="0"/>
-                </a:spcAft>
-                <a:buClrTx/>
-                <a:buSzTx/>
-                <a:buFontTx/>
-                <a:buNone/>
-                <a:tabLst/>
-              </a:pPr>
-              <a:endParaRPr kumimoji="0" lang="en-GB" sz="1000" b="1" i="0" u="none" strike="noStrike" cap="none" normalizeH="0" baseline="0" smtClean="0">
-                <a:ln>
-                  <a:noFill/>
-                </a:ln>
-                <a:solidFill>
-                  <a:schemeClr val="bg2"/>
-                </a:solidFill>
-                <a:effectLst/>
-                <a:latin typeface="Microsoft Sans Serif" pitchFamily="34" charset="0"/>
-              </a:endParaRPr>
-            </a:p>
-          </p:txBody>
-        </p:sp>
-        <p:sp>
-          <p:nvSpPr>
-            <p:cNvPr id="469" name="Rounded Rectangle 468"/>
-            <p:cNvSpPr/>
-            <p:nvPr/>
-          </p:nvSpPr>
-          <p:spPr bwMode="auto">
-            <a:xfrm rot="18000000">
-              <a:off x="-1246700" y="8268384"/>
-              <a:ext cx="69697" cy="625314"/>
-            </a:xfrm>
-            <a:prstGeom prst="roundRect">
-              <a:avLst/>
-            </a:prstGeom>
-            <a:solidFill>
-              <a:srgbClr val="FFFFFF"/>
-            </a:solidFill>
-            <a:ln w="9525" cap="flat" cmpd="sng" algn="ctr">
-              <a:solidFill>
-                <a:srgbClr val="000000"/>
-              </a:solidFill>
-              <a:prstDash val="solid"/>
-              <a:round/>
-              <a:headEnd type="none" w="med" len="med"/>
-              <a:tailEnd type="none" w="med" len="med"/>
-            </a:ln>
-            <a:effectLst/>
-          </p:spPr>
-          <p:txBody>
-            <a:bodyPr vert="horz" wrap="square" lIns="91440" tIns="45720" rIns="91440" bIns="45720" numCol="1" rtlCol="0" anchor="t" anchorCtr="0" compatLnSpc="1">
-              <a:prstTxWarp prst="textNoShape">
-                <a:avLst/>
-              </a:prstTxWarp>
-            </a:bodyPr>
-            <a:lstStyle/>
-            <a:p>
-              <a:pPr marL="0" marR="0" indent="0" algn="l" defTabSz="914400" rtl="0" eaLnBrk="1" fontAlgn="base" latinLnBrk="0" hangingPunct="1">
-                <a:lnSpc>
-                  <a:spcPct val="100000"/>
-                </a:lnSpc>
-                <a:spcBef>
-                  <a:spcPct val="0"/>
-                </a:spcBef>
-                <a:spcAft>
-                  <a:spcPct val="0"/>
-                </a:spcAft>
-                <a:buClrTx/>
-                <a:buSzTx/>
-                <a:buFontTx/>
-                <a:buNone/>
-                <a:tabLst/>
-              </a:pPr>
-              <a:endParaRPr kumimoji="0" lang="en-GB" sz="1000" b="1" i="0" u="none" strike="noStrike" cap="none" normalizeH="0" baseline="0" smtClean="0">
-                <a:ln>
-                  <a:noFill/>
-                </a:ln>
-                <a:solidFill>
-                  <a:schemeClr val="bg2"/>
-                </a:solidFill>
-                <a:effectLst/>
-                <a:latin typeface="Microsoft Sans Serif" pitchFamily="34" charset="0"/>
-              </a:endParaRPr>
-            </a:p>
-          </p:txBody>
-        </p:sp>
-        <p:sp>
-          <p:nvSpPr>
-            <p:cNvPr id="470" name="Rounded Rectangle 469"/>
-            <p:cNvSpPr/>
-            <p:nvPr/>
-          </p:nvSpPr>
-          <p:spPr bwMode="auto">
-            <a:xfrm rot="19800000">
-              <a:off x="-1246087" y="8279640"/>
-              <a:ext cx="71903" cy="606129"/>
-            </a:xfrm>
-            <a:prstGeom prst="roundRect">
-              <a:avLst/>
-            </a:prstGeom>
-            <a:solidFill>
-              <a:srgbClr val="FFFFFF"/>
-            </a:solidFill>
-            <a:ln w="9525" cap="flat" cmpd="sng" algn="ctr">
-              <a:solidFill>
-                <a:srgbClr val="000000"/>
-              </a:solidFill>
-              <a:prstDash val="solid"/>
-              <a:round/>
-              <a:headEnd type="none" w="med" len="med"/>
-              <a:tailEnd type="none" w="med" len="med"/>
-            </a:ln>
-            <a:effectLst/>
-          </p:spPr>
-          <p:txBody>
-            <a:bodyPr vert="horz" wrap="square" lIns="91440" tIns="45720" rIns="91440" bIns="45720" numCol="1" rtlCol="0" anchor="t" anchorCtr="0" compatLnSpc="1">
-              <a:prstTxWarp prst="textNoShape">
-                <a:avLst/>
-              </a:prstTxWarp>
-            </a:bodyPr>
-            <a:lstStyle/>
-            <a:p>
-              <a:pPr marL="0" marR="0" indent="0" algn="l" defTabSz="914400" rtl="0" eaLnBrk="1" fontAlgn="base" latinLnBrk="0" hangingPunct="1">
-                <a:lnSpc>
-                  <a:spcPct val="100000"/>
-                </a:lnSpc>
-                <a:spcBef>
-                  <a:spcPct val="0"/>
-                </a:spcBef>
-                <a:spcAft>
-                  <a:spcPct val="0"/>
-                </a:spcAft>
-                <a:buClrTx/>
-                <a:buSzTx/>
-                <a:buFontTx/>
-                <a:buNone/>
-                <a:tabLst/>
-              </a:pPr>
-              <a:endParaRPr kumimoji="0" lang="en-GB" sz="1000" b="1" i="0" u="none" strike="noStrike" cap="none" normalizeH="0" baseline="0" smtClean="0">
-                <a:ln>
-                  <a:noFill/>
-                </a:ln>
-                <a:solidFill>
-                  <a:schemeClr val="bg2"/>
-                </a:solidFill>
-                <a:effectLst/>
-                <a:latin typeface="Microsoft Sans Serif" pitchFamily="34" charset="0"/>
-              </a:endParaRPr>
-            </a:p>
-          </p:txBody>
-        </p:sp>
-        <p:sp>
-          <p:nvSpPr>
-            <p:cNvPr id="471" name="Rounded Rectangle 470"/>
-            <p:cNvSpPr/>
-            <p:nvPr/>
-          </p:nvSpPr>
-          <p:spPr bwMode="auto">
-            <a:xfrm rot="14400000">
-              <a:off x="-1251385" y="8268384"/>
-              <a:ext cx="69697" cy="625314"/>
-            </a:xfrm>
-            <a:prstGeom prst="roundRect">
-              <a:avLst/>
-            </a:prstGeom>
-            <a:solidFill>
-              <a:srgbClr val="FFFFFF"/>
-            </a:solidFill>
-            <a:ln w="9525" cap="flat" cmpd="sng" algn="ctr">
-              <a:solidFill>
-                <a:srgbClr val="000000"/>
-              </a:solidFill>
-              <a:prstDash val="solid"/>
-              <a:round/>
-              <a:headEnd type="none" w="med" len="med"/>
-              <a:tailEnd type="none" w="med" len="med"/>
-            </a:ln>
-            <a:effectLst/>
-          </p:spPr>
-          <p:txBody>
-            <a:bodyPr vert="horz" wrap="square" lIns="91440" tIns="45720" rIns="91440" bIns="45720" numCol="1" rtlCol="0" anchor="t" anchorCtr="0" compatLnSpc="1">
-              <a:prstTxWarp prst="textNoShape">
-                <a:avLst/>
-              </a:prstTxWarp>
-            </a:bodyPr>
-            <a:lstStyle/>
-            <a:p>
-              <a:pPr marL="0" marR="0" indent="0" algn="l" defTabSz="914400" rtl="0" eaLnBrk="1" fontAlgn="base" latinLnBrk="0" hangingPunct="1">
-                <a:lnSpc>
-                  <a:spcPct val="100000"/>
-                </a:lnSpc>
-                <a:spcBef>
-                  <a:spcPct val="0"/>
-                </a:spcBef>
-                <a:spcAft>
-                  <a:spcPct val="0"/>
-                </a:spcAft>
-                <a:buClrTx/>
-                <a:buSzTx/>
-                <a:buFontTx/>
-                <a:buNone/>
-                <a:tabLst/>
-              </a:pPr>
-              <a:endParaRPr kumimoji="0" lang="en-GB" sz="1000" b="1" i="0" u="none" strike="noStrike" cap="none" normalizeH="0" baseline="0" smtClean="0">
-                <a:ln>
-                  <a:noFill/>
-                </a:ln>
-                <a:solidFill>
-                  <a:schemeClr val="bg2"/>
-                </a:solidFill>
-                <a:effectLst/>
-                <a:latin typeface="Microsoft Sans Serif" pitchFamily="34" charset="0"/>
-              </a:endParaRPr>
-            </a:p>
-          </p:txBody>
-        </p:sp>
-        <p:sp>
-          <p:nvSpPr>
-            <p:cNvPr id="472" name="Rounded Rectangle 471"/>
-            <p:cNvSpPr/>
-            <p:nvPr/>
-          </p:nvSpPr>
-          <p:spPr bwMode="auto">
-            <a:xfrm rot="12600000">
-              <a:off x="-1254204" y="8279640"/>
-              <a:ext cx="71903" cy="606129"/>
-            </a:xfrm>
-            <a:prstGeom prst="roundRect">
-              <a:avLst/>
-            </a:prstGeom>
-            <a:solidFill>
-              <a:srgbClr val="FFFFFF"/>
-            </a:solidFill>
-            <a:ln w="9525" cap="flat" cmpd="sng" algn="ctr">
-              <a:solidFill>
-                <a:srgbClr val="000000"/>
-              </a:solidFill>
-              <a:prstDash val="solid"/>
-              <a:round/>
-              <a:headEnd type="none" w="med" len="med"/>
-              <a:tailEnd type="none" w="med" len="med"/>
-            </a:ln>
-            <a:effectLst/>
-          </p:spPr>
-          <p:txBody>
-            <a:bodyPr vert="horz" wrap="square" lIns="91440" tIns="45720" rIns="91440" bIns="45720" numCol="1" rtlCol="0" anchor="t" anchorCtr="0" compatLnSpc="1">
-              <a:prstTxWarp prst="textNoShape">
-                <a:avLst/>
-              </a:prstTxWarp>
-            </a:bodyPr>
-            <a:lstStyle/>
-            <a:p>
-              <a:pPr marL="0" marR="0" indent="0" algn="l" defTabSz="914400" rtl="0" eaLnBrk="1" fontAlgn="base" latinLnBrk="0" hangingPunct="1">
-                <a:lnSpc>
-                  <a:spcPct val="100000"/>
-                </a:lnSpc>
-                <a:spcBef>
-                  <a:spcPct val="0"/>
-                </a:spcBef>
-                <a:spcAft>
-                  <a:spcPct val="0"/>
-                </a:spcAft>
-                <a:buClrTx/>
-                <a:buSzTx/>
-                <a:buFontTx/>
-                <a:buNone/>
-                <a:tabLst/>
-              </a:pPr>
-              <a:endParaRPr kumimoji="0" lang="en-GB" sz="1000" b="1" i="0" u="none" strike="noStrike" cap="none" normalizeH="0" baseline="0" smtClean="0">
-                <a:ln>
-                  <a:noFill/>
-                </a:ln>
-                <a:solidFill>
-                  <a:schemeClr val="bg2"/>
-                </a:solidFill>
-                <a:effectLst/>
-                <a:latin typeface="Microsoft Sans Serif" pitchFamily="34" charset="0"/>
-              </a:endParaRPr>
-            </a:p>
-          </p:txBody>
-        </p:sp>
-        <p:sp>
-          <p:nvSpPr>
-            <p:cNvPr id="504" name="Oval 503"/>
-            <p:cNvSpPr/>
-            <p:nvPr/>
-          </p:nvSpPr>
-          <p:spPr bwMode="auto">
-            <a:xfrm>
-              <a:off x="-1555774" y="7761312"/>
-              <a:ext cx="524635" cy="508247"/>
-            </a:xfrm>
-            <a:prstGeom prst="ellipse">
-              <a:avLst/>
-            </a:prstGeom>
-            <a:solidFill>
-              <a:srgbClr val="FFFFFF"/>
-            </a:solidFill>
-            <a:ln w="9525" cap="flat" cmpd="sng" algn="ctr">
-              <a:solidFill>
-                <a:srgbClr val="000000"/>
-              </a:solidFill>
-              <a:prstDash val="solid"/>
-              <a:round/>
-              <a:headEnd type="none" w="med" len="med"/>
-              <a:tailEnd type="none" w="med" len="med"/>
-            </a:ln>
-            <a:effectLst/>
-          </p:spPr>
-          <p:txBody>
-            <a:bodyPr vert="horz" wrap="square" lIns="91440" tIns="45720" rIns="91440" bIns="45720" numCol="1" rtlCol="0" anchor="t" anchorCtr="0" compatLnSpc="1">
-              <a:prstTxWarp prst="textNoShape">
-                <a:avLst/>
-              </a:prstTxWarp>
-            </a:bodyPr>
-            <a:lstStyle/>
-            <a:p>
-              <a:pPr marL="0" marR="0" indent="0" algn="l" defTabSz="914400" rtl="0" eaLnBrk="1" fontAlgn="base" latinLnBrk="0" hangingPunct="1">
-                <a:lnSpc>
-                  <a:spcPct val="100000"/>
-                </a:lnSpc>
-                <a:spcBef>
-                  <a:spcPct val="0"/>
-                </a:spcBef>
-                <a:spcAft>
-                  <a:spcPct val="0"/>
-                </a:spcAft>
-                <a:buClrTx/>
-                <a:buSzTx/>
-                <a:buFontTx/>
-                <a:buNone/>
-                <a:tabLst/>
-              </a:pPr>
-              <a:endParaRPr kumimoji="0" lang="en-GB" sz="1000" b="1" i="0" u="none" strike="noStrike" cap="none" normalizeH="0" baseline="0" smtClean="0">
-                <a:ln>
-                  <a:noFill/>
-                </a:ln>
-                <a:solidFill>
-                  <a:schemeClr val="bg2"/>
-                </a:solidFill>
-                <a:effectLst/>
-                <a:latin typeface="Microsoft Sans Serif" pitchFamily="34" charset="0"/>
-              </a:endParaRPr>
-            </a:p>
-          </p:txBody>
-        </p:sp>
-        <p:sp>
-          <p:nvSpPr>
-            <p:cNvPr id="473" name="Oval 472"/>
-            <p:cNvSpPr/>
-            <p:nvPr/>
-          </p:nvSpPr>
-          <p:spPr bwMode="auto">
-            <a:xfrm>
-              <a:off x="-1473098" y="8329160"/>
-              <a:ext cx="524635" cy="508247"/>
-            </a:xfrm>
-            <a:prstGeom prst="ellipse">
-              <a:avLst/>
-            </a:prstGeom>
-            <a:solidFill>
-              <a:schemeClr val="bg1"/>
-            </a:solidFill>
-            <a:ln w="9525" cap="flat" cmpd="sng" algn="ctr">
-              <a:solidFill>
-                <a:srgbClr val="000000"/>
-              </a:solidFill>
-              <a:prstDash val="solid"/>
-              <a:round/>
-              <a:headEnd type="none" w="med" len="med"/>
-              <a:tailEnd type="none" w="med" len="med"/>
-            </a:ln>
-            <a:effectLst/>
-          </p:spPr>
-          <p:txBody>
-            <a:bodyPr vert="horz" wrap="square" lIns="91440" tIns="45720" rIns="91440" bIns="45720" numCol="1" rtlCol="0" anchor="t" anchorCtr="0" compatLnSpc="1">
-              <a:prstTxWarp prst="textNoShape">
-                <a:avLst/>
-              </a:prstTxWarp>
-            </a:bodyPr>
-            <a:lstStyle/>
-            <a:p>
-              <a:pPr marL="0" marR="0" indent="0" algn="l" defTabSz="914400" rtl="0" eaLnBrk="1" fontAlgn="base" latinLnBrk="0" hangingPunct="1">
-                <a:lnSpc>
-                  <a:spcPct val="100000"/>
-                </a:lnSpc>
-                <a:spcBef>
-                  <a:spcPct val="0"/>
-                </a:spcBef>
-                <a:spcAft>
-                  <a:spcPct val="0"/>
-                </a:spcAft>
-                <a:buClrTx/>
-                <a:buSzTx/>
-                <a:buFontTx/>
-                <a:buNone/>
-                <a:tabLst/>
-              </a:pPr>
-              <a:endParaRPr kumimoji="0" lang="en-GB" sz="1000" b="1" i="0" u="none" strike="noStrike" cap="none" normalizeH="0" baseline="0" smtClean="0">
-                <a:ln>
-                  <a:noFill/>
-                </a:ln>
-                <a:solidFill>
-                  <a:schemeClr val="bg2"/>
-                </a:solidFill>
-                <a:effectLst/>
-                <a:latin typeface="Microsoft Sans Serif" pitchFamily="34" charset="0"/>
-              </a:endParaRPr>
-            </a:p>
-          </p:txBody>
-        </p:sp>
-        <p:sp>
-          <p:nvSpPr>
-            <p:cNvPr id="474" name="Oval 473"/>
-            <p:cNvSpPr/>
-            <p:nvPr/>
-          </p:nvSpPr>
-          <p:spPr bwMode="auto">
-            <a:xfrm>
-              <a:off x="-1397211" y="8403137"/>
-              <a:ext cx="375147" cy="363637"/>
-            </a:xfrm>
-            <a:prstGeom prst="ellipse">
-              <a:avLst/>
-            </a:prstGeom>
-            <a:solidFill>
-              <a:srgbClr val="0000FF"/>
-            </a:solidFill>
-            <a:ln w="9525" cap="flat" cmpd="sng" algn="ctr">
-              <a:solidFill>
-                <a:srgbClr val="000000"/>
-              </a:solidFill>
-              <a:prstDash val="solid"/>
-              <a:round/>
-              <a:headEnd type="none" w="med" len="med"/>
-              <a:tailEnd type="none" w="med" len="med"/>
-            </a:ln>
-            <a:effectLst/>
-          </p:spPr>
-          <p:txBody>
-            <a:bodyPr vert="horz" wrap="square" lIns="91440" tIns="45720" rIns="91440" bIns="45720" numCol="1" rtlCol="0" anchor="t" anchorCtr="0" compatLnSpc="1">
-              <a:prstTxWarp prst="textNoShape">
-                <a:avLst/>
-              </a:prstTxWarp>
-            </a:bodyPr>
-            <a:lstStyle/>
-            <a:p>
-              <a:pPr marL="0" marR="0" indent="0" algn="l" defTabSz="914400" rtl="0" eaLnBrk="1" fontAlgn="base" latinLnBrk="0" hangingPunct="1">
-                <a:lnSpc>
-                  <a:spcPct val="100000"/>
-                </a:lnSpc>
-                <a:spcBef>
-                  <a:spcPct val="0"/>
-                </a:spcBef>
-                <a:spcAft>
-                  <a:spcPct val="0"/>
-                </a:spcAft>
-                <a:buClrTx/>
-                <a:buSzTx/>
-                <a:buFontTx/>
-                <a:buNone/>
-                <a:tabLst/>
-              </a:pPr>
-              <a:endParaRPr kumimoji="0" lang="en-GB" sz="1000" b="1" i="0" u="none" strike="noStrike" cap="none" normalizeH="0" baseline="0" smtClean="0">
-                <a:ln>
-                  <a:noFill/>
-                </a:ln>
-                <a:solidFill>
-                  <a:schemeClr val="bg2"/>
-                </a:solidFill>
-                <a:effectLst/>
-                <a:latin typeface="Microsoft Sans Serif" pitchFamily="34" charset="0"/>
-              </a:endParaRPr>
-            </a:p>
-          </p:txBody>
-        </p:sp>
-        <p:sp>
-          <p:nvSpPr>
-            <p:cNvPr id="409" name="Oval 408"/>
-            <p:cNvSpPr/>
-            <p:nvPr/>
-          </p:nvSpPr>
-          <p:spPr bwMode="auto">
-            <a:xfrm>
-              <a:off x="-1481919" y="7836052"/>
-              <a:ext cx="375147" cy="363637"/>
-            </a:xfrm>
-            <a:prstGeom prst="ellipse">
-              <a:avLst/>
-            </a:prstGeom>
-            <a:solidFill>
-              <a:srgbClr val="008000"/>
-            </a:solidFill>
-            <a:ln w="9525" cap="flat" cmpd="sng" algn="ctr">
-              <a:solidFill>
-                <a:srgbClr val="000000"/>
-              </a:solidFill>
-              <a:prstDash val="solid"/>
-              <a:round/>
-              <a:headEnd type="none" w="med" len="med"/>
-              <a:tailEnd type="none" w="med" len="med"/>
-            </a:ln>
-            <a:effectLst/>
-          </p:spPr>
-          <p:txBody>
-            <a:bodyPr vert="horz" wrap="square" lIns="91440" tIns="45720" rIns="91440" bIns="45720" numCol="1" rtlCol="0" anchor="t" anchorCtr="0" compatLnSpc="1">
-              <a:prstTxWarp prst="textNoShape">
-                <a:avLst/>
-              </a:prstTxWarp>
-            </a:bodyPr>
-            <a:lstStyle/>
-            <a:p>
-              <a:pPr marL="0" marR="0" indent="0" algn="l" defTabSz="914400" rtl="0" eaLnBrk="1" fontAlgn="base" latinLnBrk="0" hangingPunct="1">
-                <a:lnSpc>
-                  <a:spcPct val="100000"/>
-                </a:lnSpc>
-                <a:spcBef>
-                  <a:spcPct val="0"/>
-                </a:spcBef>
-                <a:spcAft>
-                  <a:spcPct val="0"/>
-                </a:spcAft>
-                <a:buClrTx/>
-                <a:buSzTx/>
-                <a:buFontTx/>
-                <a:buNone/>
-                <a:tabLst/>
-              </a:pPr>
-              <a:endParaRPr kumimoji="0" lang="en-GB" sz="1000" b="1" i="0" u="none" strike="noStrike" cap="none" normalizeH="0" baseline="0" smtClean="0">
-                <a:ln>
-                  <a:noFill/>
-                </a:ln>
-                <a:solidFill>
-                  <a:schemeClr val="bg2"/>
-                </a:solidFill>
-                <a:effectLst/>
-                <a:latin typeface="Microsoft Sans Serif" pitchFamily="34" charset="0"/>
-              </a:endParaRPr>
-            </a:p>
-          </p:txBody>
-        </p:sp>
-      </p:grpSp>
       <p:sp>
         <p:nvSpPr>
           <p:cNvPr id="6" name="Donut 5"/>
@@ -25250,8 +23675,8 @@
         </p:nvSpPr>
         <p:spPr bwMode="auto">
           <a:xfrm>
-            <a:off x="5586065" y="2495203"/>
-            <a:ext cx="864096" cy="864096"/>
+            <a:off x="5623174" y="2504728"/>
+            <a:ext cx="830162" cy="831800"/>
           </a:xfrm>
           <a:prstGeom prst="donut">
             <a:avLst>
@@ -25312,30 +23737,28 @@
       </p:sp>
       <p:sp>
         <p:nvSpPr>
-          <p:cNvPr id="325" name="Plaque 324"/>
+          <p:cNvPr id="427" name="Octagon 426"/>
           <p:cNvSpPr/>
           <p:nvPr/>
         </p:nvSpPr>
         <p:spPr bwMode="auto">
           <a:xfrm>
-            <a:off x="5698331" y="2637061"/>
+            <a:off x="5976988" y="2534319"/>
             <a:ext cx="72008" cy="72008"/>
           </a:xfrm>
-          <a:prstGeom prst="plaque">
+          <a:prstGeom prst="octagon">
             <a:avLst>
-              <a:gd name="adj" fmla="val 45768"/>
+              <a:gd name="adj" fmla="val 30759"/>
             </a:avLst>
           </a:prstGeom>
           <a:solidFill>
-            <a:srgbClr val="B3B3B3"/>
+            <a:schemeClr val="bg2">
+              <a:lumMod val="60000"/>
+              <a:lumOff val="40000"/>
+            </a:schemeClr>
           </a:solidFill>
           <a:ln w="9525" cap="flat" cmpd="sng" algn="ctr">
-            <a:solidFill>
-              <a:schemeClr val="bg2">
-                <a:lumMod val="60000"/>
-                <a:lumOff val="40000"/>
-              </a:schemeClr>
-            </a:solidFill>
+            <a:noFill/>
             <a:prstDash val="solid"/>
             <a:round/>
             <a:headEnd type="none" w="med" len="med"/>
@@ -25382,30 +23805,28 @@
       </p:sp>
       <p:sp>
         <p:nvSpPr>
-          <p:cNvPr id="498" name="Plaque 497"/>
+          <p:cNvPr id="519" name="Octagon 518"/>
           <p:cNvSpPr/>
           <p:nvPr/>
         </p:nvSpPr>
         <p:spPr bwMode="auto">
           <a:xfrm>
-            <a:off x="5815806" y="2552353"/>
+            <a:off x="6059538" y="2537494"/>
             <a:ext cx="72008" cy="72008"/>
           </a:xfrm>
-          <a:prstGeom prst="plaque">
+          <a:prstGeom prst="octagon">
             <a:avLst>
-              <a:gd name="adj" fmla="val 45768"/>
+              <a:gd name="adj" fmla="val 30759"/>
             </a:avLst>
           </a:prstGeom>
           <a:solidFill>
-            <a:srgbClr val="B3B3B3"/>
+            <a:schemeClr val="bg2">
+              <a:lumMod val="60000"/>
+              <a:lumOff val="40000"/>
+            </a:schemeClr>
           </a:solidFill>
           <a:ln w="9525" cap="flat" cmpd="sng" algn="ctr">
-            <a:solidFill>
-              <a:schemeClr val="bg2">
-                <a:lumMod val="60000"/>
-                <a:lumOff val="40000"/>
-              </a:schemeClr>
-            </a:solidFill>
+            <a:noFill/>
             <a:prstDash val="solid"/>
             <a:round/>
             <a:headEnd type="none" w="med" len="med"/>
@@ -25452,30 +23873,28 @@
       </p:sp>
       <p:sp>
         <p:nvSpPr>
-          <p:cNvPr id="499" name="Plaque 498"/>
+          <p:cNvPr id="531" name="Octagon 530"/>
           <p:cNvSpPr/>
           <p:nvPr/>
         </p:nvSpPr>
         <p:spPr bwMode="auto">
           <a:xfrm>
-            <a:off x="5888831" y="2530128"/>
+            <a:off x="6142088" y="2556544"/>
             <a:ext cx="72008" cy="72008"/>
           </a:xfrm>
-          <a:prstGeom prst="plaque">
+          <a:prstGeom prst="octagon">
             <a:avLst>
-              <a:gd name="adj" fmla="val 45768"/>
+              <a:gd name="adj" fmla="val 30759"/>
             </a:avLst>
           </a:prstGeom>
           <a:solidFill>
-            <a:srgbClr val="B3B3B3"/>
+            <a:schemeClr val="bg2">
+              <a:lumMod val="60000"/>
+              <a:lumOff val="40000"/>
+            </a:schemeClr>
           </a:solidFill>
           <a:ln w="9525" cap="flat" cmpd="sng" algn="ctr">
-            <a:solidFill>
-              <a:schemeClr val="bg2">
-                <a:lumMod val="60000"/>
-                <a:lumOff val="40000"/>
-              </a:schemeClr>
-            </a:solidFill>
+            <a:noFill/>
             <a:prstDash val="solid"/>
             <a:round/>
             <a:headEnd type="none" w="med" len="med"/>
@@ -25522,30 +23941,28 @@
       </p:sp>
       <p:sp>
         <p:nvSpPr>
-          <p:cNvPr id="500" name="Plaque 499"/>
+          <p:cNvPr id="532" name="Octagon 531"/>
           <p:cNvSpPr/>
           <p:nvPr/>
         </p:nvSpPr>
         <p:spPr bwMode="auto">
           <a:xfrm>
-            <a:off x="5965031" y="2530128"/>
+            <a:off x="6215113" y="2594644"/>
             <a:ext cx="72008" cy="72008"/>
           </a:xfrm>
-          <a:prstGeom prst="plaque">
+          <a:prstGeom prst="octagon">
             <a:avLst>
-              <a:gd name="adj" fmla="val 45768"/>
+              <a:gd name="adj" fmla="val 30759"/>
             </a:avLst>
           </a:prstGeom>
           <a:solidFill>
-            <a:srgbClr val="B3B3B3"/>
+            <a:schemeClr val="bg2">
+              <a:lumMod val="60000"/>
+              <a:lumOff val="40000"/>
+            </a:schemeClr>
           </a:solidFill>
           <a:ln w="9525" cap="flat" cmpd="sng" algn="ctr">
-            <a:solidFill>
-              <a:schemeClr val="bg2">
-                <a:lumMod val="60000"/>
-                <a:lumOff val="40000"/>
-              </a:schemeClr>
-            </a:solidFill>
+            <a:noFill/>
             <a:prstDash val="solid"/>
             <a:round/>
             <a:headEnd type="none" w="med" len="med"/>
@@ -25592,30 +24009,28 @@
       </p:sp>
       <p:sp>
         <p:nvSpPr>
-          <p:cNvPr id="501" name="Plaque 500"/>
+          <p:cNvPr id="533" name="Octagon 532"/>
           <p:cNvSpPr/>
           <p:nvPr/>
         </p:nvSpPr>
         <p:spPr bwMode="auto">
           <a:xfrm>
-            <a:off x="6025604" y="2529111"/>
+            <a:off x="6278613" y="2648619"/>
             <a:ext cx="72008" cy="72008"/>
           </a:xfrm>
-          <a:prstGeom prst="plaque">
+          <a:prstGeom prst="octagon">
             <a:avLst>
-              <a:gd name="adj" fmla="val 45768"/>
+              <a:gd name="adj" fmla="val 30759"/>
             </a:avLst>
           </a:prstGeom>
           <a:solidFill>
-            <a:srgbClr val="B3B3B3"/>
+            <a:schemeClr val="bg2">
+              <a:lumMod val="60000"/>
+              <a:lumOff val="40000"/>
+            </a:schemeClr>
           </a:solidFill>
           <a:ln w="9525" cap="flat" cmpd="sng" algn="ctr">
-            <a:solidFill>
-              <a:schemeClr val="bg2">
-                <a:lumMod val="60000"/>
-                <a:lumOff val="40000"/>
-              </a:schemeClr>
-            </a:solidFill>
+            <a:noFill/>
             <a:prstDash val="solid"/>
             <a:round/>
             <a:headEnd type="none" w="med" len="med"/>
@@ -25662,30 +24077,28 @@
       </p:sp>
       <p:sp>
         <p:nvSpPr>
-          <p:cNvPr id="502" name="Plaque 501"/>
+          <p:cNvPr id="534" name="Octagon 533"/>
           <p:cNvSpPr/>
           <p:nvPr/>
         </p:nvSpPr>
         <p:spPr bwMode="auto">
           <a:xfrm>
-            <a:off x="6101804" y="2541811"/>
+            <a:off x="6322145" y="2718717"/>
             <a:ext cx="72008" cy="72008"/>
           </a:xfrm>
-          <a:prstGeom prst="plaque">
+          <a:prstGeom prst="octagon">
             <a:avLst>
-              <a:gd name="adj" fmla="val 45768"/>
+              <a:gd name="adj" fmla="val 30759"/>
             </a:avLst>
           </a:prstGeom>
           <a:solidFill>
-            <a:srgbClr val="B3B3B3"/>
+            <a:schemeClr val="bg2">
+              <a:lumMod val="60000"/>
+              <a:lumOff val="40000"/>
+            </a:schemeClr>
           </a:solidFill>
           <a:ln w="9525" cap="flat" cmpd="sng" algn="ctr">
-            <a:solidFill>
-              <a:schemeClr val="bg2">
-                <a:lumMod val="60000"/>
-                <a:lumOff val="40000"/>
-              </a:schemeClr>
-            </a:solidFill>
+            <a:noFill/>
             <a:prstDash val="solid"/>
             <a:round/>
             <a:headEnd type="none" w="med" len="med"/>
@@ -25732,30 +24145,28 @@
       </p:sp>
       <p:sp>
         <p:nvSpPr>
-          <p:cNvPr id="503" name="Plaque 502"/>
+          <p:cNvPr id="536" name="Octagon 535"/>
           <p:cNvSpPr/>
           <p:nvPr/>
         </p:nvSpPr>
         <p:spPr bwMode="auto">
           <a:xfrm>
-            <a:off x="6216104" y="2605311"/>
+            <a:off x="6354019" y="2966367"/>
             <a:ext cx="72008" cy="72008"/>
           </a:xfrm>
-          <a:prstGeom prst="plaque">
+          <a:prstGeom prst="octagon">
             <a:avLst>
-              <a:gd name="adj" fmla="val 45768"/>
+              <a:gd name="adj" fmla="val 30759"/>
             </a:avLst>
           </a:prstGeom>
           <a:solidFill>
-            <a:srgbClr val="B3B3B3"/>
+            <a:schemeClr val="bg2">
+              <a:lumMod val="60000"/>
+              <a:lumOff val="40000"/>
+            </a:schemeClr>
           </a:solidFill>
           <a:ln w="9525" cap="flat" cmpd="sng" algn="ctr">
-            <a:solidFill>
-              <a:schemeClr val="bg2">
-                <a:lumMod val="60000"/>
-                <a:lumOff val="40000"/>
-              </a:schemeClr>
-            </a:solidFill>
+            <a:noFill/>
             <a:prstDash val="solid"/>
             <a:round/>
             <a:headEnd type="none" w="med" len="med"/>
@@ -25802,30 +24213,28 @@
       </p:sp>
       <p:sp>
         <p:nvSpPr>
-          <p:cNvPr id="505" name="Plaque 504"/>
+          <p:cNvPr id="537" name="Octagon 536"/>
           <p:cNvSpPr/>
           <p:nvPr/>
         </p:nvSpPr>
         <p:spPr bwMode="auto">
           <a:xfrm>
-            <a:off x="6266904" y="2649761"/>
+            <a:off x="6362403" y="2878608"/>
             <a:ext cx="72008" cy="72008"/>
           </a:xfrm>
-          <a:prstGeom prst="plaque">
+          <a:prstGeom prst="octagon">
             <a:avLst>
-              <a:gd name="adj" fmla="val 45768"/>
+              <a:gd name="adj" fmla="val 30759"/>
             </a:avLst>
           </a:prstGeom>
           <a:solidFill>
-            <a:srgbClr val="B3B3B3"/>
+            <a:schemeClr val="bg2">
+              <a:lumMod val="60000"/>
+              <a:lumOff val="40000"/>
+            </a:schemeClr>
           </a:solidFill>
           <a:ln w="9525" cap="flat" cmpd="sng" algn="ctr">
-            <a:solidFill>
-              <a:schemeClr val="bg2">
-                <a:lumMod val="60000"/>
-                <a:lumOff val="40000"/>
-              </a:schemeClr>
-            </a:solidFill>
+            <a:noFill/>
             <a:prstDash val="solid"/>
             <a:round/>
             <a:headEnd type="none" w="med" len="med"/>
@@ -25872,30 +24281,28 @@
       </p:sp>
       <p:sp>
         <p:nvSpPr>
-          <p:cNvPr id="506" name="Plaque 505"/>
+          <p:cNvPr id="538" name="Octagon 537"/>
           <p:cNvSpPr/>
           <p:nvPr/>
         </p:nvSpPr>
         <p:spPr bwMode="auto">
           <a:xfrm>
-            <a:off x="6311354" y="2710086"/>
+            <a:off x="6354912" y="2795041"/>
             <a:ext cx="72008" cy="72008"/>
           </a:xfrm>
-          <a:prstGeom prst="plaque">
+          <a:prstGeom prst="octagon">
             <a:avLst>
-              <a:gd name="adj" fmla="val 45768"/>
+              <a:gd name="adj" fmla="val 30759"/>
             </a:avLst>
           </a:prstGeom>
           <a:solidFill>
-            <a:srgbClr val="B3B3B3"/>
+            <a:schemeClr val="bg2">
+              <a:lumMod val="60000"/>
+              <a:lumOff val="40000"/>
+            </a:schemeClr>
           </a:solidFill>
           <a:ln w="9525" cap="flat" cmpd="sng" algn="ctr">
-            <a:solidFill>
-              <a:schemeClr val="bg2">
-                <a:lumMod val="60000"/>
-                <a:lumOff val="40000"/>
-              </a:schemeClr>
-            </a:solidFill>
+            <a:noFill/>
             <a:prstDash val="solid"/>
             <a:round/>
             <a:headEnd type="none" w="med" len="med"/>
@@ -25942,30 +24349,28 @@
       </p:sp>
       <p:sp>
         <p:nvSpPr>
-          <p:cNvPr id="507" name="Plaque 506"/>
+          <p:cNvPr id="539" name="Octagon 538"/>
           <p:cNvSpPr/>
           <p:nvPr/>
         </p:nvSpPr>
         <p:spPr bwMode="auto">
           <a:xfrm>
-            <a:off x="6358979" y="2814861"/>
+            <a:off x="6323286" y="3044849"/>
             <a:ext cx="72008" cy="72008"/>
           </a:xfrm>
-          <a:prstGeom prst="plaque">
+          <a:prstGeom prst="octagon">
             <a:avLst>
-              <a:gd name="adj" fmla="val 45768"/>
+              <a:gd name="adj" fmla="val 30759"/>
             </a:avLst>
           </a:prstGeom>
           <a:solidFill>
-            <a:srgbClr val="B3B3B3"/>
+            <a:schemeClr val="bg2">
+              <a:lumMod val="60000"/>
+              <a:lumOff val="40000"/>
+            </a:schemeClr>
           </a:solidFill>
           <a:ln w="9525" cap="flat" cmpd="sng" algn="ctr">
-            <a:solidFill>
-              <a:schemeClr val="bg2">
-                <a:lumMod val="60000"/>
-                <a:lumOff val="40000"/>
-              </a:schemeClr>
-            </a:solidFill>
+            <a:noFill/>
             <a:prstDash val="solid"/>
             <a:round/>
             <a:headEnd type="none" w="med" len="med"/>
@@ -26012,30 +24417,28 @@
       </p:sp>
       <p:sp>
         <p:nvSpPr>
-          <p:cNvPr id="508" name="Plaque 507"/>
+          <p:cNvPr id="541" name="Octagon 540"/>
           <p:cNvSpPr/>
           <p:nvPr/>
         </p:nvSpPr>
         <p:spPr bwMode="auto">
           <a:xfrm>
-            <a:off x="6362154" y="2913286"/>
+            <a:off x="6215212" y="3169815"/>
             <a:ext cx="72008" cy="72008"/>
           </a:xfrm>
-          <a:prstGeom prst="plaque">
+          <a:prstGeom prst="octagon">
             <a:avLst>
-              <a:gd name="adj" fmla="val 45768"/>
+              <a:gd name="adj" fmla="val 30759"/>
             </a:avLst>
           </a:prstGeom>
           <a:solidFill>
-            <a:srgbClr val="B3B3B3"/>
+            <a:schemeClr val="bg2">
+              <a:lumMod val="60000"/>
+              <a:lumOff val="40000"/>
+            </a:schemeClr>
           </a:solidFill>
           <a:ln w="9525" cap="flat" cmpd="sng" algn="ctr">
-            <a:solidFill>
-              <a:schemeClr val="bg2">
-                <a:lumMod val="60000"/>
-                <a:lumOff val="40000"/>
-              </a:schemeClr>
-            </a:solidFill>
+            <a:noFill/>
             <a:prstDash val="solid"/>
             <a:round/>
             <a:headEnd type="none" w="med" len="med"/>
@@ -26082,30 +24485,28 @@
       </p:sp>
       <p:sp>
         <p:nvSpPr>
-          <p:cNvPr id="509" name="Plaque 508"/>
+          <p:cNvPr id="543" name="Octagon 542"/>
           <p:cNvSpPr/>
           <p:nvPr/>
         </p:nvSpPr>
         <p:spPr bwMode="auto">
           <a:xfrm>
-            <a:off x="6339929" y="2999011"/>
+            <a:off x="6275413" y="3111648"/>
             <a:ext cx="72008" cy="72008"/>
           </a:xfrm>
-          <a:prstGeom prst="plaque">
+          <a:prstGeom prst="octagon">
             <a:avLst>
-              <a:gd name="adj" fmla="val 45768"/>
+              <a:gd name="adj" fmla="val 30759"/>
             </a:avLst>
           </a:prstGeom>
           <a:solidFill>
-            <a:srgbClr val="B3B3B3"/>
+            <a:schemeClr val="bg2">
+              <a:lumMod val="60000"/>
+              <a:lumOff val="40000"/>
+            </a:schemeClr>
           </a:solidFill>
           <a:ln w="9525" cap="flat" cmpd="sng" algn="ctr">
-            <a:solidFill>
-              <a:schemeClr val="bg2">
-                <a:lumMod val="60000"/>
-                <a:lumOff val="40000"/>
-              </a:schemeClr>
-            </a:solidFill>
+            <a:noFill/>
             <a:prstDash val="solid"/>
             <a:round/>
             <a:headEnd type="none" w="med" len="med"/>
@@ -26152,30 +24553,28 @@
       </p:sp>
       <p:sp>
         <p:nvSpPr>
-          <p:cNvPr id="510" name="Plaque 509"/>
+          <p:cNvPr id="545" name="Octagon 544"/>
           <p:cNvSpPr/>
           <p:nvPr/>
         </p:nvSpPr>
         <p:spPr bwMode="auto">
           <a:xfrm>
-            <a:off x="6298654" y="3084736"/>
+            <a:off x="5901011" y="3230785"/>
             <a:ext cx="72008" cy="72008"/>
           </a:xfrm>
-          <a:prstGeom prst="plaque">
+          <a:prstGeom prst="octagon">
             <a:avLst>
-              <a:gd name="adj" fmla="val 45768"/>
+              <a:gd name="adj" fmla="val 30759"/>
             </a:avLst>
           </a:prstGeom>
           <a:solidFill>
-            <a:srgbClr val="B3B3B3"/>
+            <a:schemeClr val="bg2">
+              <a:lumMod val="60000"/>
+              <a:lumOff val="40000"/>
+            </a:schemeClr>
           </a:solidFill>
           <a:ln w="9525" cap="flat" cmpd="sng" algn="ctr">
-            <a:solidFill>
-              <a:schemeClr val="bg2">
-                <a:lumMod val="60000"/>
-                <a:lumOff val="40000"/>
-              </a:schemeClr>
-            </a:solidFill>
+            <a:noFill/>
             <a:prstDash val="solid"/>
             <a:round/>
             <a:headEnd type="none" w="med" len="med"/>
@@ -26222,30 +24621,28 @@
       </p:sp>
       <p:sp>
         <p:nvSpPr>
-          <p:cNvPr id="511" name="Plaque 510"/>
+          <p:cNvPr id="546" name="Octagon 545"/>
           <p:cNvSpPr/>
           <p:nvPr/>
         </p:nvSpPr>
         <p:spPr bwMode="auto">
           <a:xfrm>
-            <a:off x="5651723" y="2705894"/>
+            <a:off x="5824811" y="3195860"/>
             <a:ext cx="72008" cy="72008"/>
           </a:xfrm>
-          <a:prstGeom prst="plaque">
+          <a:prstGeom prst="octagon">
             <a:avLst>
-              <a:gd name="adj" fmla="val 45768"/>
+              <a:gd name="adj" fmla="val 30759"/>
             </a:avLst>
           </a:prstGeom>
           <a:solidFill>
-            <a:srgbClr val="B3B3B3"/>
+            <a:schemeClr val="bg2">
+              <a:lumMod val="60000"/>
+              <a:lumOff val="40000"/>
+            </a:schemeClr>
           </a:solidFill>
           <a:ln w="9525" cap="flat" cmpd="sng" algn="ctr">
-            <a:solidFill>
-              <a:schemeClr val="bg2">
-                <a:lumMod val="60000"/>
-                <a:lumOff val="40000"/>
-              </a:schemeClr>
-            </a:solidFill>
+            <a:noFill/>
             <a:prstDash val="solid"/>
             <a:round/>
             <a:headEnd type="none" w="med" len="med"/>
@@ -26292,30 +24689,28 @@
       </p:sp>
       <p:sp>
         <p:nvSpPr>
-          <p:cNvPr id="512" name="Plaque 511"/>
+          <p:cNvPr id="547" name="Octagon 546"/>
           <p:cNvSpPr/>
           <p:nvPr/>
         </p:nvSpPr>
         <p:spPr bwMode="auto">
           <a:xfrm>
-            <a:off x="5630515" y="2769394"/>
+            <a:off x="5758136" y="3151410"/>
             <a:ext cx="72008" cy="72008"/>
           </a:xfrm>
-          <a:prstGeom prst="plaque">
+          <a:prstGeom prst="octagon">
             <a:avLst>
-              <a:gd name="adj" fmla="val 45768"/>
+              <a:gd name="adj" fmla="val 30759"/>
             </a:avLst>
           </a:prstGeom>
           <a:solidFill>
-            <a:srgbClr val="B3B3B3"/>
+            <a:schemeClr val="bg2">
+              <a:lumMod val="60000"/>
+              <a:lumOff val="40000"/>
+            </a:schemeClr>
           </a:solidFill>
           <a:ln w="9525" cap="flat" cmpd="sng" algn="ctr">
-            <a:solidFill>
-              <a:schemeClr val="bg2">
-                <a:lumMod val="60000"/>
-                <a:lumOff val="40000"/>
-              </a:schemeClr>
-            </a:solidFill>
+            <a:noFill/>
             <a:prstDash val="solid"/>
             <a:round/>
             <a:headEnd type="none" w="med" len="med"/>
@@ -26362,30 +24757,28 @@
       </p:sp>
       <p:sp>
         <p:nvSpPr>
-          <p:cNvPr id="513" name="Plaque 512"/>
+          <p:cNvPr id="548" name="Octagon 547"/>
           <p:cNvSpPr/>
           <p:nvPr/>
         </p:nvSpPr>
         <p:spPr bwMode="auto">
           <a:xfrm>
-            <a:off x="5623148" y="2836069"/>
+            <a:off x="5704161" y="3087910"/>
             <a:ext cx="72008" cy="72008"/>
           </a:xfrm>
-          <a:prstGeom prst="plaque">
+          <a:prstGeom prst="octagon">
             <a:avLst>
-              <a:gd name="adj" fmla="val 45768"/>
+              <a:gd name="adj" fmla="val 30759"/>
             </a:avLst>
           </a:prstGeom>
           <a:solidFill>
-            <a:srgbClr val="B3B3B3"/>
+            <a:schemeClr val="bg2">
+              <a:lumMod val="60000"/>
+              <a:lumOff val="40000"/>
+            </a:schemeClr>
           </a:solidFill>
           <a:ln w="9525" cap="flat" cmpd="sng" algn="ctr">
-            <a:solidFill>
-              <a:schemeClr val="bg2">
-                <a:lumMod val="60000"/>
-                <a:lumOff val="40000"/>
-              </a:schemeClr>
-            </a:solidFill>
+            <a:noFill/>
             <a:prstDash val="solid"/>
             <a:round/>
             <a:headEnd type="none" w="med" len="med"/>
@@ -26432,30 +24825,28 @@
       </p:sp>
       <p:sp>
         <p:nvSpPr>
-          <p:cNvPr id="514" name="Plaque 513"/>
+          <p:cNvPr id="549" name="Octagon 548"/>
           <p:cNvSpPr/>
           <p:nvPr/>
         </p:nvSpPr>
         <p:spPr bwMode="auto">
           <a:xfrm>
-            <a:off x="5616798" y="2918619"/>
+            <a:off x="5666061" y="3011710"/>
             <a:ext cx="72008" cy="72008"/>
           </a:xfrm>
-          <a:prstGeom prst="plaque">
+          <a:prstGeom prst="octagon">
             <a:avLst>
-              <a:gd name="adj" fmla="val 45768"/>
+              <a:gd name="adj" fmla="val 30759"/>
             </a:avLst>
           </a:prstGeom>
           <a:solidFill>
-            <a:srgbClr val="B3B3B3"/>
+            <a:schemeClr val="bg2">
+              <a:lumMod val="60000"/>
+              <a:lumOff val="40000"/>
+            </a:schemeClr>
           </a:solidFill>
           <a:ln w="9525" cap="flat" cmpd="sng" algn="ctr">
-            <a:solidFill>
-              <a:schemeClr val="bg2">
-                <a:lumMod val="60000"/>
-                <a:lumOff val="40000"/>
-              </a:schemeClr>
-            </a:solidFill>
+            <a:noFill/>
             <a:prstDash val="solid"/>
             <a:round/>
             <a:headEnd type="none" w="med" len="med"/>
@@ -26502,30 +24893,28 @@
       </p:sp>
       <p:sp>
         <p:nvSpPr>
-          <p:cNvPr id="515" name="Plaque 514"/>
+          <p:cNvPr id="550" name="Octagon 549"/>
           <p:cNvSpPr/>
           <p:nvPr/>
         </p:nvSpPr>
         <p:spPr bwMode="auto">
           <a:xfrm>
-            <a:off x="5626323" y="2988469"/>
+            <a:off x="5647011" y="2929160"/>
             <a:ext cx="72008" cy="72008"/>
           </a:xfrm>
-          <a:prstGeom prst="plaque">
+          <a:prstGeom prst="octagon">
             <a:avLst>
-              <a:gd name="adj" fmla="val 45768"/>
+              <a:gd name="adj" fmla="val 30759"/>
             </a:avLst>
           </a:prstGeom>
           <a:solidFill>
-            <a:srgbClr val="B3B3B3"/>
+            <a:schemeClr val="bg2">
+              <a:lumMod val="60000"/>
+              <a:lumOff val="40000"/>
+            </a:schemeClr>
           </a:solidFill>
           <a:ln w="9525" cap="flat" cmpd="sng" algn="ctr">
-            <a:solidFill>
-              <a:schemeClr val="bg2">
-                <a:lumMod val="60000"/>
-                <a:lumOff val="40000"/>
-              </a:schemeClr>
-            </a:solidFill>
+            <a:noFill/>
             <a:prstDash val="solid"/>
             <a:round/>
             <a:headEnd type="none" w="med" len="med"/>
@@ -26572,30 +24961,28 @@
       </p:sp>
       <p:sp>
         <p:nvSpPr>
-          <p:cNvPr id="517" name="Plaque 516"/>
+          <p:cNvPr id="551" name="Octagon 550"/>
           <p:cNvSpPr/>
           <p:nvPr/>
         </p:nvSpPr>
         <p:spPr bwMode="auto">
           <a:xfrm>
-            <a:off x="5651723" y="3064669"/>
+            <a:off x="5640661" y="2846610"/>
             <a:ext cx="72008" cy="72008"/>
           </a:xfrm>
-          <a:prstGeom prst="plaque">
+          <a:prstGeom prst="octagon">
             <a:avLst>
-              <a:gd name="adj" fmla="val 45768"/>
+              <a:gd name="adj" fmla="val 30759"/>
             </a:avLst>
           </a:prstGeom>
           <a:solidFill>
-            <a:srgbClr val="B3B3B3"/>
+            <a:schemeClr val="bg2">
+              <a:lumMod val="60000"/>
+              <a:lumOff val="40000"/>
+            </a:schemeClr>
           </a:solidFill>
           <a:ln w="9525" cap="flat" cmpd="sng" algn="ctr">
-            <a:solidFill>
-              <a:schemeClr val="bg2">
-                <a:lumMod val="60000"/>
-                <a:lumOff val="40000"/>
-              </a:schemeClr>
-            </a:solidFill>
+            <a:noFill/>
             <a:prstDash val="solid"/>
             <a:round/>
             <a:headEnd type="none" w="med" len="med"/>
@@ -26642,30 +25029,28 @@
       </p:sp>
       <p:sp>
         <p:nvSpPr>
-          <p:cNvPr id="518" name="Plaque 517"/>
+          <p:cNvPr id="552" name="Octagon 551"/>
           <p:cNvSpPr/>
           <p:nvPr/>
         </p:nvSpPr>
         <p:spPr bwMode="auto">
           <a:xfrm>
-            <a:off x="5683473" y="3124994"/>
+            <a:off x="5659711" y="2764060"/>
             <a:ext cx="72008" cy="72008"/>
           </a:xfrm>
-          <a:prstGeom prst="plaque">
+          <a:prstGeom prst="octagon">
             <a:avLst>
-              <a:gd name="adj" fmla="val 45768"/>
+              <a:gd name="adj" fmla="val 30759"/>
             </a:avLst>
           </a:prstGeom>
           <a:solidFill>
-            <a:srgbClr val="B3B3B3"/>
+            <a:schemeClr val="bg2">
+              <a:lumMod val="60000"/>
+              <a:lumOff val="40000"/>
+            </a:schemeClr>
           </a:solidFill>
           <a:ln w="9525" cap="flat" cmpd="sng" algn="ctr">
-            <a:solidFill>
-              <a:schemeClr val="bg2">
-                <a:lumMod val="60000"/>
-                <a:lumOff val="40000"/>
-              </a:schemeClr>
-            </a:solidFill>
+            <a:noFill/>
             <a:prstDash val="solid"/>
             <a:round/>
             <a:headEnd type="none" w="med" len="med"/>
@@ -26712,30 +25097,28 @@
       </p:sp>
       <p:sp>
         <p:nvSpPr>
-          <p:cNvPr id="520" name="Plaque 519"/>
+          <p:cNvPr id="555" name="Octagon 554"/>
           <p:cNvSpPr/>
           <p:nvPr/>
         </p:nvSpPr>
         <p:spPr bwMode="auto">
           <a:xfrm>
-            <a:off x="5740623" y="3182144"/>
+            <a:off x="5818461" y="2570385"/>
             <a:ext cx="72008" cy="72008"/>
           </a:xfrm>
-          <a:prstGeom prst="plaque">
+          <a:prstGeom prst="octagon">
             <a:avLst>
-              <a:gd name="adj" fmla="val 45768"/>
+              <a:gd name="adj" fmla="val 30759"/>
             </a:avLst>
           </a:prstGeom>
           <a:solidFill>
-            <a:srgbClr val="B3B3B3"/>
+            <a:schemeClr val="bg2">
+              <a:lumMod val="60000"/>
+              <a:lumOff val="40000"/>
+            </a:schemeClr>
           </a:solidFill>
           <a:ln w="9525" cap="flat" cmpd="sng" algn="ctr">
-            <a:solidFill>
-              <a:schemeClr val="bg2">
-                <a:lumMod val="60000"/>
-                <a:lumOff val="40000"/>
-              </a:schemeClr>
-            </a:solidFill>
+            <a:noFill/>
             <a:prstDash val="solid"/>
             <a:round/>
             <a:headEnd type="none" w="med" len="med"/>
@@ -26782,30 +25165,28 @@
       </p:sp>
       <p:sp>
         <p:nvSpPr>
-          <p:cNvPr id="521" name="Plaque 520"/>
+          <p:cNvPr id="556" name="Octagon 555"/>
           <p:cNvSpPr/>
           <p:nvPr/>
         </p:nvSpPr>
         <p:spPr bwMode="auto">
           <a:xfrm>
-            <a:off x="5873973" y="3245644"/>
+            <a:off x="5897836" y="2544985"/>
             <a:ext cx="72008" cy="72008"/>
           </a:xfrm>
-          <a:prstGeom prst="plaque">
+          <a:prstGeom prst="octagon">
             <a:avLst>
-              <a:gd name="adj" fmla="val 45768"/>
+              <a:gd name="adj" fmla="val 30759"/>
             </a:avLst>
           </a:prstGeom>
           <a:solidFill>
-            <a:srgbClr val="B3B3B3"/>
+            <a:schemeClr val="bg2">
+              <a:lumMod val="60000"/>
+              <a:lumOff val="40000"/>
+            </a:schemeClr>
           </a:solidFill>
           <a:ln w="9525" cap="flat" cmpd="sng" algn="ctr">
-            <a:solidFill>
-              <a:schemeClr val="bg2">
-                <a:lumMod val="60000"/>
-                <a:lumOff val="40000"/>
-              </a:schemeClr>
-            </a:solidFill>
+            <a:noFill/>
             <a:prstDash val="solid"/>
             <a:round/>
             <a:headEnd type="none" w="med" len="med"/>
@@ -26852,30 +25233,28 @@
       </p:sp>
       <p:sp>
         <p:nvSpPr>
-          <p:cNvPr id="522" name="Plaque 521"/>
+          <p:cNvPr id="553" name="Octagon 552"/>
           <p:cNvSpPr/>
           <p:nvPr/>
         </p:nvSpPr>
         <p:spPr bwMode="auto">
           <a:xfrm>
-            <a:off x="5800948" y="3220244"/>
+            <a:off x="5694636" y="2694210"/>
             <a:ext cx="72008" cy="72008"/>
           </a:xfrm>
-          <a:prstGeom prst="plaque">
+          <a:prstGeom prst="octagon">
             <a:avLst>
-              <a:gd name="adj" fmla="val 45768"/>
+              <a:gd name="adj" fmla="val 30759"/>
             </a:avLst>
           </a:prstGeom>
           <a:solidFill>
-            <a:srgbClr val="B3B3B3"/>
+            <a:schemeClr val="bg2">
+              <a:lumMod val="60000"/>
+              <a:lumOff val="40000"/>
+            </a:schemeClr>
           </a:solidFill>
           <a:ln w="9525" cap="flat" cmpd="sng" algn="ctr">
-            <a:solidFill>
-              <a:schemeClr val="bg2">
-                <a:lumMod val="60000"/>
-                <a:lumOff val="40000"/>
-              </a:schemeClr>
-            </a:solidFill>
+            <a:noFill/>
             <a:prstDash val="solid"/>
             <a:round/>
             <a:headEnd type="none" w="med" len="med"/>
@@ -26922,30 +25301,28 @@
       </p:sp>
       <p:sp>
         <p:nvSpPr>
-          <p:cNvPr id="523" name="Plaque 522"/>
+          <p:cNvPr id="554" name="Octagon 553"/>
           <p:cNvSpPr/>
           <p:nvPr/>
         </p:nvSpPr>
         <p:spPr bwMode="auto">
           <a:xfrm>
-            <a:off x="5959698" y="3258344"/>
+            <a:off x="5751786" y="2618010"/>
             <a:ext cx="72008" cy="72008"/>
           </a:xfrm>
-          <a:prstGeom prst="plaque">
+          <a:prstGeom prst="octagon">
             <a:avLst>
-              <a:gd name="adj" fmla="val 45768"/>
+              <a:gd name="adj" fmla="val 30759"/>
             </a:avLst>
           </a:prstGeom>
           <a:solidFill>
-            <a:srgbClr val="B3B3B3"/>
+            <a:schemeClr val="bg2">
+              <a:lumMod val="60000"/>
+              <a:lumOff val="40000"/>
+            </a:schemeClr>
           </a:solidFill>
           <a:ln w="9525" cap="flat" cmpd="sng" algn="ctr">
-            <a:solidFill>
-              <a:schemeClr val="bg2">
-                <a:lumMod val="60000"/>
-                <a:lumOff val="40000"/>
-              </a:schemeClr>
-            </a:solidFill>
+            <a:noFill/>
             <a:prstDash val="solid"/>
             <a:round/>
             <a:headEnd type="none" w="med" len="med"/>
@@ -26992,30 +25369,28 @@
       </p:sp>
       <p:sp>
         <p:nvSpPr>
-          <p:cNvPr id="524" name="Plaque 523"/>
+          <p:cNvPr id="540" name="Octagon 539"/>
           <p:cNvSpPr/>
           <p:nvPr/>
         </p:nvSpPr>
         <p:spPr bwMode="auto">
           <a:xfrm>
-            <a:off x="6035898" y="3261519"/>
+            <a:off x="6149678" y="3212107"/>
             <a:ext cx="72008" cy="72008"/>
           </a:xfrm>
-          <a:prstGeom prst="plaque">
+          <a:prstGeom prst="octagon">
             <a:avLst>
-              <a:gd name="adj" fmla="val 45768"/>
+              <a:gd name="adj" fmla="val 30759"/>
             </a:avLst>
           </a:prstGeom>
           <a:solidFill>
-            <a:srgbClr val="B3B3B3"/>
+            <a:schemeClr val="bg2">
+              <a:lumMod val="60000"/>
+              <a:lumOff val="40000"/>
+            </a:schemeClr>
           </a:solidFill>
           <a:ln w="9525" cap="flat" cmpd="sng" algn="ctr">
-            <a:solidFill>
-              <a:schemeClr val="bg2">
-                <a:lumMod val="60000"/>
-                <a:lumOff val="40000"/>
-              </a:schemeClr>
-            </a:solidFill>
+            <a:noFill/>
             <a:prstDash val="solid"/>
             <a:round/>
             <a:headEnd type="none" w="med" len="med"/>
@@ -27062,30 +25437,28 @@
       </p:sp>
       <p:sp>
         <p:nvSpPr>
-          <p:cNvPr id="525" name="Plaque 524"/>
+          <p:cNvPr id="542" name="Octagon 541"/>
           <p:cNvSpPr/>
           <p:nvPr/>
         </p:nvSpPr>
         <p:spPr bwMode="auto">
           <a:xfrm>
-            <a:off x="6102573" y="3239294"/>
+            <a:off x="5975574" y="3246015"/>
             <a:ext cx="72008" cy="72008"/>
           </a:xfrm>
-          <a:prstGeom prst="plaque">
+          <a:prstGeom prst="octagon">
             <a:avLst>
-              <a:gd name="adj" fmla="val 45768"/>
+              <a:gd name="adj" fmla="val 30759"/>
             </a:avLst>
           </a:prstGeom>
           <a:solidFill>
-            <a:srgbClr val="B3B3B3"/>
+            <a:schemeClr val="bg2">
+              <a:lumMod val="60000"/>
+              <a:lumOff val="40000"/>
+            </a:schemeClr>
           </a:solidFill>
           <a:ln w="9525" cap="flat" cmpd="sng" algn="ctr">
-            <a:solidFill>
-              <a:schemeClr val="bg2">
-                <a:lumMod val="60000"/>
-                <a:lumOff val="40000"/>
-              </a:schemeClr>
-            </a:solidFill>
+            <a:noFill/>
             <a:prstDash val="solid"/>
             <a:round/>
             <a:headEnd type="none" w="med" len="med"/>
@@ -27132,30 +25505,28 @@
       </p:sp>
       <p:sp>
         <p:nvSpPr>
-          <p:cNvPr id="526" name="Plaque 525"/>
+          <p:cNvPr id="544" name="Octagon 543"/>
           <p:cNvSpPr/>
           <p:nvPr/>
         </p:nvSpPr>
         <p:spPr bwMode="auto">
           <a:xfrm>
-            <a:off x="6162898" y="3229769"/>
+            <a:off x="6069931" y="3248173"/>
             <a:ext cx="72008" cy="72008"/>
           </a:xfrm>
-          <a:prstGeom prst="plaque">
+          <a:prstGeom prst="octagon">
             <a:avLst>
-              <a:gd name="adj" fmla="val 45768"/>
+              <a:gd name="adj" fmla="val 30759"/>
             </a:avLst>
           </a:prstGeom>
           <a:solidFill>
-            <a:srgbClr val="B3B3B3"/>
+            <a:schemeClr val="bg2">
+              <a:lumMod val="60000"/>
+              <a:lumOff val="40000"/>
+            </a:schemeClr>
           </a:solidFill>
           <a:ln w="9525" cap="flat" cmpd="sng" algn="ctr">
-            <a:solidFill>
-              <a:schemeClr val="bg2">
-                <a:lumMod val="60000"/>
-                <a:lumOff val="40000"/>
-              </a:schemeClr>
-            </a:solidFill>
+            <a:noFill/>
             <a:prstDash val="solid"/>
             <a:round/>
             <a:headEnd type="none" w="med" len="med"/>
@@ -27200,286 +25571,1626 @@
           </a:p>
         </p:txBody>
       </p:sp>
-      <p:sp>
-        <p:nvSpPr>
-          <p:cNvPr id="527" name="Plaque 526"/>
-          <p:cNvSpPr/>
-          <p:nvPr/>
-        </p:nvSpPr>
-        <p:spPr bwMode="auto">
+      <p:grpSp>
+        <p:nvGrpSpPr>
+          <p:cNvPr id="426" name="Group 425"/>
+          <p:cNvGrpSpPr/>
+          <p:nvPr/>
+        </p:nvGrpSpPr>
+        <p:grpSpPr>
           <a:xfrm>
-            <a:off x="6181948" y="3194844"/>
-            <a:ext cx="72008" cy="72008"/>
-          </a:xfrm>
-          <a:prstGeom prst="plaque">
-            <a:avLst>
-              <a:gd name="adj" fmla="val 45768"/>
-            </a:avLst>
-          </a:prstGeom>
-          <a:solidFill>
-            <a:srgbClr val="B3B3B3"/>
-          </a:solidFill>
-          <a:ln w="9525" cap="flat" cmpd="sng" algn="ctr">
-            <a:solidFill>
-              <a:schemeClr val="bg2">
-                <a:lumMod val="60000"/>
-                <a:lumOff val="40000"/>
-              </a:schemeClr>
-            </a:solidFill>
-            <a:prstDash val="solid"/>
-            <a:round/>
-            <a:headEnd type="none" w="med" len="med"/>
-            <a:tailEnd type="none" w="med" len="med"/>
-          </a:ln>
-          <a:effectLst/>
-        </p:spPr>
-        <p:txBody>
-          <a:bodyPr vert="horz" wrap="square" lIns="91440" tIns="45720" rIns="91440" bIns="45720" numCol="1" rtlCol="0" anchor="t" anchorCtr="0" compatLnSpc="1">
-            <a:prstTxWarp prst="textNoShape">
-              <a:avLst/>
-            </a:prstTxWarp>
-          </a:bodyPr>
-          <a:lstStyle/>
-          <a:p>
-            <a:pPr marL="0" marR="0" indent="0" algn="l" defTabSz="914400" rtl="0" eaLnBrk="1" fontAlgn="base" latinLnBrk="0" hangingPunct="1">
-              <a:lnSpc>
-                <a:spcPct val="100000"/>
-              </a:lnSpc>
-              <a:spcBef>
-                <a:spcPct val="0"/>
-              </a:spcBef>
-              <a:spcAft>
-                <a:spcPct val="0"/>
-              </a:spcAft>
-              <a:buClrTx/>
-              <a:buSzTx/>
-              <a:buFontTx/>
-              <a:buNone/>
-              <a:tabLst/>
-            </a:pPr>
-            <a:endParaRPr kumimoji="0" lang="en-GB" sz="1000" b="1" i="0" u="none" strike="noStrike" cap="none" normalizeH="0" baseline="0" smtClean="0">
-              <a:ln>
-                <a:noFill/>
+            <a:off x="5746998" y="2638027"/>
+            <a:ext cx="542925" cy="622300"/>
+            <a:chOff x="5445224" y="1518725"/>
+            <a:chExt cx="575731" cy="704321"/>
+          </a:xfrm>
+        </p:grpSpPr>
+        <p:grpSp>
+          <p:nvGrpSpPr>
+            <p:cNvPr id="337" name="Group 336"/>
+            <p:cNvGrpSpPr/>
+            <p:nvPr/>
+          </p:nvGrpSpPr>
+          <p:grpSpPr>
+            <a:xfrm>
+              <a:off x="5604849" y="1891466"/>
+              <a:ext cx="345115" cy="331580"/>
+              <a:chOff x="5592149" y="1888291"/>
+              <a:chExt cx="345115" cy="331580"/>
+            </a:xfrm>
+          </p:grpSpPr>
+          <p:sp>
+            <p:nvSpPr>
+              <p:cNvPr id="458" name="Rounded Rectangle 457"/>
+              <p:cNvSpPr/>
+              <p:nvPr/>
+            </p:nvSpPr>
+            <p:spPr bwMode="auto">
+              <a:xfrm>
+                <a:off x="5747579" y="1889528"/>
+                <a:ext cx="39389" cy="330343"/>
+              </a:xfrm>
+              <a:prstGeom prst="roundRect">
+                <a:avLst/>
+              </a:prstGeom>
+              <a:solidFill>
+                <a:schemeClr val="bg1"/>
+              </a:solidFill>
+              <a:ln w="9525" cap="flat" cmpd="sng" algn="ctr">
+                <a:solidFill>
+                  <a:schemeClr val="tx1"/>
+                </a:solidFill>
+                <a:prstDash val="solid"/>
+                <a:round/>
+                <a:headEnd type="none" w="med" len="med"/>
+                <a:tailEnd type="none" w="med" len="med"/>
               </a:ln>
+              <a:effectLst/>
+            </p:spPr>
+            <p:txBody>
+              <a:bodyPr vert="horz" wrap="square" lIns="91440" tIns="45720" rIns="91440" bIns="45720" numCol="1" rtlCol="0" anchor="t" anchorCtr="0" compatLnSpc="1">
+                <a:prstTxWarp prst="textNoShape">
+                  <a:avLst/>
+                </a:prstTxWarp>
+              </a:bodyPr>
+              <a:lstStyle/>
+              <a:p>
+                <a:pPr marL="0" marR="0" indent="0" algn="l" defTabSz="914400" rtl="0" eaLnBrk="1" fontAlgn="base" latinLnBrk="0" hangingPunct="1">
+                  <a:lnSpc>
+                    <a:spcPct val="100000"/>
+                  </a:lnSpc>
+                  <a:spcBef>
+                    <a:spcPct val="0"/>
+                  </a:spcBef>
+                  <a:spcAft>
+                    <a:spcPct val="0"/>
+                  </a:spcAft>
+                  <a:buClrTx/>
+                  <a:buSzTx/>
+                  <a:buFontTx/>
+                  <a:buNone/>
+                  <a:tabLst/>
+                </a:pPr>
+                <a:endParaRPr kumimoji="0" lang="en-GB" sz="1000" b="1" i="0" u="none" strike="noStrike" cap="none" normalizeH="0" baseline="0" smtClean="0">
+                  <a:ln>
+                    <a:noFill/>
+                  </a:ln>
+                  <a:solidFill>
+                    <a:schemeClr val="bg2"/>
+                  </a:solidFill>
+                  <a:effectLst/>
+                  <a:latin typeface="Microsoft Sans Serif" pitchFamily="34" charset="0"/>
+                </a:endParaRPr>
+              </a:p>
+            </p:txBody>
+          </p:sp>
+          <p:sp>
+            <p:nvSpPr>
+              <p:cNvPr id="459" name="Rounded Rectangle 458"/>
+              <p:cNvSpPr/>
+              <p:nvPr/>
+            </p:nvSpPr>
+            <p:spPr bwMode="auto">
+              <a:xfrm rot="16200000">
+                <a:off x="5745714" y="1880949"/>
+                <a:ext cx="37985" cy="342549"/>
+              </a:xfrm>
+              <a:prstGeom prst="roundRect">
+                <a:avLst/>
+              </a:prstGeom>
               <a:solidFill>
-                <a:schemeClr val="bg2"/>
+                <a:schemeClr val="bg1"/>
               </a:solidFill>
+              <a:ln w="9525" cap="flat" cmpd="sng" algn="ctr">
+                <a:solidFill>
+                  <a:schemeClr val="tx1"/>
+                </a:solidFill>
+                <a:prstDash val="solid"/>
+                <a:round/>
+                <a:headEnd type="none" w="med" len="med"/>
+                <a:tailEnd type="none" w="med" len="med"/>
+              </a:ln>
               <a:effectLst/>
-              <a:latin typeface="Microsoft Sans Serif" pitchFamily="34" charset="0"/>
-            </a:endParaRPr>
-          </a:p>
-        </p:txBody>
-      </p:sp>
-      <p:sp>
-        <p:nvSpPr>
-          <p:cNvPr id="528" name="Plaque 527"/>
-          <p:cNvSpPr/>
-          <p:nvPr/>
-        </p:nvSpPr>
-        <p:spPr bwMode="auto">
-          <a:xfrm>
-            <a:off x="6245448" y="3147219"/>
-            <a:ext cx="72008" cy="72008"/>
-          </a:xfrm>
-          <a:prstGeom prst="plaque">
-            <a:avLst>
-              <a:gd name="adj" fmla="val 45768"/>
-            </a:avLst>
-          </a:prstGeom>
-          <a:solidFill>
-            <a:srgbClr val="B3B3B3"/>
-          </a:solidFill>
-          <a:ln w="9525" cap="flat" cmpd="sng" algn="ctr">
-            <a:solidFill>
-              <a:schemeClr val="bg2">
-                <a:lumMod val="60000"/>
-                <a:lumOff val="40000"/>
-              </a:schemeClr>
-            </a:solidFill>
-            <a:prstDash val="solid"/>
-            <a:round/>
-            <a:headEnd type="none" w="med" len="med"/>
-            <a:tailEnd type="none" w="med" len="med"/>
-          </a:ln>
-          <a:effectLst/>
-        </p:spPr>
-        <p:txBody>
-          <a:bodyPr vert="horz" wrap="square" lIns="91440" tIns="45720" rIns="91440" bIns="45720" numCol="1" rtlCol="0" anchor="t" anchorCtr="0" compatLnSpc="1">
-            <a:prstTxWarp prst="textNoShape">
-              <a:avLst/>
-            </a:prstTxWarp>
-          </a:bodyPr>
-          <a:lstStyle/>
-          <a:p>
-            <a:pPr marL="0" marR="0" indent="0" algn="l" defTabSz="914400" rtl="0" eaLnBrk="1" fontAlgn="base" latinLnBrk="0" hangingPunct="1">
-              <a:lnSpc>
-                <a:spcPct val="100000"/>
-              </a:lnSpc>
-              <a:spcBef>
-                <a:spcPct val="0"/>
-              </a:spcBef>
-              <a:spcAft>
-                <a:spcPct val="0"/>
-              </a:spcAft>
-              <a:buClrTx/>
-              <a:buSzTx/>
-              <a:buFontTx/>
-              <a:buNone/>
-              <a:tabLst/>
-            </a:pPr>
-            <a:endParaRPr kumimoji="0" lang="en-GB" sz="1000" b="1" i="0" u="none" strike="noStrike" cap="none" normalizeH="0" baseline="0" smtClean="0">
-              <a:ln>
-                <a:noFill/>
+            </p:spPr>
+            <p:txBody>
+              <a:bodyPr vert="horz" wrap="square" lIns="91440" tIns="45720" rIns="91440" bIns="45720" numCol="1" rtlCol="0" anchor="t" anchorCtr="0" compatLnSpc="1">
+                <a:prstTxWarp prst="textNoShape">
+                  <a:avLst/>
+                </a:prstTxWarp>
+              </a:bodyPr>
+              <a:lstStyle/>
+              <a:p>
+                <a:pPr marL="0" marR="0" indent="0" algn="l" defTabSz="914400" rtl="0" eaLnBrk="1" fontAlgn="base" latinLnBrk="0" hangingPunct="1">
+                  <a:lnSpc>
+                    <a:spcPct val="100000"/>
+                  </a:lnSpc>
+                  <a:spcBef>
+                    <a:spcPct val="0"/>
+                  </a:spcBef>
+                  <a:spcAft>
+                    <a:spcPct val="0"/>
+                  </a:spcAft>
+                  <a:buClrTx/>
+                  <a:buSzTx/>
+                  <a:buFontTx/>
+                  <a:buNone/>
+                  <a:tabLst/>
+                </a:pPr>
+                <a:endParaRPr kumimoji="0" lang="en-GB" sz="1000" b="1" i="0" u="none" strike="noStrike" cap="none" normalizeH="0" baseline="0" smtClean="0">
+                  <a:ln>
+                    <a:noFill/>
+                  </a:ln>
+                  <a:solidFill>
+                    <a:schemeClr val="bg2"/>
+                  </a:solidFill>
+                  <a:effectLst/>
+                  <a:latin typeface="Microsoft Sans Serif" pitchFamily="34" charset="0"/>
+                </a:endParaRPr>
+              </a:p>
+            </p:txBody>
+          </p:sp>
+          <p:sp>
+            <p:nvSpPr>
+              <p:cNvPr id="460" name="Rounded Rectangle 459"/>
+              <p:cNvSpPr/>
+              <p:nvPr/>
+            </p:nvSpPr>
+            <p:spPr bwMode="auto">
+              <a:xfrm rot="18000000">
+                <a:off x="5746997" y="1881281"/>
+                <a:ext cx="37985" cy="342549"/>
+              </a:xfrm>
+              <a:prstGeom prst="roundRect">
+                <a:avLst/>
+              </a:prstGeom>
+              <a:solidFill>
+                <a:schemeClr val="bg1"/>
+              </a:solidFill>
+              <a:ln w="9525" cap="flat" cmpd="sng" algn="ctr">
+                <a:solidFill>
+                  <a:schemeClr val="tx1"/>
+                </a:solidFill>
+                <a:prstDash val="solid"/>
+                <a:round/>
+                <a:headEnd type="none" w="med" len="med"/>
+                <a:tailEnd type="none" w="med" len="med"/>
               </a:ln>
+              <a:effectLst/>
+            </p:spPr>
+            <p:txBody>
+              <a:bodyPr vert="horz" wrap="square" lIns="91440" tIns="45720" rIns="91440" bIns="45720" numCol="1" rtlCol="0" anchor="t" anchorCtr="0" compatLnSpc="1">
+                <a:prstTxWarp prst="textNoShape">
+                  <a:avLst/>
+                </a:prstTxWarp>
+              </a:bodyPr>
+              <a:lstStyle/>
+              <a:p>
+                <a:pPr marL="0" marR="0" indent="0" algn="l" defTabSz="914400" rtl="0" eaLnBrk="1" fontAlgn="base" latinLnBrk="0" hangingPunct="1">
+                  <a:lnSpc>
+                    <a:spcPct val="100000"/>
+                  </a:lnSpc>
+                  <a:spcBef>
+                    <a:spcPct val="0"/>
+                  </a:spcBef>
+                  <a:spcAft>
+                    <a:spcPct val="0"/>
+                  </a:spcAft>
+                  <a:buClrTx/>
+                  <a:buSzTx/>
+                  <a:buFontTx/>
+                  <a:buNone/>
+                  <a:tabLst/>
+                </a:pPr>
+                <a:endParaRPr kumimoji="0" lang="en-GB" sz="1000" b="1" i="0" u="none" strike="noStrike" cap="none" normalizeH="0" baseline="0" smtClean="0">
+                  <a:ln>
+                    <a:noFill/>
+                  </a:ln>
+                  <a:solidFill>
+                    <a:schemeClr val="bg2"/>
+                  </a:solidFill>
+                  <a:effectLst/>
+                  <a:latin typeface="Microsoft Sans Serif" pitchFamily="34" charset="0"/>
+                </a:endParaRPr>
+              </a:p>
+            </p:txBody>
+          </p:sp>
+          <p:sp>
+            <p:nvSpPr>
+              <p:cNvPr id="461" name="Rounded Rectangle 460"/>
+              <p:cNvSpPr/>
+              <p:nvPr/>
+            </p:nvSpPr>
+            <p:spPr bwMode="auto">
+              <a:xfrm rot="19800000">
+                <a:off x="5747236" y="1888291"/>
+                <a:ext cx="39389" cy="330343"/>
+              </a:xfrm>
+              <a:prstGeom prst="roundRect">
+                <a:avLst/>
+              </a:prstGeom>
               <a:solidFill>
-                <a:schemeClr val="bg2"/>
+                <a:schemeClr val="bg1"/>
               </a:solidFill>
+              <a:ln w="9525" cap="flat" cmpd="sng" algn="ctr">
+                <a:solidFill>
+                  <a:schemeClr val="tx1"/>
+                </a:solidFill>
+                <a:prstDash val="solid"/>
+                <a:round/>
+                <a:headEnd type="none" w="med" len="med"/>
+                <a:tailEnd type="none" w="med" len="med"/>
+              </a:ln>
               <a:effectLst/>
-              <a:latin typeface="Microsoft Sans Serif" pitchFamily="34" charset="0"/>
-            </a:endParaRPr>
-          </a:p>
-        </p:txBody>
-      </p:sp>
-      <p:sp>
-        <p:nvSpPr>
-          <p:cNvPr id="529" name="Plaque 528"/>
-          <p:cNvSpPr/>
-          <p:nvPr/>
-        </p:nvSpPr>
-        <p:spPr bwMode="auto">
-          <a:xfrm>
-            <a:off x="6158954" y="2569245"/>
-            <a:ext cx="72008" cy="72008"/>
-          </a:xfrm>
-          <a:prstGeom prst="plaque">
-            <a:avLst>
-              <a:gd name="adj" fmla="val 45768"/>
-            </a:avLst>
-          </a:prstGeom>
-          <a:solidFill>
-            <a:srgbClr val="B3B3B3"/>
-          </a:solidFill>
-          <a:ln w="9525" cap="flat" cmpd="sng" algn="ctr">
-            <a:solidFill>
-              <a:schemeClr val="bg2">
-                <a:lumMod val="60000"/>
-                <a:lumOff val="40000"/>
-              </a:schemeClr>
-            </a:solidFill>
-            <a:prstDash val="solid"/>
-            <a:round/>
-            <a:headEnd type="none" w="med" len="med"/>
-            <a:tailEnd type="none" w="med" len="med"/>
-          </a:ln>
-          <a:effectLst/>
-        </p:spPr>
-        <p:txBody>
-          <a:bodyPr vert="horz" wrap="square" lIns="91440" tIns="45720" rIns="91440" bIns="45720" numCol="1" rtlCol="0" anchor="t" anchorCtr="0" compatLnSpc="1">
-            <a:prstTxWarp prst="textNoShape">
-              <a:avLst/>
-            </a:prstTxWarp>
-          </a:bodyPr>
-          <a:lstStyle/>
-          <a:p>
-            <a:pPr marL="0" marR="0" indent="0" algn="l" defTabSz="914400" rtl="0" eaLnBrk="1" fontAlgn="base" latinLnBrk="0" hangingPunct="1">
-              <a:lnSpc>
-                <a:spcPct val="100000"/>
-              </a:lnSpc>
-              <a:spcBef>
-                <a:spcPct val="0"/>
-              </a:spcBef>
-              <a:spcAft>
-                <a:spcPct val="0"/>
-              </a:spcAft>
-              <a:buClrTx/>
-              <a:buSzTx/>
-              <a:buFontTx/>
-              <a:buNone/>
-              <a:tabLst/>
-            </a:pPr>
-            <a:endParaRPr kumimoji="0" lang="en-GB" sz="1000" b="1" i="0" u="none" strike="noStrike" cap="none" normalizeH="0" baseline="0" smtClean="0">
-              <a:ln>
-                <a:noFill/>
+            </p:spPr>
+            <p:txBody>
+              <a:bodyPr vert="horz" wrap="square" lIns="91440" tIns="45720" rIns="91440" bIns="45720" numCol="1" rtlCol="0" anchor="t" anchorCtr="0" compatLnSpc="1">
+                <a:prstTxWarp prst="textNoShape">
+                  <a:avLst/>
+                </a:prstTxWarp>
+              </a:bodyPr>
+              <a:lstStyle/>
+              <a:p>
+                <a:pPr marL="0" marR="0" indent="0" algn="l" defTabSz="914400" rtl="0" eaLnBrk="1" fontAlgn="base" latinLnBrk="0" hangingPunct="1">
+                  <a:lnSpc>
+                    <a:spcPct val="100000"/>
+                  </a:lnSpc>
+                  <a:spcBef>
+                    <a:spcPct val="0"/>
+                  </a:spcBef>
+                  <a:spcAft>
+                    <a:spcPct val="0"/>
+                  </a:spcAft>
+                  <a:buClrTx/>
+                  <a:buSzTx/>
+                  <a:buFontTx/>
+                  <a:buNone/>
+                  <a:tabLst/>
+                </a:pPr>
+                <a:endParaRPr kumimoji="0" lang="en-GB" sz="1000" b="1" i="0" u="none" strike="noStrike" cap="none" normalizeH="0" baseline="0" smtClean="0">
+                  <a:ln>
+                    <a:noFill/>
+                  </a:ln>
+                  <a:solidFill>
+                    <a:schemeClr val="bg2"/>
+                  </a:solidFill>
+                  <a:effectLst/>
+                  <a:latin typeface="Microsoft Sans Serif" pitchFamily="34" charset="0"/>
+                </a:endParaRPr>
+              </a:p>
+            </p:txBody>
+          </p:sp>
+          <p:sp>
+            <p:nvSpPr>
+              <p:cNvPr id="462" name="Rounded Rectangle 461"/>
+              <p:cNvSpPr/>
+              <p:nvPr/>
+            </p:nvSpPr>
+            <p:spPr bwMode="auto">
+              <a:xfrm rot="14400000">
+                <a:off x="5744431" y="1881281"/>
+                <a:ext cx="37985" cy="342549"/>
+              </a:xfrm>
+              <a:prstGeom prst="roundRect">
+                <a:avLst/>
+              </a:prstGeom>
+              <a:solidFill>
+                <a:schemeClr val="bg1"/>
+              </a:solidFill>
+              <a:ln w="9525" cap="flat" cmpd="sng" algn="ctr">
+                <a:solidFill>
+                  <a:schemeClr val="tx1"/>
+                </a:solidFill>
+                <a:prstDash val="solid"/>
+                <a:round/>
+                <a:headEnd type="none" w="med" len="med"/>
+                <a:tailEnd type="none" w="med" len="med"/>
               </a:ln>
+              <a:effectLst/>
+            </p:spPr>
+            <p:txBody>
+              <a:bodyPr vert="horz" wrap="square" lIns="91440" tIns="45720" rIns="91440" bIns="45720" numCol="1" rtlCol="0" anchor="t" anchorCtr="0" compatLnSpc="1">
+                <a:prstTxWarp prst="textNoShape">
+                  <a:avLst/>
+                </a:prstTxWarp>
+              </a:bodyPr>
+              <a:lstStyle/>
+              <a:p>
+                <a:pPr marL="0" marR="0" indent="0" algn="l" defTabSz="914400" rtl="0" eaLnBrk="1" fontAlgn="base" latinLnBrk="0" hangingPunct="1">
+                  <a:lnSpc>
+                    <a:spcPct val="100000"/>
+                  </a:lnSpc>
+                  <a:spcBef>
+                    <a:spcPct val="0"/>
+                  </a:spcBef>
+                  <a:spcAft>
+                    <a:spcPct val="0"/>
+                  </a:spcAft>
+                  <a:buClrTx/>
+                  <a:buSzTx/>
+                  <a:buFontTx/>
+                  <a:buNone/>
+                  <a:tabLst/>
+                </a:pPr>
+                <a:endParaRPr kumimoji="0" lang="en-GB" sz="1000" b="1" i="0" u="none" strike="noStrike" cap="none" normalizeH="0" baseline="0" smtClean="0">
+                  <a:ln>
+                    <a:noFill/>
+                  </a:ln>
+                  <a:solidFill>
+                    <a:schemeClr val="bg2"/>
+                  </a:solidFill>
+                  <a:effectLst/>
+                  <a:latin typeface="Microsoft Sans Serif" pitchFamily="34" charset="0"/>
+                </a:endParaRPr>
+              </a:p>
+            </p:txBody>
+          </p:sp>
+          <p:sp>
+            <p:nvSpPr>
+              <p:cNvPr id="463" name="Rounded Rectangle 462"/>
+              <p:cNvSpPr/>
+              <p:nvPr/>
+            </p:nvSpPr>
+            <p:spPr bwMode="auto">
+              <a:xfrm rot="12600000">
+                <a:off x="5742789" y="1888291"/>
+                <a:ext cx="39389" cy="330343"/>
+              </a:xfrm>
+              <a:prstGeom prst="roundRect">
+                <a:avLst/>
+              </a:prstGeom>
               <a:solidFill>
-                <a:schemeClr val="bg2"/>
+                <a:schemeClr val="bg1"/>
               </a:solidFill>
+              <a:ln w="9525" cap="flat" cmpd="sng" algn="ctr">
+                <a:solidFill>
+                  <a:schemeClr val="tx1"/>
+                </a:solidFill>
+                <a:prstDash val="solid"/>
+                <a:round/>
+                <a:headEnd type="none" w="med" len="med"/>
+                <a:tailEnd type="none" w="med" len="med"/>
+              </a:ln>
               <a:effectLst/>
-              <a:latin typeface="Microsoft Sans Serif" pitchFamily="34" charset="0"/>
-            </a:endParaRPr>
-          </a:p>
-        </p:txBody>
-      </p:sp>
-      <p:sp>
-        <p:nvSpPr>
-          <p:cNvPr id="530" name="Plaque 529"/>
-          <p:cNvSpPr/>
-          <p:nvPr/>
-        </p:nvSpPr>
-        <p:spPr bwMode="auto">
-          <a:xfrm>
-            <a:off x="5752306" y="2590453"/>
-            <a:ext cx="72008" cy="72008"/>
-          </a:xfrm>
-          <a:prstGeom prst="plaque">
-            <a:avLst>
-              <a:gd name="adj" fmla="val 45768"/>
-            </a:avLst>
-          </a:prstGeom>
-          <a:solidFill>
-            <a:srgbClr val="B3B3B3"/>
-          </a:solidFill>
-          <a:ln w="9525" cap="flat" cmpd="sng" algn="ctr">
-            <a:solidFill>
-              <a:schemeClr val="bg2">
-                <a:lumMod val="60000"/>
-                <a:lumOff val="40000"/>
-              </a:schemeClr>
-            </a:solidFill>
-            <a:prstDash val="solid"/>
-            <a:round/>
-            <a:headEnd type="none" w="med" len="med"/>
-            <a:tailEnd type="none" w="med" len="med"/>
-          </a:ln>
-          <a:effectLst/>
-        </p:spPr>
-        <p:txBody>
-          <a:bodyPr vert="horz" wrap="square" lIns="91440" tIns="45720" rIns="91440" bIns="45720" numCol="1" rtlCol="0" anchor="t" anchorCtr="0" compatLnSpc="1">
-            <a:prstTxWarp prst="textNoShape">
-              <a:avLst/>
-            </a:prstTxWarp>
-          </a:bodyPr>
-          <a:lstStyle/>
-          <a:p>
-            <a:pPr marL="0" marR="0" indent="0" algn="l" defTabSz="914400" rtl="0" eaLnBrk="1" fontAlgn="base" latinLnBrk="0" hangingPunct="1">
-              <a:lnSpc>
-                <a:spcPct val="100000"/>
-              </a:lnSpc>
-              <a:spcBef>
-                <a:spcPct val="0"/>
-              </a:spcBef>
-              <a:spcAft>
-                <a:spcPct val="0"/>
-              </a:spcAft>
-              <a:buClrTx/>
-              <a:buSzTx/>
-              <a:buFontTx/>
-              <a:buNone/>
-              <a:tabLst/>
-            </a:pPr>
-            <a:endParaRPr kumimoji="0" lang="en-GB" sz="1000" b="1" i="0" u="none" strike="noStrike" cap="none" normalizeH="0" baseline="0" smtClean="0">
-              <a:ln>
-                <a:noFill/>
+            </p:spPr>
+            <p:txBody>
+              <a:bodyPr vert="horz" wrap="square" lIns="91440" tIns="45720" rIns="91440" bIns="45720" numCol="1" rtlCol="0" anchor="t" anchorCtr="0" compatLnSpc="1">
+                <a:prstTxWarp prst="textNoShape">
+                  <a:avLst/>
+                </a:prstTxWarp>
+              </a:bodyPr>
+              <a:lstStyle/>
+              <a:p>
+                <a:pPr marL="0" marR="0" indent="0" algn="l" defTabSz="914400" rtl="0" eaLnBrk="1" fontAlgn="base" latinLnBrk="0" hangingPunct="1">
+                  <a:lnSpc>
+                    <a:spcPct val="100000"/>
+                  </a:lnSpc>
+                  <a:spcBef>
+                    <a:spcPct val="0"/>
+                  </a:spcBef>
+                  <a:spcAft>
+                    <a:spcPct val="0"/>
+                  </a:spcAft>
+                  <a:buClrTx/>
+                  <a:buSzTx/>
+                  <a:buFontTx/>
+                  <a:buNone/>
+                  <a:tabLst/>
+                </a:pPr>
+                <a:endParaRPr kumimoji="0" lang="en-GB" sz="1000" b="1" i="0" u="none" strike="noStrike" cap="none" normalizeH="0" baseline="0" smtClean="0">
+                  <a:ln>
+                    <a:noFill/>
+                  </a:ln>
+                  <a:solidFill>
+                    <a:schemeClr val="bg2"/>
+                  </a:solidFill>
+                  <a:effectLst/>
+                  <a:latin typeface="Microsoft Sans Serif" pitchFamily="34" charset="0"/>
+                </a:endParaRPr>
+              </a:p>
+            </p:txBody>
+          </p:sp>
+          <p:sp>
+            <p:nvSpPr>
+              <p:cNvPr id="464" name="Oval 463"/>
+              <p:cNvSpPr/>
+              <p:nvPr/>
+            </p:nvSpPr>
+            <p:spPr bwMode="auto">
+              <a:xfrm>
+                <a:off x="5622878" y="1915279"/>
+                <a:ext cx="287397" cy="276997"/>
+              </a:xfrm>
+              <a:prstGeom prst="ellipse">
+                <a:avLst/>
+              </a:prstGeom>
+              <a:solidFill>
+                <a:schemeClr val="bg1"/>
+              </a:solidFill>
+              <a:ln w="9525" cap="flat" cmpd="sng" algn="ctr">
+                <a:solidFill>
+                  <a:schemeClr val="tx1"/>
+                </a:solidFill>
+                <a:prstDash val="solid"/>
+                <a:round/>
+                <a:headEnd type="none" w="med" len="med"/>
+                <a:tailEnd type="none" w="med" len="med"/>
               </a:ln>
+              <a:effectLst/>
+            </p:spPr>
+            <p:txBody>
+              <a:bodyPr vert="horz" wrap="square" lIns="91440" tIns="45720" rIns="91440" bIns="45720" numCol="1" rtlCol="0" anchor="t" anchorCtr="0" compatLnSpc="1">
+                <a:prstTxWarp prst="textNoShape">
+                  <a:avLst/>
+                </a:prstTxWarp>
+              </a:bodyPr>
+              <a:lstStyle/>
+              <a:p>
+                <a:pPr marL="0" marR="0" indent="0" algn="l" defTabSz="914400" rtl="0" eaLnBrk="1" fontAlgn="base" latinLnBrk="0" hangingPunct="1">
+                  <a:lnSpc>
+                    <a:spcPct val="100000"/>
+                  </a:lnSpc>
+                  <a:spcBef>
+                    <a:spcPct val="0"/>
+                  </a:spcBef>
+                  <a:spcAft>
+                    <a:spcPct val="0"/>
+                  </a:spcAft>
+                  <a:buClrTx/>
+                  <a:buSzTx/>
+                  <a:buFontTx/>
+                  <a:buNone/>
+                  <a:tabLst/>
+                </a:pPr>
+                <a:endParaRPr kumimoji="0" lang="en-GB" sz="1000" b="1" i="0" u="none" strike="noStrike" cap="none" normalizeH="0" baseline="0" smtClean="0">
+                  <a:ln>
+                    <a:noFill/>
+                  </a:ln>
+                  <a:solidFill>
+                    <a:schemeClr val="bg2"/>
+                  </a:solidFill>
+                  <a:effectLst/>
+                  <a:latin typeface="Microsoft Sans Serif" pitchFamily="34" charset="0"/>
+                </a:endParaRPr>
+              </a:p>
+            </p:txBody>
+          </p:sp>
+          <p:sp>
+            <p:nvSpPr>
+              <p:cNvPr id="465" name="Oval 464"/>
+              <p:cNvSpPr/>
+              <p:nvPr/>
+            </p:nvSpPr>
+            <p:spPr bwMode="auto">
+              <a:xfrm>
+                <a:off x="5664449" y="1955597"/>
+                <a:ext cx="205507" cy="198184"/>
+              </a:xfrm>
+              <a:prstGeom prst="ellipse">
+                <a:avLst/>
+              </a:prstGeom>
               <a:solidFill>
-                <a:schemeClr val="bg2"/>
+                <a:srgbClr val="660066"/>
               </a:solidFill>
+              <a:ln w="9525" cap="flat" cmpd="sng" algn="ctr">
+                <a:solidFill>
+                  <a:srgbClr val="000000"/>
+                </a:solidFill>
+                <a:prstDash val="solid"/>
+                <a:round/>
+                <a:headEnd type="none" w="med" len="med"/>
+                <a:tailEnd type="none" w="med" len="med"/>
+              </a:ln>
               <a:effectLst/>
-              <a:latin typeface="Microsoft Sans Serif" pitchFamily="34" charset="0"/>
-            </a:endParaRPr>
-          </a:p>
-        </p:txBody>
-      </p:sp>
+            </p:spPr>
+            <p:txBody>
+              <a:bodyPr vert="horz" wrap="square" lIns="91440" tIns="45720" rIns="91440" bIns="45720" numCol="1" rtlCol="0" anchor="t" anchorCtr="0" compatLnSpc="1">
+                <a:prstTxWarp prst="textNoShape">
+                  <a:avLst/>
+                </a:prstTxWarp>
+              </a:bodyPr>
+              <a:lstStyle/>
+              <a:p>
+                <a:pPr marL="0" marR="0" indent="0" algn="l" defTabSz="914400" rtl="0" eaLnBrk="1" fontAlgn="base" latinLnBrk="0" hangingPunct="1">
+                  <a:lnSpc>
+                    <a:spcPct val="100000"/>
+                  </a:lnSpc>
+                  <a:spcBef>
+                    <a:spcPct val="0"/>
+                  </a:spcBef>
+                  <a:spcAft>
+                    <a:spcPct val="0"/>
+                  </a:spcAft>
+                  <a:buClrTx/>
+                  <a:buSzTx/>
+                  <a:buFontTx/>
+                  <a:buNone/>
+                  <a:tabLst/>
+                </a:pPr>
+                <a:endParaRPr kumimoji="0" lang="en-GB" sz="1000" b="1" i="0" u="none" strike="noStrike" cap="none" normalizeH="0" baseline="0" smtClean="0">
+                  <a:ln>
+                    <a:noFill/>
+                  </a:ln>
+                  <a:solidFill>
+                    <a:schemeClr val="bg2"/>
+                  </a:solidFill>
+                  <a:effectLst/>
+                  <a:latin typeface="Microsoft Sans Serif" pitchFamily="34" charset="0"/>
+                </a:endParaRPr>
+              </a:p>
+            </p:txBody>
+          </p:sp>
+        </p:grpSp>
+        <p:grpSp>
+          <p:nvGrpSpPr>
+            <p:cNvPr id="7" name="Group 6"/>
+            <p:cNvGrpSpPr/>
+            <p:nvPr/>
+          </p:nvGrpSpPr>
+          <p:grpSpPr>
+            <a:xfrm>
+              <a:off x="5749131" y="1670330"/>
+              <a:ext cx="271824" cy="258334"/>
+              <a:chOff x="4939885" y="1567387"/>
+              <a:chExt cx="345116" cy="331580"/>
+            </a:xfrm>
+          </p:grpSpPr>
+          <p:sp>
+            <p:nvSpPr>
+              <p:cNvPr id="467" name="Rounded Rectangle 466"/>
+              <p:cNvSpPr/>
+              <p:nvPr/>
+            </p:nvSpPr>
+            <p:spPr bwMode="auto">
+              <a:xfrm>
+                <a:off x="5095315" y="1568624"/>
+                <a:ext cx="39389" cy="330343"/>
+              </a:xfrm>
+              <a:prstGeom prst="roundRect">
+                <a:avLst/>
+              </a:prstGeom>
+              <a:solidFill>
+                <a:srgbClr val="FFFFFF"/>
+              </a:solidFill>
+              <a:ln w="9525" cap="flat" cmpd="sng" algn="ctr">
+                <a:solidFill>
+                  <a:srgbClr val="000000"/>
+                </a:solidFill>
+                <a:prstDash val="solid"/>
+                <a:round/>
+                <a:headEnd type="none" w="med" len="med"/>
+                <a:tailEnd type="none" w="med" len="med"/>
+              </a:ln>
+              <a:effectLst/>
+            </p:spPr>
+            <p:txBody>
+              <a:bodyPr vert="horz" wrap="square" lIns="91440" tIns="45720" rIns="91440" bIns="45720" numCol="1" rtlCol="0" anchor="t" anchorCtr="0" compatLnSpc="1">
+                <a:prstTxWarp prst="textNoShape">
+                  <a:avLst/>
+                </a:prstTxWarp>
+              </a:bodyPr>
+              <a:lstStyle/>
+              <a:p>
+                <a:pPr marL="0" marR="0" indent="0" algn="l" defTabSz="914400" rtl="0" eaLnBrk="1" fontAlgn="base" latinLnBrk="0" hangingPunct="1">
+                  <a:lnSpc>
+                    <a:spcPct val="100000"/>
+                  </a:lnSpc>
+                  <a:spcBef>
+                    <a:spcPct val="0"/>
+                  </a:spcBef>
+                  <a:spcAft>
+                    <a:spcPct val="0"/>
+                  </a:spcAft>
+                  <a:buClrTx/>
+                  <a:buSzTx/>
+                  <a:buFontTx/>
+                  <a:buNone/>
+                  <a:tabLst/>
+                </a:pPr>
+                <a:endParaRPr kumimoji="0" lang="en-GB" sz="1000" b="1" i="0" u="none" strike="noStrike" cap="none" normalizeH="0" baseline="0" smtClean="0">
+                  <a:ln>
+                    <a:noFill/>
+                  </a:ln>
+                  <a:solidFill>
+                    <a:schemeClr val="bg2"/>
+                  </a:solidFill>
+                  <a:effectLst/>
+                  <a:latin typeface="Microsoft Sans Serif" pitchFamily="34" charset="0"/>
+                </a:endParaRPr>
+              </a:p>
+            </p:txBody>
+          </p:sp>
+          <p:sp>
+            <p:nvSpPr>
+              <p:cNvPr id="468" name="Rounded Rectangle 467"/>
+              <p:cNvSpPr/>
+              <p:nvPr/>
+            </p:nvSpPr>
+            <p:spPr bwMode="auto">
+              <a:xfrm rot="16200000">
+                <a:off x="5093450" y="1560045"/>
+                <a:ext cx="37985" cy="342549"/>
+              </a:xfrm>
+              <a:prstGeom prst="roundRect">
+                <a:avLst/>
+              </a:prstGeom>
+              <a:solidFill>
+                <a:srgbClr val="FFFFFF"/>
+              </a:solidFill>
+              <a:ln w="9525" cap="flat" cmpd="sng" algn="ctr">
+                <a:solidFill>
+                  <a:srgbClr val="000000"/>
+                </a:solidFill>
+                <a:prstDash val="solid"/>
+                <a:round/>
+                <a:headEnd type="none" w="med" len="med"/>
+                <a:tailEnd type="none" w="med" len="med"/>
+              </a:ln>
+              <a:effectLst/>
+            </p:spPr>
+            <p:txBody>
+              <a:bodyPr vert="horz" wrap="square" lIns="91440" tIns="45720" rIns="91440" bIns="45720" numCol="1" rtlCol="0" anchor="t" anchorCtr="0" compatLnSpc="1">
+                <a:prstTxWarp prst="textNoShape">
+                  <a:avLst/>
+                </a:prstTxWarp>
+              </a:bodyPr>
+              <a:lstStyle/>
+              <a:p>
+                <a:pPr marL="0" marR="0" indent="0" algn="l" defTabSz="914400" rtl="0" eaLnBrk="1" fontAlgn="base" latinLnBrk="0" hangingPunct="1">
+                  <a:lnSpc>
+                    <a:spcPct val="100000"/>
+                  </a:lnSpc>
+                  <a:spcBef>
+                    <a:spcPct val="0"/>
+                  </a:spcBef>
+                  <a:spcAft>
+                    <a:spcPct val="0"/>
+                  </a:spcAft>
+                  <a:buClrTx/>
+                  <a:buSzTx/>
+                  <a:buFontTx/>
+                  <a:buNone/>
+                  <a:tabLst/>
+                </a:pPr>
+                <a:endParaRPr kumimoji="0" lang="en-GB" sz="1000" b="1" i="0" u="none" strike="noStrike" cap="none" normalizeH="0" baseline="0" smtClean="0">
+                  <a:ln>
+                    <a:noFill/>
+                  </a:ln>
+                  <a:solidFill>
+                    <a:schemeClr val="bg2"/>
+                  </a:solidFill>
+                  <a:effectLst/>
+                  <a:latin typeface="Microsoft Sans Serif" pitchFamily="34" charset="0"/>
+                </a:endParaRPr>
+              </a:p>
+            </p:txBody>
+          </p:sp>
+          <p:sp>
+            <p:nvSpPr>
+              <p:cNvPr id="469" name="Rounded Rectangle 468"/>
+              <p:cNvSpPr/>
+              <p:nvPr/>
+            </p:nvSpPr>
+            <p:spPr bwMode="auto">
+              <a:xfrm rot="18000000">
+                <a:off x="5094734" y="1560377"/>
+                <a:ext cx="37985" cy="342549"/>
+              </a:xfrm>
+              <a:prstGeom prst="roundRect">
+                <a:avLst/>
+              </a:prstGeom>
+              <a:solidFill>
+                <a:srgbClr val="FFFFFF"/>
+              </a:solidFill>
+              <a:ln w="9525" cap="flat" cmpd="sng" algn="ctr">
+                <a:solidFill>
+                  <a:srgbClr val="000000"/>
+                </a:solidFill>
+                <a:prstDash val="solid"/>
+                <a:round/>
+                <a:headEnd type="none" w="med" len="med"/>
+                <a:tailEnd type="none" w="med" len="med"/>
+              </a:ln>
+              <a:effectLst/>
+            </p:spPr>
+            <p:txBody>
+              <a:bodyPr vert="horz" wrap="square" lIns="91440" tIns="45720" rIns="91440" bIns="45720" numCol="1" rtlCol="0" anchor="t" anchorCtr="0" compatLnSpc="1">
+                <a:prstTxWarp prst="textNoShape">
+                  <a:avLst/>
+                </a:prstTxWarp>
+              </a:bodyPr>
+              <a:lstStyle/>
+              <a:p>
+                <a:pPr marL="0" marR="0" indent="0" algn="l" defTabSz="914400" rtl="0" eaLnBrk="1" fontAlgn="base" latinLnBrk="0" hangingPunct="1">
+                  <a:lnSpc>
+                    <a:spcPct val="100000"/>
+                  </a:lnSpc>
+                  <a:spcBef>
+                    <a:spcPct val="0"/>
+                  </a:spcBef>
+                  <a:spcAft>
+                    <a:spcPct val="0"/>
+                  </a:spcAft>
+                  <a:buClrTx/>
+                  <a:buSzTx/>
+                  <a:buFontTx/>
+                  <a:buNone/>
+                  <a:tabLst/>
+                </a:pPr>
+                <a:endParaRPr kumimoji="0" lang="en-GB" sz="1000" b="1" i="0" u="none" strike="noStrike" cap="none" normalizeH="0" baseline="0" smtClean="0">
+                  <a:ln>
+                    <a:noFill/>
+                  </a:ln>
+                  <a:solidFill>
+                    <a:schemeClr val="bg2"/>
+                  </a:solidFill>
+                  <a:effectLst/>
+                  <a:latin typeface="Microsoft Sans Serif" pitchFamily="34" charset="0"/>
+                </a:endParaRPr>
+              </a:p>
+            </p:txBody>
+          </p:sp>
+          <p:sp>
+            <p:nvSpPr>
+              <p:cNvPr id="470" name="Rounded Rectangle 469"/>
+              <p:cNvSpPr/>
+              <p:nvPr/>
+            </p:nvSpPr>
+            <p:spPr bwMode="auto">
+              <a:xfrm rot="19800000">
+                <a:off x="5094972" y="1567387"/>
+                <a:ext cx="39389" cy="330343"/>
+              </a:xfrm>
+              <a:prstGeom prst="roundRect">
+                <a:avLst/>
+              </a:prstGeom>
+              <a:solidFill>
+                <a:srgbClr val="FFFFFF"/>
+              </a:solidFill>
+              <a:ln w="9525" cap="flat" cmpd="sng" algn="ctr">
+                <a:solidFill>
+                  <a:srgbClr val="000000"/>
+                </a:solidFill>
+                <a:prstDash val="solid"/>
+                <a:round/>
+                <a:headEnd type="none" w="med" len="med"/>
+                <a:tailEnd type="none" w="med" len="med"/>
+              </a:ln>
+              <a:effectLst/>
+            </p:spPr>
+            <p:txBody>
+              <a:bodyPr vert="horz" wrap="square" lIns="91440" tIns="45720" rIns="91440" bIns="45720" numCol="1" rtlCol="0" anchor="t" anchorCtr="0" compatLnSpc="1">
+                <a:prstTxWarp prst="textNoShape">
+                  <a:avLst/>
+                </a:prstTxWarp>
+              </a:bodyPr>
+              <a:lstStyle/>
+              <a:p>
+                <a:pPr marL="0" marR="0" indent="0" algn="l" defTabSz="914400" rtl="0" eaLnBrk="1" fontAlgn="base" latinLnBrk="0" hangingPunct="1">
+                  <a:lnSpc>
+                    <a:spcPct val="100000"/>
+                  </a:lnSpc>
+                  <a:spcBef>
+                    <a:spcPct val="0"/>
+                  </a:spcBef>
+                  <a:spcAft>
+                    <a:spcPct val="0"/>
+                  </a:spcAft>
+                  <a:buClrTx/>
+                  <a:buSzTx/>
+                  <a:buFontTx/>
+                  <a:buNone/>
+                  <a:tabLst/>
+                </a:pPr>
+                <a:endParaRPr kumimoji="0" lang="en-GB" sz="1000" b="1" i="0" u="none" strike="noStrike" cap="none" normalizeH="0" baseline="0" smtClean="0">
+                  <a:ln>
+                    <a:noFill/>
+                  </a:ln>
+                  <a:solidFill>
+                    <a:schemeClr val="bg2"/>
+                  </a:solidFill>
+                  <a:effectLst/>
+                  <a:latin typeface="Microsoft Sans Serif" pitchFamily="34" charset="0"/>
+                </a:endParaRPr>
+              </a:p>
+            </p:txBody>
+          </p:sp>
+          <p:sp>
+            <p:nvSpPr>
+              <p:cNvPr id="471" name="Rounded Rectangle 470"/>
+              <p:cNvSpPr/>
+              <p:nvPr/>
+            </p:nvSpPr>
+            <p:spPr bwMode="auto">
+              <a:xfrm rot="14400000">
+                <a:off x="5092167" y="1560377"/>
+                <a:ext cx="37985" cy="342549"/>
+              </a:xfrm>
+              <a:prstGeom prst="roundRect">
+                <a:avLst/>
+              </a:prstGeom>
+              <a:solidFill>
+                <a:srgbClr val="FFFFFF"/>
+              </a:solidFill>
+              <a:ln w="9525" cap="flat" cmpd="sng" algn="ctr">
+                <a:solidFill>
+                  <a:srgbClr val="000000"/>
+                </a:solidFill>
+                <a:prstDash val="solid"/>
+                <a:round/>
+                <a:headEnd type="none" w="med" len="med"/>
+                <a:tailEnd type="none" w="med" len="med"/>
+              </a:ln>
+              <a:effectLst/>
+            </p:spPr>
+            <p:txBody>
+              <a:bodyPr vert="horz" wrap="square" lIns="91440" tIns="45720" rIns="91440" bIns="45720" numCol="1" rtlCol="0" anchor="t" anchorCtr="0" compatLnSpc="1">
+                <a:prstTxWarp prst="textNoShape">
+                  <a:avLst/>
+                </a:prstTxWarp>
+              </a:bodyPr>
+              <a:lstStyle/>
+              <a:p>
+                <a:pPr marL="0" marR="0" indent="0" algn="l" defTabSz="914400" rtl="0" eaLnBrk="1" fontAlgn="base" latinLnBrk="0" hangingPunct="1">
+                  <a:lnSpc>
+                    <a:spcPct val="100000"/>
+                  </a:lnSpc>
+                  <a:spcBef>
+                    <a:spcPct val="0"/>
+                  </a:spcBef>
+                  <a:spcAft>
+                    <a:spcPct val="0"/>
+                  </a:spcAft>
+                  <a:buClrTx/>
+                  <a:buSzTx/>
+                  <a:buFontTx/>
+                  <a:buNone/>
+                  <a:tabLst/>
+                </a:pPr>
+                <a:endParaRPr kumimoji="0" lang="en-GB" sz="1000" b="1" i="0" u="none" strike="noStrike" cap="none" normalizeH="0" baseline="0" smtClean="0">
+                  <a:ln>
+                    <a:noFill/>
+                  </a:ln>
+                  <a:solidFill>
+                    <a:schemeClr val="bg2"/>
+                  </a:solidFill>
+                  <a:effectLst/>
+                  <a:latin typeface="Microsoft Sans Serif" pitchFamily="34" charset="0"/>
+                </a:endParaRPr>
+              </a:p>
+            </p:txBody>
+          </p:sp>
+          <p:sp>
+            <p:nvSpPr>
+              <p:cNvPr id="472" name="Rounded Rectangle 471"/>
+              <p:cNvSpPr/>
+              <p:nvPr/>
+            </p:nvSpPr>
+            <p:spPr bwMode="auto">
+              <a:xfrm rot="12600000">
+                <a:off x="5090525" y="1567387"/>
+                <a:ext cx="39389" cy="330343"/>
+              </a:xfrm>
+              <a:prstGeom prst="roundRect">
+                <a:avLst/>
+              </a:prstGeom>
+              <a:solidFill>
+                <a:srgbClr val="FFFFFF"/>
+              </a:solidFill>
+              <a:ln w="9525" cap="flat" cmpd="sng" algn="ctr">
+                <a:solidFill>
+                  <a:srgbClr val="000000"/>
+                </a:solidFill>
+                <a:prstDash val="solid"/>
+                <a:round/>
+                <a:headEnd type="none" w="med" len="med"/>
+                <a:tailEnd type="none" w="med" len="med"/>
+              </a:ln>
+              <a:effectLst/>
+            </p:spPr>
+            <p:txBody>
+              <a:bodyPr vert="horz" wrap="square" lIns="91440" tIns="45720" rIns="91440" bIns="45720" numCol="1" rtlCol="0" anchor="t" anchorCtr="0" compatLnSpc="1">
+                <a:prstTxWarp prst="textNoShape">
+                  <a:avLst/>
+                </a:prstTxWarp>
+              </a:bodyPr>
+              <a:lstStyle/>
+              <a:p>
+                <a:pPr marL="0" marR="0" indent="0" algn="l" defTabSz="914400" rtl="0" eaLnBrk="1" fontAlgn="base" latinLnBrk="0" hangingPunct="1">
+                  <a:lnSpc>
+                    <a:spcPct val="100000"/>
+                  </a:lnSpc>
+                  <a:spcBef>
+                    <a:spcPct val="0"/>
+                  </a:spcBef>
+                  <a:spcAft>
+                    <a:spcPct val="0"/>
+                  </a:spcAft>
+                  <a:buClrTx/>
+                  <a:buSzTx/>
+                  <a:buFontTx/>
+                  <a:buNone/>
+                  <a:tabLst/>
+                </a:pPr>
+                <a:endParaRPr kumimoji="0" lang="en-GB" sz="1000" b="1" i="0" u="none" strike="noStrike" cap="none" normalizeH="0" baseline="0" smtClean="0">
+                  <a:ln>
+                    <a:noFill/>
+                  </a:ln>
+                  <a:solidFill>
+                    <a:schemeClr val="bg2"/>
+                  </a:solidFill>
+                  <a:effectLst/>
+                  <a:latin typeface="Microsoft Sans Serif" pitchFamily="34" charset="0"/>
+                </a:endParaRPr>
+              </a:p>
+            </p:txBody>
+          </p:sp>
+          <p:sp>
+            <p:nvSpPr>
+              <p:cNvPr id="473" name="Oval 472"/>
+              <p:cNvSpPr/>
+              <p:nvPr/>
+            </p:nvSpPr>
+            <p:spPr bwMode="auto">
+              <a:xfrm>
+                <a:off x="4970614" y="1594375"/>
+                <a:ext cx="287397" cy="276997"/>
+              </a:xfrm>
+              <a:prstGeom prst="ellipse">
+                <a:avLst/>
+              </a:prstGeom>
+              <a:solidFill>
+                <a:schemeClr val="bg1"/>
+              </a:solidFill>
+              <a:ln w="9525" cap="flat" cmpd="sng" algn="ctr">
+                <a:solidFill>
+                  <a:srgbClr val="000000"/>
+                </a:solidFill>
+                <a:prstDash val="solid"/>
+                <a:round/>
+                <a:headEnd type="none" w="med" len="med"/>
+                <a:tailEnd type="none" w="med" len="med"/>
+              </a:ln>
+              <a:effectLst/>
+            </p:spPr>
+            <p:txBody>
+              <a:bodyPr vert="horz" wrap="square" lIns="91440" tIns="45720" rIns="91440" bIns="45720" numCol="1" rtlCol="0" anchor="t" anchorCtr="0" compatLnSpc="1">
+                <a:prstTxWarp prst="textNoShape">
+                  <a:avLst/>
+                </a:prstTxWarp>
+              </a:bodyPr>
+              <a:lstStyle/>
+              <a:p>
+                <a:pPr marL="0" marR="0" indent="0" algn="l" defTabSz="914400" rtl="0" eaLnBrk="1" fontAlgn="base" latinLnBrk="0" hangingPunct="1">
+                  <a:lnSpc>
+                    <a:spcPct val="100000"/>
+                  </a:lnSpc>
+                  <a:spcBef>
+                    <a:spcPct val="0"/>
+                  </a:spcBef>
+                  <a:spcAft>
+                    <a:spcPct val="0"/>
+                  </a:spcAft>
+                  <a:buClrTx/>
+                  <a:buSzTx/>
+                  <a:buFontTx/>
+                  <a:buNone/>
+                  <a:tabLst/>
+                </a:pPr>
+                <a:endParaRPr kumimoji="0" lang="en-GB" sz="1000" b="1" i="0" u="none" strike="noStrike" cap="none" normalizeH="0" baseline="0" smtClean="0">
+                  <a:ln>
+                    <a:noFill/>
+                  </a:ln>
+                  <a:solidFill>
+                    <a:schemeClr val="bg2"/>
+                  </a:solidFill>
+                  <a:effectLst/>
+                  <a:latin typeface="Microsoft Sans Serif" pitchFamily="34" charset="0"/>
+                </a:endParaRPr>
+              </a:p>
+            </p:txBody>
+          </p:sp>
+          <p:sp>
+            <p:nvSpPr>
+              <p:cNvPr id="474" name="Oval 473"/>
+              <p:cNvSpPr/>
+              <p:nvPr/>
+            </p:nvSpPr>
+            <p:spPr bwMode="auto">
+              <a:xfrm>
+                <a:off x="5012186" y="1634693"/>
+                <a:ext cx="205507" cy="198184"/>
+              </a:xfrm>
+              <a:prstGeom prst="ellipse">
+                <a:avLst/>
+              </a:prstGeom>
+              <a:solidFill>
+                <a:srgbClr val="0000FF"/>
+              </a:solidFill>
+              <a:ln w="9525" cap="flat" cmpd="sng" algn="ctr">
+                <a:solidFill>
+                  <a:srgbClr val="000000"/>
+                </a:solidFill>
+                <a:prstDash val="solid"/>
+                <a:round/>
+                <a:headEnd type="none" w="med" len="med"/>
+                <a:tailEnd type="none" w="med" len="med"/>
+              </a:ln>
+              <a:effectLst/>
+            </p:spPr>
+            <p:txBody>
+              <a:bodyPr vert="horz" wrap="square" lIns="91440" tIns="45720" rIns="91440" bIns="45720" numCol="1" rtlCol="0" anchor="t" anchorCtr="0" compatLnSpc="1">
+                <a:prstTxWarp prst="textNoShape">
+                  <a:avLst/>
+                </a:prstTxWarp>
+              </a:bodyPr>
+              <a:lstStyle/>
+              <a:p>
+                <a:pPr marL="0" marR="0" indent="0" algn="l" defTabSz="914400" rtl="0" eaLnBrk="1" fontAlgn="base" latinLnBrk="0" hangingPunct="1">
+                  <a:lnSpc>
+                    <a:spcPct val="100000"/>
+                  </a:lnSpc>
+                  <a:spcBef>
+                    <a:spcPct val="0"/>
+                  </a:spcBef>
+                  <a:spcAft>
+                    <a:spcPct val="0"/>
+                  </a:spcAft>
+                  <a:buClrTx/>
+                  <a:buSzTx/>
+                  <a:buFontTx/>
+                  <a:buNone/>
+                  <a:tabLst/>
+                </a:pPr>
+                <a:endParaRPr kumimoji="0" lang="en-GB" sz="1000" b="1" i="0" u="none" strike="noStrike" cap="none" normalizeH="0" baseline="0" smtClean="0">
+                  <a:ln>
+                    <a:noFill/>
+                  </a:ln>
+                  <a:solidFill>
+                    <a:schemeClr val="bg2"/>
+                  </a:solidFill>
+                  <a:effectLst/>
+                  <a:latin typeface="Microsoft Sans Serif" pitchFamily="34" charset="0"/>
+                </a:endParaRPr>
+              </a:p>
+            </p:txBody>
+          </p:sp>
+        </p:grpSp>
+        <p:grpSp>
+          <p:nvGrpSpPr>
+            <p:cNvPr id="339" name="Group 338"/>
+            <p:cNvGrpSpPr/>
+            <p:nvPr/>
+          </p:nvGrpSpPr>
+          <p:grpSpPr>
+            <a:xfrm>
+              <a:off x="5445224" y="1518725"/>
+              <a:ext cx="345115" cy="331581"/>
+              <a:chOff x="5445224" y="1525075"/>
+              <a:chExt cx="345115" cy="331581"/>
+            </a:xfrm>
+          </p:grpSpPr>
+          <p:sp>
+            <p:nvSpPr>
+              <p:cNvPr id="338" name="Rounded Rectangle 337"/>
+              <p:cNvSpPr/>
+              <p:nvPr/>
+            </p:nvSpPr>
+            <p:spPr bwMode="auto">
+              <a:xfrm>
+                <a:off x="5600654" y="1526313"/>
+                <a:ext cx="39389" cy="330343"/>
+              </a:xfrm>
+              <a:prstGeom prst="roundRect">
+                <a:avLst/>
+              </a:prstGeom>
+              <a:solidFill>
+                <a:srgbClr val="FFFFFF"/>
+              </a:solidFill>
+              <a:ln w="9525" cap="flat" cmpd="sng" algn="ctr">
+                <a:solidFill>
+                  <a:srgbClr val="000000"/>
+                </a:solidFill>
+                <a:prstDash val="solid"/>
+                <a:round/>
+                <a:headEnd type="none" w="med" len="med"/>
+                <a:tailEnd type="none" w="med" len="med"/>
+              </a:ln>
+              <a:effectLst/>
+            </p:spPr>
+            <p:txBody>
+              <a:bodyPr vert="horz" wrap="square" lIns="91440" tIns="45720" rIns="91440" bIns="45720" numCol="1" rtlCol="0" anchor="t" anchorCtr="0" compatLnSpc="1">
+                <a:prstTxWarp prst="textNoShape">
+                  <a:avLst/>
+                </a:prstTxWarp>
+              </a:bodyPr>
+              <a:lstStyle/>
+              <a:p>
+                <a:pPr marL="0" marR="0" indent="0" algn="l" defTabSz="914400" rtl="0" eaLnBrk="1" fontAlgn="base" latinLnBrk="0" hangingPunct="1">
+                  <a:lnSpc>
+                    <a:spcPct val="100000"/>
+                  </a:lnSpc>
+                  <a:spcBef>
+                    <a:spcPct val="0"/>
+                  </a:spcBef>
+                  <a:spcAft>
+                    <a:spcPct val="0"/>
+                  </a:spcAft>
+                  <a:buClrTx/>
+                  <a:buSzTx/>
+                  <a:buFontTx/>
+                  <a:buNone/>
+                  <a:tabLst/>
+                </a:pPr>
+                <a:endParaRPr kumimoji="0" lang="en-GB" sz="1000" b="1" i="0" u="none" strike="noStrike" cap="none" normalizeH="0" baseline="0" smtClean="0">
+                  <a:ln>
+                    <a:noFill/>
+                  </a:ln>
+                  <a:solidFill>
+                    <a:schemeClr val="bg2"/>
+                  </a:solidFill>
+                  <a:effectLst/>
+                  <a:latin typeface="Microsoft Sans Serif" pitchFamily="34" charset="0"/>
+                </a:endParaRPr>
+              </a:p>
+            </p:txBody>
+          </p:sp>
+          <p:sp>
+            <p:nvSpPr>
+              <p:cNvPr id="448" name="Rounded Rectangle 447"/>
+              <p:cNvSpPr/>
+              <p:nvPr/>
+            </p:nvSpPr>
+            <p:spPr bwMode="auto">
+              <a:xfrm rot="16200000">
+                <a:off x="5598789" y="1517734"/>
+                <a:ext cx="37985" cy="342549"/>
+              </a:xfrm>
+              <a:prstGeom prst="roundRect">
+                <a:avLst/>
+              </a:prstGeom>
+              <a:solidFill>
+                <a:srgbClr val="FFFFFF"/>
+              </a:solidFill>
+              <a:ln w="9525" cap="flat" cmpd="sng" algn="ctr">
+                <a:solidFill>
+                  <a:srgbClr val="000000"/>
+                </a:solidFill>
+                <a:prstDash val="solid"/>
+                <a:round/>
+                <a:headEnd type="none" w="med" len="med"/>
+                <a:tailEnd type="none" w="med" len="med"/>
+              </a:ln>
+              <a:effectLst/>
+            </p:spPr>
+            <p:txBody>
+              <a:bodyPr vert="horz" wrap="square" lIns="91440" tIns="45720" rIns="91440" bIns="45720" numCol="1" rtlCol="0" anchor="t" anchorCtr="0" compatLnSpc="1">
+                <a:prstTxWarp prst="textNoShape">
+                  <a:avLst/>
+                </a:prstTxWarp>
+              </a:bodyPr>
+              <a:lstStyle/>
+              <a:p>
+                <a:pPr marL="0" marR="0" indent="0" algn="l" defTabSz="914400" rtl="0" eaLnBrk="1" fontAlgn="base" latinLnBrk="0" hangingPunct="1">
+                  <a:lnSpc>
+                    <a:spcPct val="100000"/>
+                  </a:lnSpc>
+                  <a:spcBef>
+                    <a:spcPct val="0"/>
+                  </a:spcBef>
+                  <a:spcAft>
+                    <a:spcPct val="0"/>
+                  </a:spcAft>
+                  <a:buClrTx/>
+                  <a:buSzTx/>
+                  <a:buFontTx/>
+                  <a:buNone/>
+                  <a:tabLst/>
+                </a:pPr>
+                <a:endParaRPr kumimoji="0" lang="en-GB" sz="1000" b="1" i="0" u="none" strike="noStrike" cap="none" normalizeH="0" baseline="0" smtClean="0">
+                  <a:ln>
+                    <a:noFill/>
+                  </a:ln>
+                  <a:solidFill>
+                    <a:schemeClr val="bg2"/>
+                  </a:solidFill>
+                  <a:effectLst/>
+                  <a:latin typeface="Microsoft Sans Serif" pitchFamily="34" charset="0"/>
+                </a:endParaRPr>
+              </a:p>
+            </p:txBody>
+          </p:sp>
+          <p:sp>
+            <p:nvSpPr>
+              <p:cNvPr id="449" name="Rounded Rectangle 448"/>
+              <p:cNvSpPr/>
+              <p:nvPr/>
+            </p:nvSpPr>
+            <p:spPr bwMode="auto">
+              <a:xfrm rot="18000000">
+                <a:off x="5600072" y="1518065"/>
+                <a:ext cx="37985" cy="342549"/>
+              </a:xfrm>
+              <a:prstGeom prst="roundRect">
+                <a:avLst/>
+              </a:prstGeom>
+              <a:solidFill>
+                <a:srgbClr val="FFFFFF"/>
+              </a:solidFill>
+              <a:ln w="9525" cap="flat" cmpd="sng" algn="ctr">
+                <a:solidFill>
+                  <a:srgbClr val="000000"/>
+                </a:solidFill>
+                <a:prstDash val="solid"/>
+                <a:round/>
+                <a:headEnd type="none" w="med" len="med"/>
+                <a:tailEnd type="none" w="med" len="med"/>
+              </a:ln>
+              <a:effectLst/>
+            </p:spPr>
+            <p:txBody>
+              <a:bodyPr vert="horz" wrap="square" lIns="91440" tIns="45720" rIns="91440" bIns="45720" numCol="1" rtlCol="0" anchor="t" anchorCtr="0" compatLnSpc="1">
+                <a:prstTxWarp prst="textNoShape">
+                  <a:avLst/>
+                </a:prstTxWarp>
+              </a:bodyPr>
+              <a:lstStyle/>
+              <a:p>
+                <a:pPr marL="0" marR="0" indent="0" algn="l" defTabSz="914400" rtl="0" eaLnBrk="1" fontAlgn="base" latinLnBrk="0" hangingPunct="1">
+                  <a:lnSpc>
+                    <a:spcPct val="100000"/>
+                  </a:lnSpc>
+                  <a:spcBef>
+                    <a:spcPct val="0"/>
+                  </a:spcBef>
+                  <a:spcAft>
+                    <a:spcPct val="0"/>
+                  </a:spcAft>
+                  <a:buClrTx/>
+                  <a:buSzTx/>
+                  <a:buFontTx/>
+                  <a:buNone/>
+                  <a:tabLst/>
+                </a:pPr>
+                <a:endParaRPr kumimoji="0" lang="en-GB" sz="1000" b="1" i="0" u="none" strike="noStrike" cap="none" normalizeH="0" baseline="0" smtClean="0">
+                  <a:ln>
+                    <a:noFill/>
+                  </a:ln>
+                  <a:solidFill>
+                    <a:schemeClr val="bg2"/>
+                  </a:solidFill>
+                  <a:effectLst/>
+                  <a:latin typeface="Microsoft Sans Serif" pitchFamily="34" charset="0"/>
+                </a:endParaRPr>
+              </a:p>
+            </p:txBody>
+          </p:sp>
+          <p:sp>
+            <p:nvSpPr>
+              <p:cNvPr id="450" name="Rounded Rectangle 449"/>
+              <p:cNvSpPr/>
+              <p:nvPr/>
+            </p:nvSpPr>
+            <p:spPr bwMode="auto">
+              <a:xfrm rot="19800000">
+                <a:off x="5600311" y="1525075"/>
+                <a:ext cx="39389" cy="330343"/>
+              </a:xfrm>
+              <a:prstGeom prst="roundRect">
+                <a:avLst/>
+              </a:prstGeom>
+              <a:solidFill>
+                <a:srgbClr val="FFFFFF"/>
+              </a:solidFill>
+              <a:ln w="9525" cap="flat" cmpd="sng" algn="ctr">
+                <a:solidFill>
+                  <a:srgbClr val="000000"/>
+                </a:solidFill>
+                <a:prstDash val="solid"/>
+                <a:round/>
+                <a:headEnd type="none" w="med" len="med"/>
+                <a:tailEnd type="none" w="med" len="med"/>
+              </a:ln>
+              <a:effectLst/>
+            </p:spPr>
+            <p:txBody>
+              <a:bodyPr vert="horz" wrap="square" lIns="91440" tIns="45720" rIns="91440" bIns="45720" numCol="1" rtlCol="0" anchor="t" anchorCtr="0" compatLnSpc="1">
+                <a:prstTxWarp prst="textNoShape">
+                  <a:avLst/>
+                </a:prstTxWarp>
+              </a:bodyPr>
+              <a:lstStyle/>
+              <a:p>
+                <a:pPr marL="0" marR="0" indent="0" algn="l" defTabSz="914400" rtl="0" eaLnBrk="1" fontAlgn="base" latinLnBrk="0" hangingPunct="1">
+                  <a:lnSpc>
+                    <a:spcPct val="100000"/>
+                  </a:lnSpc>
+                  <a:spcBef>
+                    <a:spcPct val="0"/>
+                  </a:spcBef>
+                  <a:spcAft>
+                    <a:spcPct val="0"/>
+                  </a:spcAft>
+                  <a:buClrTx/>
+                  <a:buSzTx/>
+                  <a:buFontTx/>
+                  <a:buNone/>
+                  <a:tabLst/>
+                </a:pPr>
+                <a:endParaRPr kumimoji="0" lang="en-GB" sz="1000" b="1" i="0" u="none" strike="noStrike" cap="none" normalizeH="0" baseline="0" smtClean="0">
+                  <a:ln>
+                    <a:noFill/>
+                  </a:ln>
+                  <a:solidFill>
+                    <a:schemeClr val="bg2"/>
+                  </a:solidFill>
+                  <a:effectLst/>
+                  <a:latin typeface="Microsoft Sans Serif" pitchFamily="34" charset="0"/>
+                </a:endParaRPr>
+              </a:p>
+            </p:txBody>
+          </p:sp>
+          <p:sp>
+            <p:nvSpPr>
+              <p:cNvPr id="451" name="Rounded Rectangle 450"/>
+              <p:cNvSpPr/>
+              <p:nvPr/>
+            </p:nvSpPr>
+            <p:spPr bwMode="auto">
+              <a:xfrm rot="14400000">
+                <a:off x="5597506" y="1518065"/>
+                <a:ext cx="37985" cy="342549"/>
+              </a:xfrm>
+              <a:prstGeom prst="roundRect">
+                <a:avLst/>
+              </a:prstGeom>
+              <a:solidFill>
+                <a:srgbClr val="FFFFFF"/>
+              </a:solidFill>
+              <a:ln w="9525" cap="flat" cmpd="sng" algn="ctr">
+                <a:solidFill>
+                  <a:srgbClr val="000000"/>
+                </a:solidFill>
+                <a:prstDash val="solid"/>
+                <a:round/>
+                <a:headEnd type="none" w="med" len="med"/>
+                <a:tailEnd type="none" w="med" len="med"/>
+              </a:ln>
+              <a:effectLst/>
+            </p:spPr>
+            <p:txBody>
+              <a:bodyPr vert="horz" wrap="square" lIns="91440" tIns="45720" rIns="91440" bIns="45720" numCol="1" rtlCol="0" anchor="t" anchorCtr="0" compatLnSpc="1">
+                <a:prstTxWarp prst="textNoShape">
+                  <a:avLst/>
+                </a:prstTxWarp>
+              </a:bodyPr>
+              <a:lstStyle/>
+              <a:p>
+                <a:pPr marL="0" marR="0" indent="0" algn="l" defTabSz="914400" rtl="0" eaLnBrk="1" fontAlgn="base" latinLnBrk="0" hangingPunct="1">
+                  <a:lnSpc>
+                    <a:spcPct val="100000"/>
+                  </a:lnSpc>
+                  <a:spcBef>
+                    <a:spcPct val="0"/>
+                  </a:spcBef>
+                  <a:spcAft>
+                    <a:spcPct val="0"/>
+                  </a:spcAft>
+                  <a:buClrTx/>
+                  <a:buSzTx/>
+                  <a:buFontTx/>
+                  <a:buNone/>
+                  <a:tabLst/>
+                </a:pPr>
+                <a:endParaRPr kumimoji="0" lang="en-GB" sz="1000" b="1" i="0" u="none" strike="noStrike" cap="none" normalizeH="0" baseline="0" smtClean="0">
+                  <a:ln>
+                    <a:noFill/>
+                  </a:ln>
+                  <a:solidFill>
+                    <a:schemeClr val="bg2"/>
+                  </a:solidFill>
+                  <a:effectLst/>
+                  <a:latin typeface="Microsoft Sans Serif" pitchFamily="34" charset="0"/>
+                </a:endParaRPr>
+              </a:p>
+            </p:txBody>
+          </p:sp>
+          <p:sp>
+            <p:nvSpPr>
+              <p:cNvPr id="453" name="Rounded Rectangle 452"/>
+              <p:cNvSpPr/>
+              <p:nvPr/>
+            </p:nvSpPr>
+            <p:spPr bwMode="auto">
+              <a:xfrm rot="12600000">
+                <a:off x="5595864" y="1525075"/>
+                <a:ext cx="39389" cy="330343"/>
+              </a:xfrm>
+              <a:prstGeom prst="roundRect">
+                <a:avLst/>
+              </a:prstGeom>
+              <a:solidFill>
+                <a:srgbClr val="FFFFFF"/>
+              </a:solidFill>
+              <a:ln w="9525" cap="flat" cmpd="sng" algn="ctr">
+                <a:solidFill>
+                  <a:srgbClr val="000000"/>
+                </a:solidFill>
+                <a:prstDash val="solid"/>
+                <a:round/>
+                <a:headEnd type="none" w="med" len="med"/>
+                <a:tailEnd type="none" w="med" len="med"/>
+              </a:ln>
+              <a:effectLst/>
+            </p:spPr>
+            <p:txBody>
+              <a:bodyPr vert="horz" wrap="square" lIns="91440" tIns="45720" rIns="91440" bIns="45720" numCol="1" rtlCol="0" anchor="t" anchorCtr="0" compatLnSpc="1">
+                <a:prstTxWarp prst="textNoShape">
+                  <a:avLst/>
+                </a:prstTxWarp>
+              </a:bodyPr>
+              <a:lstStyle/>
+              <a:p>
+                <a:pPr marL="0" marR="0" indent="0" algn="l" defTabSz="914400" rtl="0" eaLnBrk="1" fontAlgn="base" latinLnBrk="0" hangingPunct="1">
+                  <a:lnSpc>
+                    <a:spcPct val="100000"/>
+                  </a:lnSpc>
+                  <a:spcBef>
+                    <a:spcPct val="0"/>
+                  </a:spcBef>
+                  <a:spcAft>
+                    <a:spcPct val="0"/>
+                  </a:spcAft>
+                  <a:buClrTx/>
+                  <a:buSzTx/>
+                  <a:buFontTx/>
+                  <a:buNone/>
+                  <a:tabLst/>
+                </a:pPr>
+                <a:endParaRPr kumimoji="0" lang="en-GB" sz="1000" b="1" i="0" u="none" strike="noStrike" cap="none" normalizeH="0" baseline="0" smtClean="0">
+                  <a:ln>
+                    <a:noFill/>
+                  </a:ln>
+                  <a:solidFill>
+                    <a:schemeClr val="bg2"/>
+                  </a:solidFill>
+                  <a:effectLst/>
+                  <a:latin typeface="Microsoft Sans Serif" pitchFamily="34" charset="0"/>
+                </a:endParaRPr>
+              </a:p>
+            </p:txBody>
+          </p:sp>
+          <p:sp>
+            <p:nvSpPr>
+              <p:cNvPr id="504" name="Oval 503"/>
+              <p:cNvSpPr/>
+              <p:nvPr/>
+            </p:nvSpPr>
+            <p:spPr bwMode="auto">
+              <a:xfrm>
+                <a:off x="5477066" y="1548187"/>
+                <a:ext cx="287397" cy="276997"/>
+              </a:xfrm>
+              <a:prstGeom prst="ellipse">
+                <a:avLst/>
+              </a:prstGeom>
+              <a:solidFill>
+                <a:srgbClr val="FFFFFF"/>
+              </a:solidFill>
+              <a:ln w="9525" cap="flat" cmpd="sng" algn="ctr">
+                <a:solidFill>
+                  <a:srgbClr val="000000"/>
+                </a:solidFill>
+                <a:prstDash val="solid"/>
+                <a:round/>
+                <a:headEnd type="none" w="med" len="med"/>
+                <a:tailEnd type="none" w="med" len="med"/>
+              </a:ln>
+              <a:effectLst/>
+            </p:spPr>
+            <p:txBody>
+              <a:bodyPr vert="horz" wrap="square" lIns="91440" tIns="45720" rIns="91440" bIns="45720" numCol="1" rtlCol="0" anchor="t" anchorCtr="0" compatLnSpc="1">
+                <a:prstTxWarp prst="textNoShape">
+                  <a:avLst/>
+                </a:prstTxWarp>
+              </a:bodyPr>
+              <a:lstStyle/>
+              <a:p>
+                <a:pPr marL="0" marR="0" indent="0" algn="l" defTabSz="914400" rtl="0" eaLnBrk="1" fontAlgn="base" latinLnBrk="0" hangingPunct="1">
+                  <a:lnSpc>
+                    <a:spcPct val="100000"/>
+                  </a:lnSpc>
+                  <a:spcBef>
+                    <a:spcPct val="0"/>
+                  </a:spcBef>
+                  <a:spcAft>
+                    <a:spcPct val="0"/>
+                  </a:spcAft>
+                  <a:buClrTx/>
+                  <a:buSzTx/>
+                  <a:buFontTx/>
+                  <a:buNone/>
+                  <a:tabLst/>
+                </a:pPr>
+                <a:endParaRPr kumimoji="0" lang="en-GB" sz="1000" b="1" i="0" u="none" strike="noStrike" cap="none" normalizeH="0" baseline="0" smtClean="0">
+                  <a:ln>
+                    <a:noFill/>
+                  </a:ln>
+                  <a:solidFill>
+                    <a:schemeClr val="bg2"/>
+                  </a:solidFill>
+                  <a:effectLst/>
+                  <a:latin typeface="Microsoft Sans Serif" pitchFamily="34" charset="0"/>
+                </a:endParaRPr>
+              </a:p>
+            </p:txBody>
+          </p:sp>
+          <p:sp>
+            <p:nvSpPr>
+              <p:cNvPr id="409" name="Oval 408"/>
+              <p:cNvSpPr/>
+              <p:nvPr/>
+            </p:nvSpPr>
+            <p:spPr bwMode="auto">
+              <a:xfrm>
+                <a:off x="5517524" y="1588921"/>
+                <a:ext cx="205507" cy="198184"/>
+              </a:xfrm>
+              <a:prstGeom prst="ellipse">
+                <a:avLst/>
+              </a:prstGeom>
+              <a:solidFill>
+                <a:srgbClr val="008000"/>
+              </a:solidFill>
+              <a:ln w="9525" cap="flat" cmpd="sng" algn="ctr">
+                <a:solidFill>
+                  <a:srgbClr val="000000"/>
+                </a:solidFill>
+                <a:prstDash val="solid"/>
+                <a:round/>
+                <a:headEnd type="none" w="med" len="med"/>
+                <a:tailEnd type="none" w="med" len="med"/>
+              </a:ln>
+              <a:effectLst/>
+            </p:spPr>
+            <p:txBody>
+              <a:bodyPr vert="horz" wrap="square" lIns="91440" tIns="45720" rIns="91440" bIns="45720" numCol="1" rtlCol="0" anchor="t" anchorCtr="0" compatLnSpc="1">
+                <a:prstTxWarp prst="textNoShape">
+                  <a:avLst/>
+                </a:prstTxWarp>
+              </a:bodyPr>
+              <a:lstStyle/>
+              <a:p>
+                <a:pPr marL="0" marR="0" indent="0" algn="l" defTabSz="914400" rtl="0" eaLnBrk="1" fontAlgn="base" latinLnBrk="0" hangingPunct="1">
+                  <a:lnSpc>
+                    <a:spcPct val="100000"/>
+                  </a:lnSpc>
+                  <a:spcBef>
+                    <a:spcPct val="0"/>
+                  </a:spcBef>
+                  <a:spcAft>
+                    <a:spcPct val="0"/>
+                  </a:spcAft>
+                  <a:buClrTx/>
+                  <a:buSzTx/>
+                  <a:buFontTx/>
+                  <a:buNone/>
+                  <a:tabLst/>
+                </a:pPr>
+                <a:endParaRPr kumimoji="0" lang="en-GB" sz="1000" b="1" i="0" u="none" strike="noStrike" cap="none" normalizeH="0" baseline="0" smtClean="0">
+                  <a:ln>
+                    <a:noFill/>
+                  </a:ln>
+                  <a:solidFill>
+                    <a:schemeClr val="bg2"/>
+                  </a:solidFill>
+                  <a:effectLst/>
+                  <a:latin typeface="Microsoft Sans Serif" pitchFamily="34" charset="0"/>
+                </a:endParaRPr>
+              </a:p>
+            </p:txBody>
+          </p:sp>
+        </p:grpSp>
+      </p:grpSp>
     </p:spTree>
     <p:extLst>
       <p:ext uri="{BB962C8B-B14F-4D97-AF65-F5344CB8AC3E}">

</xml_diff>

<commit_message>
Examples (ttc-2015-fuml-activity-diagrams, documentation): Updated presentation slides.
</commit_message>
<xml_diff>
--- a/documentation/figures/title.pptx
+++ b/documentation/figures/title.pptx
@@ -4953,22 +4953,22 @@
       </p:sp>
       <p:sp>
         <p:nvSpPr>
-          <p:cNvPr id="437" name="Rectangle 436"/>
+          <p:cNvPr id="334" name="Rectangle 333"/>
           <p:cNvSpPr/>
           <p:nvPr/>
         </p:nvSpPr>
         <p:spPr bwMode="auto">
           <a:xfrm>
-            <a:off x="403225" y="7362825"/>
-            <a:ext cx="6122119" cy="1838648"/>
+            <a:off x="403225" y="5924551"/>
+            <a:ext cx="6122119" cy="1438274"/>
           </a:xfrm>
           <a:prstGeom prst="rect">
             <a:avLst/>
           </a:prstGeom>
           <a:solidFill>
             <a:schemeClr val="bg2">
-              <a:lumMod val="60000"/>
-              <a:lumOff val="40000"/>
+              <a:lumMod val="20000"/>
+              <a:lumOff val="80000"/>
             </a:schemeClr>
           </a:solidFill>
           <a:ln w="9525" cap="flat" cmpd="sng" algn="ctr">
@@ -5013,487 +5013,6 @@
               </a:solidFill>
               <a:effectLst/>
               <a:latin typeface="Microsoft Sans Serif" pitchFamily="34" charset="0"/>
-            </a:endParaRPr>
-          </a:p>
-        </p:txBody>
-      </p:sp>
-      <p:sp>
-        <p:nvSpPr>
-          <p:cNvPr id="439" name="Rechteck 1"/>
-          <p:cNvSpPr/>
-          <p:nvPr/>
-        </p:nvSpPr>
-        <p:spPr bwMode="auto">
-          <a:xfrm>
-            <a:off x="3109969" y="7654925"/>
-            <a:ext cx="3227331" cy="933450"/>
-          </a:xfrm>
-          <a:prstGeom prst="rect">
-            <a:avLst/>
-          </a:prstGeom>
-          <a:solidFill>
-            <a:schemeClr val="bg1"/>
-          </a:solidFill>
-          <a:ln w="9525" cap="flat" cmpd="sng" algn="ctr">
-            <a:noFill/>
-            <a:prstDash val="solid"/>
-            <a:round/>
-            <a:headEnd type="none" w="med" len="med"/>
-            <a:tailEnd type="none" w="med" len="med"/>
-          </a:ln>
-          <a:effectLst/>
-        </p:spPr>
-        <p:txBody>
-          <a:bodyPr vert="horz" wrap="square" lIns="91440" tIns="45720" rIns="91440" bIns="45720" numCol="1" rtlCol="0" anchor="t" anchorCtr="0" compatLnSpc="1">
-            <a:prstTxWarp prst="textNoShape">
-              <a:avLst/>
-            </a:prstTxWarp>
-          </a:bodyPr>
-          <a:lstStyle/>
-          <a:p>
-            <a:pPr algn="r" defTabSz="914323"/>
-            <a:endParaRPr lang="de-DE" dirty="0" smtClean="0">
-              <a:solidFill>
-                <a:schemeClr val="tx1"/>
-              </a:solidFill>
-              <a:latin typeface="+mn-lt"/>
-              <a:cs typeface="Arial"/>
-            </a:endParaRPr>
-          </a:p>
-        </p:txBody>
-      </p:sp>
-      <p:sp>
-        <p:nvSpPr>
-          <p:cNvPr id="440" name="Rechteck 13"/>
-          <p:cNvSpPr/>
-          <p:nvPr/>
-        </p:nvSpPr>
-        <p:spPr bwMode="auto">
-          <a:xfrm>
-            <a:off x="603251" y="7578725"/>
-            <a:ext cx="3460750" cy="809625"/>
-          </a:xfrm>
-          <a:prstGeom prst="rect">
-            <a:avLst/>
-          </a:prstGeom>
-          <a:solidFill>
-            <a:schemeClr val="bg1"/>
-          </a:solidFill>
-          <a:ln w="9525" cap="flat" cmpd="sng" algn="ctr">
-            <a:noFill/>
-            <a:prstDash val="solid"/>
-            <a:round/>
-            <a:headEnd type="none" w="med" len="med"/>
-            <a:tailEnd type="none" w="med" len="med"/>
-          </a:ln>
-          <a:effectLst/>
-        </p:spPr>
-        <p:txBody>
-          <a:bodyPr vert="horz" wrap="square" lIns="91440" tIns="45720" rIns="91440" bIns="45720" numCol="1" rtlCol="0" anchor="t" anchorCtr="0" compatLnSpc="1">
-            <a:prstTxWarp prst="textNoShape">
-              <a:avLst/>
-            </a:prstTxWarp>
-          </a:bodyPr>
-          <a:lstStyle/>
-          <a:p>
-            <a:pPr defTabSz="914323"/>
-            <a:endParaRPr lang="de-DE" dirty="0">
-              <a:solidFill>
-                <a:schemeClr val="tx1"/>
-              </a:solidFill>
-              <a:latin typeface="+mn-lt"/>
-              <a:cs typeface="Arial"/>
-            </a:endParaRPr>
-          </a:p>
-        </p:txBody>
-      </p:sp>
-      <p:sp>
-        <p:nvSpPr>
-          <p:cNvPr id="441" name="Rechteck 16"/>
-          <p:cNvSpPr/>
-          <p:nvPr/>
-        </p:nvSpPr>
-        <p:spPr bwMode="auto">
-          <a:xfrm>
-            <a:off x="920750" y="8229239"/>
-            <a:ext cx="5028530" cy="778236"/>
-          </a:xfrm>
-          <a:prstGeom prst="rect">
-            <a:avLst/>
-          </a:prstGeom>
-          <a:solidFill>
-            <a:schemeClr val="bg1"/>
-          </a:solidFill>
-          <a:ln w="9525" cap="flat" cmpd="sng" algn="ctr">
-            <a:noFill/>
-            <a:prstDash val="solid"/>
-            <a:round/>
-            <a:headEnd type="none" w="med" len="med"/>
-            <a:tailEnd type="none" w="med" len="med"/>
-          </a:ln>
-          <a:effectLst/>
-        </p:spPr>
-        <p:txBody>
-          <a:bodyPr vert="horz" wrap="square" lIns="91440" tIns="45720" rIns="91440" bIns="45720" numCol="1" rtlCol="0" anchor="b" anchorCtr="0" compatLnSpc="1">
-            <a:prstTxWarp prst="textNoShape">
-              <a:avLst/>
-            </a:prstTxWarp>
-          </a:bodyPr>
-          <a:lstStyle/>
-          <a:p>
-            <a:pPr algn="ctr"/>
-            <a:endParaRPr lang="de-DE" dirty="0" smtClean="0">
-              <a:solidFill>
-                <a:schemeClr val="tx1"/>
-              </a:solidFill>
-              <a:latin typeface="+mn-lt"/>
-              <a:cs typeface="Arial"/>
-            </a:endParaRPr>
-          </a:p>
-        </p:txBody>
-      </p:sp>
-      <p:sp>
-        <p:nvSpPr>
-          <p:cNvPr id="334" name="Rectangle 333"/>
-          <p:cNvSpPr/>
-          <p:nvPr/>
-        </p:nvSpPr>
-        <p:spPr bwMode="auto">
-          <a:xfrm>
-            <a:off x="403225" y="5924551"/>
-            <a:ext cx="6122119" cy="1438274"/>
-          </a:xfrm>
-          <a:prstGeom prst="rect">
-            <a:avLst/>
-          </a:prstGeom>
-          <a:solidFill>
-            <a:schemeClr val="bg2">
-              <a:lumMod val="20000"/>
-              <a:lumOff val="80000"/>
-            </a:schemeClr>
-          </a:solidFill>
-          <a:ln w="9525" cap="flat" cmpd="sng" algn="ctr">
-            <a:noFill/>
-            <a:prstDash val="solid"/>
-            <a:round/>
-            <a:headEnd type="none" w="med" len="med"/>
-            <a:tailEnd type="none" w="med" len="med"/>
-          </a:ln>
-          <a:effectLst/>
-        </p:spPr>
-        <p:txBody>
-          <a:bodyPr vert="horz" wrap="square" lIns="91440" tIns="45720" rIns="91440" bIns="45720" numCol="1" rtlCol="0" anchor="t" anchorCtr="0" compatLnSpc="1">
-            <a:prstTxWarp prst="textNoShape">
-              <a:avLst/>
-            </a:prstTxWarp>
-          </a:bodyPr>
-          <a:lstStyle/>
-          <a:p>
-            <a:pPr marL="0" marR="0" indent="0" algn="l" defTabSz="914400" rtl="0" eaLnBrk="1" fontAlgn="base" latinLnBrk="0" hangingPunct="1">
-              <a:lnSpc>
-                <a:spcPct val="100000"/>
-              </a:lnSpc>
-              <a:spcBef>
-                <a:spcPct val="0"/>
-              </a:spcBef>
-              <a:spcAft>
-                <a:spcPct val="0"/>
-              </a:spcAft>
-              <a:buClrTx/>
-              <a:buSzTx/>
-              <a:buFontTx/>
-              <a:buNone/>
-              <a:tabLst/>
-            </a:pPr>
-            <a:endParaRPr kumimoji="0" lang="en-GB" sz="1000" b="1" i="0" u="none" strike="noStrike" cap="none" normalizeH="0" baseline="0" smtClean="0">
-              <a:ln>
-                <a:noFill/>
-              </a:ln>
-              <a:solidFill>
-                <a:schemeClr val="bg2"/>
-              </a:solidFill>
-              <a:effectLst/>
-              <a:latin typeface="Microsoft Sans Serif" pitchFamily="34" charset="0"/>
-            </a:endParaRPr>
-          </a:p>
-        </p:txBody>
-      </p:sp>
-      <p:sp>
-        <p:nvSpPr>
-          <p:cNvPr id="2" name="Rechteck 1"/>
-          <p:cNvSpPr/>
-          <p:nvPr/>
-        </p:nvSpPr>
-        <p:spPr bwMode="auto">
-          <a:xfrm>
-            <a:off x="2852936" y="7704633"/>
-            <a:ext cx="3423405" cy="792088"/>
-          </a:xfrm>
-          <a:prstGeom prst="rect">
-            <a:avLst/>
-          </a:prstGeom>
-          <a:solidFill>
-            <a:srgbClr val="660066"/>
-          </a:solidFill>
-          <a:ln w="9525" cap="flat" cmpd="sng" algn="ctr">
-            <a:noFill/>
-            <a:prstDash val="solid"/>
-            <a:round/>
-            <a:headEnd type="none" w="med" len="med"/>
-            <a:tailEnd type="none" w="med" len="med"/>
-          </a:ln>
-          <a:effectLst/>
-        </p:spPr>
-        <p:txBody>
-          <a:bodyPr vert="horz" wrap="square" lIns="91440" tIns="45720" rIns="91440" bIns="45720" numCol="1" rtlCol="0" anchor="t" anchorCtr="0" compatLnSpc="1">
-            <a:prstTxWarp prst="textNoShape">
-              <a:avLst/>
-            </a:prstTxWarp>
-          </a:bodyPr>
-          <a:lstStyle/>
-          <a:p>
-            <a:pPr algn="r" defTabSz="914323"/>
-            <a:r>
-              <a:rPr kumimoji="0" lang="de-DE" i="0" u="none" strike="noStrike" cap="none" normalizeH="0" baseline="0" dirty="0" err="1" smtClean="0">
-                <a:ln>
-                  <a:noFill/>
-                </a:ln>
-                <a:solidFill>
-                  <a:srgbClr val="FFFFFF"/>
-                </a:solidFill>
-                <a:effectLst/>
-                <a:latin typeface="+mn-lt"/>
-                <a:cs typeface="Arial"/>
-              </a:rPr>
-              <a:t>Efficient</a:t>
-            </a:r>
-            <a:r>
-              <a:rPr kumimoji="0" lang="de-DE" i="0" u="none" strike="noStrike" cap="none" normalizeH="0" baseline="0" dirty="0" smtClean="0">
-                <a:ln>
-                  <a:noFill/>
-                </a:ln>
-                <a:solidFill>
-                  <a:srgbClr val="FFFFFF"/>
-                </a:solidFill>
-                <a:effectLst/>
-                <a:latin typeface="+mn-lt"/>
-                <a:cs typeface="Arial"/>
-              </a:rPr>
-              <a:t> </a:t>
-            </a:r>
-            <a:r>
-              <a:rPr kumimoji="0" lang="de-DE" i="0" u="none" strike="noStrike" cap="none" normalizeH="0" baseline="0" dirty="0" err="1" smtClean="0">
-                <a:ln>
-                  <a:noFill/>
-                </a:ln>
-                <a:solidFill>
-                  <a:srgbClr val="FFFFFF"/>
-                </a:solidFill>
-                <a:effectLst/>
-                <a:latin typeface="+mn-lt"/>
-                <a:cs typeface="Arial"/>
-              </a:rPr>
-              <a:t>Rewriting</a:t>
-            </a:r>
-            <a:endParaRPr lang="de-DE" dirty="0" smtClean="0">
-              <a:solidFill>
-                <a:srgbClr val="FFFFFF"/>
-              </a:solidFill>
-              <a:latin typeface="+mn-lt"/>
-              <a:cs typeface="Arial"/>
-            </a:endParaRPr>
-          </a:p>
-        </p:txBody>
-      </p:sp>
-      <p:sp>
-        <p:nvSpPr>
-          <p:cNvPr id="14" name="Rechteck 13"/>
-          <p:cNvSpPr/>
-          <p:nvPr/>
-        </p:nvSpPr>
-        <p:spPr bwMode="auto">
-          <a:xfrm>
-            <a:off x="662159" y="7632624"/>
-            <a:ext cx="3344618" cy="700225"/>
-          </a:xfrm>
-          <a:prstGeom prst="rect">
-            <a:avLst/>
-          </a:prstGeom>
-          <a:solidFill>
-            <a:srgbClr val="008000"/>
-          </a:solidFill>
-          <a:ln w="9525" cap="flat" cmpd="sng" algn="ctr">
-            <a:noFill/>
-            <a:prstDash val="solid"/>
-            <a:round/>
-            <a:headEnd type="none" w="med" len="med"/>
-            <a:tailEnd type="none" w="med" len="med"/>
-          </a:ln>
-          <a:effectLst/>
-        </p:spPr>
-        <p:txBody>
-          <a:bodyPr vert="horz" wrap="square" lIns="91440" tIns="45720" rIns="91440" bIns="45720" numCol="1" rtlCol="0" anchor="t" anchorCtr="0" compatLnSpc="1">
-            <a:prstTxWarp prst="textNoShape">
-              <a:avLst/>
-            </a:prstTxWarp>
-          </a:bodyPr>
-          <a:lstStyle/>
-          <a:p>
-            <a:pPr defTabSz="914323"/>
-            <a:r>
-              <a:rPr kumimoji="0" lang="de-DE" i="0" u="none" strike="noStrike" cap="none" normalizeH="0" baseline="0" dirty="0" err="1" smtClean="0">
-                <a:ln>
-                  <a:noFill/>
-                </a:ln>
-                <a:solidFill>
-                  <a:schemeClr val="bg1"/>
-                </a:solidFill>
-                <a:effectLst/>
-                <a:latin typeface="+mn-lt"/>
-                <a:cs typeface="Arial"/>
-              </a:rPr>
-              <a:t>Efficient</a:t>
-            </a:r>
-            <a:r>
-              <a:rPr kumimoji="0" lang="de-DE" i="0" u="none" strike="noStrike" cap="none" normalizeH="0" baseline="0" dirty="0" smtClean="0">
-                <a:ln>
-                  <a:noFill/>
-                </a:ln>
-                <a:solidFill>
-                  <a:schemeClr val="bg1"/>
-                </a:solidFill>
-                <a:effectLst/>
-                <a:latin typeface="+mn-lt"/>
-                <a:cs typeface="Arial"/>
-              </a:rPr>
-              <a:t> </a:t>
-            </a:r>
-            <a:r>
-              <a:rPr kumimoji="0" lang="de-DE" i="0" u="none" strike="noStrike" cap="none" normalizeH="0" baseline="0" dirty="0" err="1" smtClean="0">
-                <a:ln>
-                  <a:noFill/>
-                </a:ln>
-                <a:solidFill>
-                  <a:schemeClr val="bg1"/>
-                </a:solidFill>
-                <a:effectLst/>
-                <a:latin typeface="+mn-lt"/>
-                <a:cs typeface="Arial"/>
-              </a:rPr>
-              <a:t>Analyses</a:t>
-            </a:r>
-            <a:endParaRPr lang="de-DE" dirty="0">
-              <a:solidFill>
-                <a:schemeClr val="bg1"/>
-              </a:solidFill>
-              <a:latin typeface="+mn-lt"/>
-              <a:cs typeface="Arial"/>
-            </a:endParaRPr>
-          </a:p>
-        </p:txBody>
-      </p:sp>
-      <p:sp>
-        <p:nvSpPr>
-          <p:cNvPr id="17" name="Rechteck 16"/>
-          <p:cNvSpPr/>
-          <p:nvPr/>
-        </p:nvSpPr>
-        <p:spPr bwMode="auto">
-          <a:xfrm>
-            <a:off x="980728" y="8158090"/>
-            <a:ext cx="3456385" cy="790547"/>
-          </a:xfrm>
-          <a:prstGeom prst="rect">
-            <a:avLst/>
-          </a:prstGeom>
-          <a:solidFill>
-            <a:srgbClr val="3366FF"/>
-          </a:solidFill>
-          <a:ln w="9525" cap="flat" cmpd="sng" algn="ctr">
-            <a:noFill/>
-            <a:prstDash val="solid"/>
-            <a:round/>
-            <a:headEnd type="none" w="med" len="med"/>
-            <a:tailEnd type="none" w="med" len="med"/>
-          </a:ln>
-          <a:effectLst/>
-        </p:spPr>
-        <p:txBody>
-          <a:bodyPr vert="horz" wrap="square" lIns="91440" tIns="45720" rIns="91440" bIns="45720" numCol="1" rtlCol="0" anchor="b" anchorCtr="0" compatLnSpc="1">
-            <a:prstTxWarp prst="textNoShape">
-              <a:avLst/>
-            </a:prstTxWarp>
-          </a:bodyPr>
-          <a:lstStyle/>
-          <a:p>
-            <a:r>
-              <a:rPr lang="de-DE" dirty="0" err="1" smtClean="0">
-                <a:solidFill>
-                  <a:srgbClr val="FFFFFF"/>
-                </a:solidFill>
-                <a:latin typeface="+mn-lt"/>
-                <a:cs typeface="Arial"/>
-              </a:rPr>
-              <a:t>Programmed</a:t>
-            </a:r>
-            <a:r>
-              <a:rPr lang="de-DE" dirty="0" smtClean="0">
-                <a:solidFill>
-                  <a:srgbClr val="FFFFFF"/>
-                </a:solidFill>
-                <a:latin typeface="+mn-lt"/>
-                <a:cs typeface="Arial"/>
-              </a:rPr>
-              <a:t> /</a:t>
-            </a:r>
-          </a:p>
-          <a:p>
-            <a:r>
-              <a:rPr lang="de-DE" dirty="0" smtClean="0">
-                <a:solidFill>
-                  <a:srgbClr val="FFFFFF"/>
-                </a:solidFill>
-                <a:latin typeface="+mn-lt"/>
-                <a:cs typeface="Arial"/>
-              </a:rPr>
-              <a:t>RAG </a:t>
-            </a:r>
-            <a:r>
-              <a:rPr lang="de-DE" dirty="0" err="1" smtClean="0">
-                <a:solidFill>
-                  <a:srgbClr val="FFFFFF"/>
-                </a:solidFill>
-                <a:latin typeface="+mn-lt"/>
-                <a:cs typeface="Arial"/>
-              </a:rPr>
-              <a:t>Controlled</a:t>
-            </a:r>
-            <a:r>
-              <a:rPr lang="de-DE" dirty="0" smtClean="0">
-                <a:solidFill>
-                  <a:srgbClr val="FFFFFF"/>
-                </a:solidFill>
-                <a:latin typeface="+mn-lt"/>
-                <a:cs typeface="Arial"/>
-              </a:rPr>
-              <a:t> </a:t>
-            </a:r>
-            <a:r>
-              <a:rPr lang="de-DE" dirty="0" err="1" smtClean="0">
-                <a:solidFill>
-                  <a:srgbClr val="FFFFFF"/>
-                </a:solidFill>
-                <a:latin typeface="+mn-lt"/>
-                <a:cs typeface="Arial"/>
-              </a:rPr>
-              <a:t>Rewriting</a:t>
-            </a:r>
-            <a:endParaRPr lang="de-DE" dirty="0" smtClean="0">
-              <a:solidFill>
-                <a:srgbClr val="FFFFFF"/>
-              </a:solidFill>
-              <a:latin typeface="+mn-lt"/>
-              <a:cs typeface="Arial"/>
             </a:endParaRPr>
           </a:p>
         </p:txBody>
@@ -22936,80 +22455,6 @@
       </p:grpSp>
       <p:sp>
         <p:nvSpPr>
-          <p:cNvPr id="434" name="Rectangle 433"/>
-          <p:cNvSpPr/>
-          <p:nvPr/>
-        </p:nvSpPr>
-        <p:spPr bwMode="auto">
-          <a:xfrm>
-            <a:off x="442764" y="7329264"/>
-            <a:ext cx="6048672" cy="144016"/>
-          </a:xfrm>
-          <a:prstGeom prst="rect">
-            <a:avLst/>
-          </a:prstGeom>
-          <a:pattFill prst="wdDnDiag">
-            <a:fgClr>
-              <a:schemeClr val="bg2">
-                <a:lumMod val="60000"/>
-                <a:lumOff val="40000"/>
-              </a:schemeClr>
-            </a:fgClr>
-            <a:bgClr>
-              <a:schemeClr val="bg2">
-                <a:lumMod val="20000"/>
-                <a:lumOff val="80000"/>
-              </a:schemeClr>
-            </a:bgClr>
-          </a:pattFill>
-          <a:ln w="9525" cap="flat" cmpd="sng" algn="ctr">
-            <a:noFill/>
-            <a:prstDash val="solid"/>
-            <a:round/>
-            <a:headEnd type="none" w="med" len="med"/>
-            <a:tailEnd type="none" w="med" len="med"/>
-          </a:ln>
-          <a:effectLst/>
-        </p:spPr>
-        <p:txBody>
-          <a:bodyPr vert="horz" wrap="square" lIns="91440" tIns="45720" rIns="91440" bIns="45720" numCol="1" rtlCol="0" anchor="t" anchorCtr="0" compatLnSpc="1">
-            <a:prstTxWarp prst="textNoShape">
-              <a:avLst/>
-            </a:prstTxWarp>
-          </a:bodyPr>
-          <a:lstStyle/>
-          <a:p>
-            <a:pPr marL="0" marR="0" indent="0" algn="l" defTabSz="914400" rtl="0" eaLnBrk="1" fontAlgn="base" latinLnBrk="0" hangingPunct="1">
-              <a:lnSpc>
-                <a:spcPct val="100000"/>
-              </a:lnSpc>
-              <a:spcBef>
-                <a:spcPct val="0"/>
-              </a:spcBef>
-              <a:spcAft>
-                <a:spcPct val="0"/>
-              </a:spcAft>
-              <a:buClrTx/>
-              <a:buSzTx/>
-              <a:buFontTx/>
-              <a:buNone/>
-              <a:tabLst/>
-            </a:pPr>
-            <a:endParaRPr kumimoji="0" lang="en-GB" sz="1000" b="1" i="0" u="none" strike="noStrike" cap="none" normalizeH="0" baseline="0" smtClean="0">
-              <a:ln>
-                <a:noFill/>
-              </a:ln>
-              <a:solidFill>
-                <a:schemeClr val="bg2"/>
-              </a:solidFill>
-              <a:effectLst/>
-              <a:latin typeface="Microsoft Sans Serif" pitchFamily="34" charset="0"/>
-            </a:endParaRPr>
-          </a:p>
-        </p:txBody>
-      </p:sp>
-      <p:sp>
-        <p:nvSpPr>
           <p:cNvPr id="435" name="Rectangle 434"/>
           <p:cNvSpPr/>
           <p:nvPr/>
@@ -23127,546 +22572,1116 @@
           </a:p>
         </p:txBody>
       </p:sp>
-      <p:sp>
-        <p:nvSpPr>
-          <p:cNvPr id="18" name="Rectangle 3" descr=" 5126"/>
-          <p:cNvSpPr txBox="1">
-            <a:spLocks noChangeArrowheads="1"/>
-          </p:cNvSpPr>
-          <p:nvPr/>
-        </p:nvSpPr>
-        <p:spPr bwMode="auto">
+      <p:grpSp>
+        <p:nvGrpSpPr>
+          <p:cNvPr id="5" name="Group 4"/>
+          <p:cNvGrpSpPr/>
+          <p:nvPr/>
+        </p:nvGrpSpPr>
+        <p:grpSpPr>
           <a:xfrm>
-            <a:off x="4211563" y="8547050"/>
-            <a:ext cx="1944216" cy="360040"/>
-          </a:xfrm>
-          <a:prstGeom prst="rect">
-            <a:avLst/>
-          </a:prstGeom>
-          <a:noFill/>
-          <a:ln>
-            <a:noFill/>
-          </a:ln>
-          <a:extLst>
-            <a:ext uri="{909E8E84-426E-40dd-AFC4-6F175D3DCCD1}">
-              <a14:hiddenFill xmlns:a14="http://schemas.microsoft.com/office/drawing/2010/main">
+            <a:off x="403225" y="7329264"/>
+            <a:ext cx="6122119" cy="1872209"/>
+            <a:chOff x="403225" y="7329264"/>
+            <a:chExt cx="6122119" cy="1872209"/>
+          </a:xfrm>
+        </p:grpSpPr>
+        <p:sp>
+          <p:nvSpPr>
+            <p:cNvPr id="437" name="Rectangle 436"/>
+            <p:cNvSpPr/>
+            <p:nvPr/>
+          </p:nvSpPr>
+          <p:spPr bwMode="auto">
+            <a:xfrm>
+              <a:off x="403225" y="7362825"/>
+              <a:ext cx="6122119" cy="1838648"/>
+            </a:xfrm>
+            <a:prstGeom prst="rect">
+              <a:avLst/>
+            </a:prstGeom>
+            <a:solidFill>
+              <a:schemeClr val="bg2">
+                <a:lumMod val="60000"/>
+                <a:lumOff val="40000"/>
+              </a:schemeClr>
+            </a:solidFill>
+            <a:ln w="9525" cap="flat" cmpd="sng" algn="ctr">
+              <a:noFill/>
+              <a:prstDash val="solid"/>
+              <a:round/>
+              <a:headEnd type="none" w="med" len="med"/>
+              <a:tailEnd type="none" w="med" len="med"/>
+            </a:ln>
+            <a:effectLst/>
+          </p:spPr>
+          <p:txBody>
+            <a:bodyPr vert="horz" wrap="square" lIns="91440" tIns="45720" rIns="91440" bIns="45720" numCol="1" rtlCol="0" anchor="t" anchorCtr="0" compatLnSpc="1">
+              <a:prstTxWarp prst="textNoShape">
+                <a:avLst/>
+              </a:prstTxWarp>
+            </a:bodyPr>
+            <a:lstStyle/>
+            <a:p>
+              <a:pPr marL="0" marR="0" indent="0" algn="l" defTabSz="914400" rtl="0" eaLnBrk="1" fontAlgn="base" latinLnBrk="0" hangingPunct="1">
+                <a:lnSpc>
+                  <a:spcPct val="100000"/>
+                </a:lnSpc>
+                <a:spcBef>
+                  <a:spcPct val="0"/>
+                </a:spcBef>
+                <a:spcAft>
+                  <a:spcPct val="0"/>
+                </a:spcAft>
+                <a:buClrTx/>
+                <a:buSzTx/>
+                <a:buFontTx/>
+                <a:buNone/>
+                <a:tabLst/>
+              </a:pPr>
+              <a:endParaRPr kumimoji="0" lang="en-GB" sz="1000" b="1" i="0" u="none" strike="noStrike" cap="none" normalizeH="0" baseline="0" smtClean="0">
+                <a:ln>
+                  <a:noFill/>
+                </a:ln>
+                <a:solidFill>
+                  <a:schemeClr val="bg2"/>
+                </a:solidFill>
+                <a:effectLst/>
+                <a:latin typeface="Microsoft Sans Serif" pitchFamily="34" charset="0"/>
+              </a:endParaRPr>
+            </a:p>
+          </p:txBody>
+        </p:sp>
+        <p:sp>
+          <p:nvSpPr>
+            <p:cNvPr id="439" name="Rechteck 1"/>
+            <p:cNvSpPr/>
+            <p:nvPr/>
+          </p:nvSpPr>
+          <p:spPr bwMode="auto">
+            <a:xfrm>
+              <a:off x="3109969" y="7654925"/>
+              <a:ext cx="3227331" cy="933450"/>
+            </a:xfrm>
+            <a:prstGeom prst="rect">
+              <a:avLst/>
+            </a:prstGeom>
+            <a:solidFill>
+              <a:schemeClr val="bg1"/>
+            </a:solidFill>
+            <a:ln w="9525" cap="flat" cmpd="sng" algn="ctr">
+              <a:noFill/>
+              <a:prstDash val="solid"/>
+              <a:round/>
+              <a:headEnd type="none" w="med" len="med"/>
+              <a:tailEnd type="none" w="med" len="med"/>
+            </a:ln>
+            <a:effectLst/>
+          </p:spPr>
+          <p:txBody>
+            <a:bodyPr vert="horz" wrap="square" lIns="91440" tIns="45720" rIns="91440" bIns="45720" numCol="1" rtlCol="0" anchor="t" anchorCtr="0" compatLnSpc="1">
+              <a:prstTxWarp prst="textNoShape">
+                <a:avLst/>
+              </a:prstTxWarp>
+            </a:bodyPr>
+            <a:lstStyle/>
+            <a:p>
+              <a:pPr algn="r" defTabSz="914323"/>
+              <a:endParaRPr lang="de-DE" dirty="0" smtClean="0">
+                <a:solidFill>
+                  <a:schemeClr val="tx1"/>
+                </a:solidFill>
+                <a:latin typeface="+mn-lt"/>
+                <a:cs typeface="Arial"/>
+              </a:endParaRPr>
+            </a:p>
+          </p:txBody>
+        </p:sp>
+        <p:sp>
+          <p:nvSpPr>
+            <p:cNvPr id="440" name="Rechteck 13"/>
+            <p:cNvSpPr/>
+            <p:nvPr/>
+          </p:nvSpPr>
+          <p:spPr bwMode="auto">
+            <a:xfrm>
+              <a:off x="603251" y="7578725"/>
+              <a:ext cx="3460750" cy="809625"/>
+            </a:xfrm>
+            <a:prstGeom prst="rect">
+              <a:avLst/>
+            </a:prstGeom>
+            <a:solidFill>
+              <a:schemeClr val="bg1"/>
+            </a:solidFill>
+            <a:ln w="9525" cap="flat" cmpd="sng" algn="ctr">
+              <a:noFill/>
+              <a:prstDash val="solid"/>
+              <a:round/>
+              <a:headEnd type="none" w="med" len="med"/>
+              <a:tailEnd type="none" w="med" len="med"/>
+            </a:ln>
+            <a:effectLst/>
+          </p:spPr>
+          <p:txBody>
+            <a:bodyPr vert="horz" wrap="square" lIns="91440" tIns="45720" rIns="91440" bIns="45720" numCol="1" rtlCol="0" anchor="t" anchorCtr="0" compatLnSpc="1">
+              <a:prstTxWarp prst="textNoShape">
+                <a:avLst/>
+              </a:prstTxWarp>
+            </a:bodyPr>
+            <a:lstStyle/>
+            <a:p>
+              <a:pPr defTabSz="914323"/>
+              <a:endParaRPr lang="de-DE" dirty="0">
+                <a:solidFill>
+                  <a:schemeClr val="tx1"/>
+                </a:solidFill>
+                <a:latin typeface="+mn-lt"/>
+                <a:cs typeface="Arial"/>
+              </a:endParaRPr>
+            </a:p>
+          </p:txBody>
+        </p:sp>
+        <p:sp>
+          <p:nvSpPr>
+            <p:cNvPr id="441" name="Rechteck 16"/>
+            <p:cNvSpPr/>
+            <p:nvPr/>
+          </p:nvSpPr>
+          <p:spPr bwMode="auto">
+            <a:xfrm>
+              <a:off x="920750" y="8229239"/>
+              <a:ext cx="5028530" cy="778236"/>
+            </a:xfrm>
+            <a:prstGeom prst="rect">
+              <a:avLst/>
+            </a:prstGeom>
+            <a:solidFill>
+              <a:schemeClr val="bg1"/>
+            </a:solidFill>
+            <a:ln w="9525" cap="flat" cmpd="sng" algn="ctr">
+              <a:noFill/>
+              <a:prstDash val="solid"/>
+              <a:round/>
+              <a:headEnd type="none" w="med" len="med"/>
+              <a:tailEnd type="none" w="med" len="med"/>
+            </a:ln>
+            <a:effectLst/>
+          </p:spPr>
+          <p:txBody>
+            <a:bodyPr vert="horz" wrap="square" lIns="91440" tIns="45720" rIns="91440" bIns="45720" numCol="1" rtlCol="0" anchor="b" anchorCtr="0" compatLnSpc="1">
+              <a:prstTxWarp prst="textNoShape">
+                <a:avLst/>
+              </a:prstTxWarp>
+            </a:bodyPr>
+            <a:lstStyle/>
+            <a:p>
+              <a:pPr algn="ctr"/>
+              <a:endParaRPr lang="de-DE" dirty="0" smtClean="0">
+                <a:solidFill>
+                  <a:schemeClr val="tx1"/>
+                </a:solidFill>
+                <a:latin typeface="+mn-lt"/>
+                <a:cs typeface="Arial"/>
+              </a:endParaRPr>
+            </a:p>
+          </p:txBody>
+        </p:sp>
+        <p:sp>
+          <p:nvSpPr>
+            <p:cNvPr id="2" name="Rechteck 1"/>
+            <p:cNvSpPr/>
+            <p:nvPr/>
+          </p:nvSpPr>
+          <p:spPr bwMode="auto">
+            <a:xfrm>
+              <a:off x="2852936" y="7704633"/>
+              <a:ext cx="3423405" cy="792088"/>
+            </a:xfrm>
+            <a:prstGeom prst="rect">
+              <a:avLst/>
+            </a:prstGeom>
+            <a:solidFill>
+              <a:srgbClr val="660066"/>
+            </a:solidFill>
+            <a:ln w="9525" cap="flat" cmpd="sng" algn="ctr">
+              <a:noFill/>
+              <a:prstDash val="solid"/>
+              <a:round/>
+              <a:headEnd type="none" w="med" len="med"/>
+              <a:tailEnd type="none" w="med" len="med"/>
+            </a:ln>
+            <a:effectLst/>
+          </p:spPr>
+          <p:txBody>
+            <a:bodyPr vert="horz" wrap="square" lIns="91440" tIns="45720" rIns="91440" bIns="45720" numCol="1" rtlCol="0" anchor="t" anchorCtr="0" compatLnSpc="1">
+              <a:prstTxWarp prst="textNoShape">
+                <a:avLst/>
+              </a:prstTxWarp>
+            </a:bodyPr>
+            <a:lstStyle/>
+            <a:p>
+              <a:pPr algn="r" defTabSz="914323"/>
+              <a:r>
+                <a:rPr kumimoji="0" lang="de-DE" i="0" u="none" strike="noStrike" cap="none" normalizeH="0" baseline="0" dirty="0" err="1" smtClean="0">
+                  <a:ln>
+                    <a:noFill/>
+                  </a:ln>
+                  <a:solidFill>
+                    <a:srgbClr val="FFFFFF"/>
+                  </a:solidFill>
+                  <a:effectLst/>
+                  <a:latin typeface="+mn-lt"/>
+                  <a:cs typeface="Arial"/>
+                </a:rPr>
+                <a:t>Efficient</a:t>
+              </a:r>
+              <a:r>
+                <a:rPr kumimoji="0" lang="de-DE" i="0" u="none" strike="noStrike" cap="none" normalizeH="0" baseline="0" dirty="0" smtClean="0">
+                  <a:ln>
+                    <a:noFill/>
+                  </a:ln>
+                  <a:solidFill>
+                    <a:srgbClr val="FFFFFF"/>
+                  </a:solidFill>
+                  <a:effectLst/>
+                  <a:latin typeface="+mn-lt"/>
+                  <a:cs typeface="Arial"/>
+                </a:rPr>
+                <a:t> </a:t>
+              </a:r>
+              <a:r>
+                <a:rPr kumimoji="0" lang="de-DE" i="0" u="none" strike="noStrike" cap="none" normalizeH="0" baseline="0" dirty="0" err="1" smtClean="0">
+                  <a:ln>
+                    <a:noFill/>
+                  </a:ln>
+                  <a:solidFill>
+                    <a:srgbClr val="FFFFFF"/>
+                  </a:solidFill>
+                  <a:effectLst/>
+                  <a:latin typeface="+mn-lt"/>
+                  <a:cs typeface="Arial"/>
+                </a:rPr>
+                <a:t>Rewriting</a:t>
+              </a:r>
+              <a:endParaRPr lang="de-DE" dirty="0" smtClean="0">
                 <a:solidFill>
                   <a:srgbClr val="FFFFFF"/>
                 </a:solidFill>
-              </a14:hiddenFill>
-            </a:ext>
-            <a:ext uri="{91240B29-F687-4f45-9708-019B960494DF}">
-              <a14:hiddenLine xmlns:a14="http://schemas.microsoft.com/office/drawing/2010/main" w="9525">
+                <a:latin typeface="+mn-lt"/>
+                <a:cs typeface="Arial"/>
+              </a:endParaRPr>
+            </a:p>
+          </p:txBody>
+        </p:sp>
+        <p:sp>
+          <p:nvSpPr>
+            <p:cNvPr id="14" name="Rechteck 13"/>
+            <p:cNvSpPr/>
+            <p:nvPr/>
+          </p:nvSpPr>
+          <p:spPr bwMode="auto">
+            <a:xfrm>
+              <a:off x="662159" y="7632624"/>
+              <a:ext cx="3344618" cy="700225"/>
+            </a:xfrm>
+            <a:prstGeom prst="rect">
+              <a:avLst/>
+            </a:prstGeom>
+            <a:solidFill>
+              <a:srgbClr val="008000"/>
+            </a:solidFill>
+            <a:ln w="9525" cap="flat" cmpd="sng" algn="ctr">
+              <a:noFill/>
+              <a:prstDash val="solid"/>
+              <a:round/>
+              <a:headEnd type="none" w="med" len="med"/>
+              <a:tailEnd type="none" w="med" len="med"/>
+            </a:ln>
+            <a:effectLst/>
+          </p:spPr>
+          <p:txBody>
+            <a:bodyPr vert="horz" wrap="square" lIns="91440" tIns="45720" rIns="91440" bIns="45720" numCol="1" rtlCol="0" anchor="t" anchorCtr="0" compatLnSpc="1">
+              <a:prstTxWarp prst="textNoShape">
+                <a:avLst/>
+              </a:prstTxWarp>
+            </a:bodyPr>
+            <a:lstStyle/>
+            <a:p>
+              <a:pPr defTabSz="914323"/>
+              <a:r>
+                <a:rPr kumimoji="0" lang="de-DE" i="0" u="none" strike="noStrike" cap="none" normalizeH="0" baseline="0" dirty="0" err="1" smtClean="0">
+                  <a:ln>
+                    <a:noFill/>
+                  </a:ln>
+                  <a:solidFill>
+                    <a:schemeClr val="bg1"/>
+                  </a:solidFill>
+                  <a:effectLst/>
+                  <a:latin typeface="+mn-lt"/>
+                  <a:cs typeface="Arial"/>
+                </a:rPr>
+                <a:t>Efficient</a:t>
+              </a:r>
+              <a:r>
+                <a:rPr kumimoji="0" lang="de-DE" i="0" u="none" strike="noStrike" cap="none" normalizeH="0" baseline="0" dirty="0" smtClean="0">
+                  <a:ln>
+                    <a:noFill/>
+                  </a:ln>
+                  <a:solidFill>
+                    <a:schemeClr val="bg1"/>
+                  </a:solidFill>
+                  <a:effectLst/>
+                  <a:latin typeface="+mn-lt"/>
+                  <a:cs typeface="Arial"/>
+                </a:rPr>
+                <a:t> </a:t>
+              </a:r>
+              <a:r>
+                <a:rPr kumimoji="0" lang="de-DE" i="0" u="none" strike="noStrike" cap="none" normalizeH="0" baseline="0" dirty="0" err="1" smtClean="0">
+                  <a:ln>
+                    <a:noFill/>
+                  </a:ln>
+                  <a:solidFill>
+                    <a:schemeClr val="bg1"/>
+                  </a:solidFill>
+                  <a:effectLst/>
+                  <a:latin typeface="+mn-lt"/>
+                  <a:cs typeface="Arial"/>
+                </a:rPr>
+                <a:t>Analyses</a:t>
+              </a:r>
+              <a:endParaRPr lang="de-DE" dirty="0">
                 <a:solidFill>
-                  <a:srgbClr val="000000"/>
-                </a:solidFill>
-                <a:miter lim="800000"/>
-                <a:headEnd/>
-                <a:tailEnd/>
-              </a14:hiddenLine>
-            </a:ext>
-            <a:ext uri="{FAA26D3D-D897-4be2-8F04-BA451C77F1D7}">
-              <ma14:placeholderFlag xmlns:ma14="http://schemas.microsoft.com/office/mac/drawingml/2011/main" val="1"/>
-            </a:ext>
-          </a:extLst>
-        </p:spPr>
-        <p:txBody>
-          <a:bodyPr vert="horz" wrap="square" lIns="0" tIns="0" rIns="0" bIns="0" numCol="1" anchor="t" anchorCtr="0" compatLnSpc="1">
-            <a:prstTxWarp prst="textNoShape">
-              <a:avLst/>
-            </a:prstTxWarp>
-          </a:bodyPr>
-          <a:lstStyle>
-            <a:lvl1pPr marL="342900" indent="-342900" algn="l" rtl="0" eaLnBrk="0" fontAlgn="base" hangingPunct="0">
-              <a:spcBef>
-                <a:spcPct val="20000"/>
-              </a:spcBef>
-              <a:spcAft>
-                <a:spcPct val="0"/>
-              </a:spcAft>
-              <a:defRPr sz="1400">
-                <a:solidFill>
-                  <a:srgbClr val="001D4B"/>
+                  <a:schemeClr val="bg1"/>
                 </a:solidFill>
                 <a:latin typeface="+mn-lt"/>
-                <a:ea typeface="ＭＳ Ｐゴシック" charset="0"/>
-                <a:cs typeface="ＭＳ Ｐゴシック" charset="0"/>
-              </a:defRPr>
-            </a:lvl1pPr>
-            <a:lvl2pPr marL="742950" indent="-285750" algn="l" rtl="0" eaLnBrk="0" fontAlgn="base" hangingPunct="0">
-              <a:spcBef>
-                <a:spcPct val="20000"/>
-              </a:spcBef>
-              <a:spcAft>
-                <a:spcPct val="0"/>
-              </a:spcAft>
-              <a:defRPr sz="1400">
+                <a:cs typeface="Arial"/>
+              </a:endParaRPr>
+            </a:p>
+          </p:txBody>
+        </p:sp>
+        <p:sp>
+          <p:nvSpPr>
+            <p:cNvPr id="17" name="Rechteck 16"/>
+            <p:cNvSpPr/>
+            <p:nvPr/>
+          </p:nvSpPr>
+          <p:spPr bwMode="auto">
+            <a:xfrm>
+              <a:off x="980728" y="8158090"/>
+              <a:ext cx="3456385" cy="790547"/>
+            </a:xfrm>
+            <a:prstGeom prst="rect">
+              <a:avLst/>
+            </a:prstGeom>
+            <a:solidFill>
+              <a:srgbClr val="0000FF"/>
+            </a:solidFill>
+            <a:ln w="9525" cap="flat" cmpd="sng" algn="ctr">
+              <a:noFill/>
+              <a:prstDash val="solid"/>
+              <a:round/>
+              <a:headEnd type="none" w="med" len="med"/>
+              <a:tailEnd type="none" w="med" len="med"/>
+            </a:ln>
+            <a:effectLst/>
+          </p:spPr>
+          <p:txBody>
+            <a:bodyPr vert="horz" wrap="square" lIns="91440" tIns="45720" rIns="91440" bIns="45720" numCol="1" rtlCol="0" anchor="b" anchorCtr="0" compatLnSpc="1">
+              <a:prstTxWarp prst="textNoShape">
+                <a:avLst/>
+              </a:prstTxWarp>
+            </a:bodyPr>
+            <a:lstStyle/>
+            <a:p>
+              <a:r>
+                <a:rPr lang="de-DE" dirty="0" err="1" smtClean="0">
+                  <a:solidFill>
+                    <a:srgbClr val="FFFFFF"/>
+                  </a:solidFill>
+                  <a:latin typeface="+mn-lt"/>
+                  <a:cs typeface="Arial"/>
+                </a:rPr>
+                <a:t>Programmed</a:t>
+              </a:r>
+              <a:r>
+                <a:rPr lang="de-DE" dirty="0" smtClean="0">
+                  <a:solidFill>
+                    <a:srgbClr val="FFFFFF"/>
+                  </a:solidFill>
+                  <a:latin typeface="+mn-lt"/>
+                  <a:cs typeface="Arial"/>
+                </a:rPr>
+                <a:t> /</a:t>
+              </a:r>
+            </a:p>
+            <a:p>
+              <a:r>
+                <a:rPr lang="de-DE" dirty="0" smtClean="0">
+                  <a:solidFill>
+                    <a:srgbClr val="FFFFFF"/>
+                  </a:solidFill>
+                  <a:latin typeface="+mn-lt"/>
+                  <a:cs typeface="Arial"/>
+                </a:rPr>
+                <a:t>RAG </a:t>
+              </a:r>
+              <a:r>
+                <a:rPr lang="de-DE" dirty="0" err="1" smtClean="0">
+                  <a:solidFill>
+                    <a:srgbClr val="FFFFFF"/>
+                  </a:solidFill>
+                  <a:latin typeface="+mn-lt"/>
+                  <a:cs typeface="Arial"/>
+                </a:rPr>
+                <a:t>Controlled</a:t>
+              </a:r>
+              <a:r>
+                <a:rPr lang="de-DE" dirty="0" smtClean="0">
+                  <a:solidFill>
+                    <a:srgbClr val="FFFFFF"/>
+                  </a:solidFill>
+                  <a:latin typeface="+mn-lt"/>
+                  <a:cs typeface="Arial"/>
+                </a:rPr>
+                <a:t> </a:t>
+              </a:r>
+              <a:r>
+                <a:rPr lang="de-DE" dirty="0" err="1" smtClean="0">
+                  <a:solidFill>
+                    <a:srgbClr val="FFFFFF"/>
+                  </a:solidFill>
+                  <a:latin typeface="+mn-lt"/>
+                  <a:cs typeface="Arial"/>
+                </a:rPr>
+                <a:t>Rewriting</a:t>
+              </a:r>
+              <a:endParaRPr lang="de-DE" dirty="0" smtClean="0">
                 <a:solidFill>
-                  <a:srgbClr val="001D4B"/>
+                  <a:srgbClr val="FFFFFF"/>
                 </a:solidFill>
                 <a:latin typeface="+mn-lt"/>
-                <a:ea typeface="ＭＳ Ｐゴシック" charset="0"/>
-              </a:defRPr>
-            </a:lvl2pPr>
-            <a:lvl3pPr marL="1143000" indent="-228600" algn="l" rtl="0" eaLnBrk="0" fontAlgn="base" hangingPunct="0">
-              <a:spcBef>
-                <a:spcPct val="20000"/>
-              </a:spcBef>
-              <a:spcAft>
-                <a:spcPct val="0"/>
-              </a:spcAft>
-              <a:defRPr sz="1400">
+                <a:cs typeface="Arial"/>
+              </a:endParaRPr>
+            </a:p>
+          </p:txBody>
+        </p:sp>
+        <p:sp>
+          <p:nvSpPr>
+            <p:cNvPr id="434" name="Rectangle 433"/>
+            <p:cNvSpPr/>
+            <p:nvPr/>
+          </p:nvSpPr>
+          <p:spPr bwMode="auto">
+            <a:xfrm>
+              <a:off x="442764" y="7329264"/>
+              <a:ext cx="6048672" cy="144016"/>
+            </a:xfrm>
+            <a:prstGeom prst="rect">
+              <a:avLst/>
+            </a:prstGeom>
+            <a:pattFill prst="wdDnDiag">
+              <a:fgClr>
+                <a:schemeClr val="bg2">
+                  <a:lumMod val="60000"/>
+                  <a:lumOff val="40000"/>
+                </a:schemeClr>
+              </a:fgClr>
+              <a:bgClr>
+                <a:schemeClr val="bg2">
+                  <a:lumMod val="20000"/>
+                  <a:lumOff val="80000"/>
+                </a:schemeClr>
+              </a:bgClr>
+            </a:pattFill>
+            <a:ln w="9525" cap="flat" cmpd="sng" algn="ctr">
+              <a:noFill/>
+              <a:prstDash val="solid"/>
+              <a:round/>
+              <a:headEnd type="none" w="med" len="med"/>
+              <a:tailEnd type="none" w="med" len="med"/>
+            </a:ln>
+            <a:effectLst/>
+          </p:spPr>
+          <p:txBody>
+            <a:bodyPr vert="horz" wrap="square" lIns="91440" tIns="45720" rIns="91440" bIns="45720" numCol="1" rtlCol="0" anchor="t" anchorCtr="0" compatLnSpc="1">
+              <a:prstTxWarp prst="textNoShape">
+                <a:avLst/>
+              </a:prstTxWarp>
+            </a:bodyPr>
+            <a:lstStyle/>
+            <a:p>
+              <a:pPr marL="0" marR="0" indent="0" algn="l" defTabSz="914400" rtl="0" eaLnBrk="1" fontAlgn="base" latinLnBrk="0" hangingPunct="1">
+                <a:lnSpc>
+                  <a:spcPct val="100000"/>
+                </a:lnSpc>
+                <a:spcBef>
+                  <a:spcPct val="0"/>
+                </a:spcBef>
+                <a:spcAft>
+                  <a:spcPct val="0"/>
+                </a:spcAft>
+                <a:buClrTx/>
+                <a:buSzTx/>
+                <a:buFontTx/>
+                <a:buNone/>
+                <a:tabLst/>
+              </a:pPr>
+              <a:endParaRPr kumimoji="0" lang="en-GB" sz="1000" b="1" i="0" u="none" strike="noStrike" cap="none" normalizeH="0" baseline="0" smtClean="0">
+                <a:ln>
+                  <a:noFill/>
+                </a:ln>
                 <a:solidFill>
-                  <a:srgbClr val="001D4B"/>
+                  <a:schemeClr val="bg2"/>
                 </a:solidFill>
-                <a:latin typeface="+mn-lt"/>
-                <a:ea typeface="ＭＳ Ｐゴシック" charset="0"/>
-              </a:defRPr>
-            </a:lvl3pPr>
-            <a:lvl4pPr marL="1600200" indent="-228600" algn="l" rtl="0" eaLnBrk="0" fontAlgn="base" hangingPunct="0">
-              <a:spcBef>
-                <a:spcPct val="20000"/>
-              </a:spcBef>
-              <a:spcAft>
-                <a:spcPct val="0"/>
-              </a:spcAft>
-              <a:defRPr sz="1400">
+                <a:effectLst/>
+                <a:latin typeface="Microsoft Sans Serif" pitchFamily="34" charset="0"/>
+              </a:endParaRPr>
+            </a:p>
+          </p:txBody>
+        </p:sp>
+        <p:sp>
+          <p:nvSpPr>
+            <p:cNvPr id="18" name="Rectangle 3" descr=" 5126"/>
+            <p:cNvSpPr txBox="1">
+              <a:spLocks noChangeArrowheads="1"/>
+            </p:cNvSpPr>
+            <p:nvPr/>
+          </p:nvSpPr>
+          <p:spPr bwMode="auto">
+            <a:xfrm>
+              <a:off x="4211563" y="8547050"/>
+              <a:ext cx="1944216" cy="360040"/>
+            </a:xfrm>
+            <a:prstGeom prst="rect">
+              <a:avLst/>
+            </a:prstGeom>
+            <a:noFill/>
+            <a:ln>
+              <a:noFill/>
+            </a:ln>
+            <a:extLst>
+              <a:ext uri="{909E8E84-426E-40dd-AFC4-6F175D3DCCD1}">
+                <a14:hiddenFill xmlns:a14="http://schemas.microsoft.com/office/drawing/2010/main">
+                  <a:solidFill>
+                    <a:srgbClr val="FFFFFF"/>
+                  </a:solidFill>
+                </a14:hiddenFill>
+              </a:ext>
+              <a:ext uri="{91240B29-F687-4f45-9708-019B960494DF}">
+                <a14:hiddenLine xmlns:a14="http://schemas.microsoft.com/office/drawing/2010/main" w="9525">
+                  <a:solidFill>
+                    <a:srgbClr val="000000"/>
+                  </a:solidFill>
+                  <a:miter lim="800000"/>
+                  <a:headEnd/>
+                  <a:tailEnd/>
+                </a14:hiddenLine>
+              </a:ext>
+              <a:ext uri="{FAA26D3D-D897-4be2-8F04-BA451C77F1D7}">
+                <ma14:placeholderFlag xmlns:ma14="http://schemas.microsoft.com/office/mac/drawingml/2011/main" val="1"/>
+              </a:ext>
+            </a:extLst>
+          </p:spPr>
+          <p:txBody>
+            <a:bodyPr vert="horz" wrap="square" lIns="0" tIns="0" rIns="0" bIns="0" numCol="1" anchor="t" anchorCtr="0" compatLnSpc="1">
+              <a:prstTxWarp prst="textNoShape">
+                <a:avLst/>
+              </a:prstTxWarp>
+            </a:bodyPr>
+            <a:lstStyle>
+              <a:lvl1pPr marL="342900" indent="-342900" algn="l" rtl="0" eaLnBrk="0" fontAlgn="base" hangingPunct="0">
+                <a:spcBef>
+                  <a:spcPct val="20000"/>
+                </a:spcBef>
+                <a:spcAft>
+                  <a:spcPct val="0"/>
+                </a:spcAft>
+                <a:defRPr sz="1400">
+                  <a:solidFill>
+                    <a:srgbClr val="001D4B"/>
+                  </a:solidFill>
+                  <a:latin typeface="+mn-lt"/>
+                  <a:ea typeface="ＭＳ Ｐゴシック" charset="0"/>
+                  <a:cs typeface="ＭＳ Ｐゴシック" charset="0"/>
+                </a:defRPr>
+              </a:lvl1pPr>
+              <a:lvl2pPr marL="742950" indent="-285750" algn="l" rtl="0" eaLnBrk="0" fontAlgn="base" hangingPunct="0">
+                <a:spcBef>
+                  <a:spcPct val="20000"/>
+                </a:spcBef>
+                <a:spcAft>
+                  <a:spcPct val="0"/>
+                </a:spcAft>
+                <a:defRPr sz="1400">
+                  <a:solidFill>
+                    <a:srgbClr val="001D4B"/>
+                  </a:solidFill>
+                  <a:latin typeface="+mn-lt"/>
+                  <a:ea typeface="ＭＳ Ｐゴシック" charset="0"/>
+                </a:defRPr>
+              </a:lvl2pPr>
+              <a:lvl3pPr marL="1143000" indent="-228600" algn="l" rtl="0" eaLnBrk="0" fontAlgn="base" hangingPunct="0">
+                <a:spcBef>
+                  <a:spcPct val="20000"/>
+                </a:spcBef>
+                <a:spcAft>
+                  <a:spcPct val="0"/>
+                </a:spcAft>
+                <a:defRPr sz="1400">
+                  <a:solidFill>
+                    <a:srgbClr val="001D4B"/>
+                  </a:solidFill>
+                  <a:latin typeface="+mn-lt"/>
+                  <a:ea typeface="ＭＳ Ｐゴシック" charset="0"/>
+                </a:defRPr>
+              </a:lvl3pPr>
+              <a:lvl4pPr marL="1600200" indent="-228600" algn="l" rtl="0" eaLnBrk="0" fontAlgn="base" hangingPunct="0">
+                <a:spcBef>
+                  <a:spcPct val="20000"/>
+                </a:spcBef>
+                <a:spcAft>
+                  <a:spcPct val="0"/>
+                </a:spcAft>
+                <a:defRPr sz="1400">
+                  <a:solidFill>
+                    <a:srgbClr val="001D4B"/>
+                  </a:solidFill>
+                  <a:latin typeface="+mn-lt"/>
+                  <a:ea typeface="ＭＳ Ｐゴシック" charset="0"/>
+                </a:defRPr>
+              </a:lvl4pPr>
+              <a:lvl5pPr marL="2057400" indent="-228600" algn="l" rtl="0" eaLnBrk="0" fontAlgn="base" hangingPunct="0">
+                <a:spcBef>
+                  <a:spcPct val="20000"/>
+                </a:spcBef>
+                <a:spcAft>
+                  <a:spcPct val="0"/>
+                </a:spcAft>
+                <a:defRPr sz="1400">
+                  <a:solidFill>
+                    <a:srgbClr val="001D4B"/>
+                  </a:solidFill>
+                  <a:latin typeface="+mn-lt"/>
+                  <a:ea typeface="ＭＳ Ｐゴシック" charset="0"/>
+                </a:defRPr>
+              </a:lvl5pPr>
+              <a:lvl6pPr marL="2514600" indent="-228600" algn="l" rtl="0" fontAlgn="base">
+                <a:spcBef>
+                  <a:spcPct val="20000"/>
+                </a:spcBef>
+                <a:spcAft>
+                  <a:spcPct val="0"/>
+                </a:spcAft>
+                <a:defRPr sz="1400">
+                  <a:solidFill>
+                    <a:srgbClr val="001D4B"/>
+                  </a:solidFill>
+                  <a:latin typeface="+mn-lt"/>
+                </a:defRPr>
+              </a:lvl6pPr>
+              <a:lvl7pPr marL="2971800" indent="-228600" algn="l" rtl="0" fontAlgn="base">
+                <a:spcBef>
+                  <a:spcPct val="20000"/>
+                </a:spcBef>
+                <a:spcAft>
+                  <a:spcPct val="0"/>
+                </a:spcAft>
+                <a:defRPr sz="1400">
+                  <a:solidFill>
+                    <a:srgbClr val="001D4B"/>
+                  </a:solidFill>
+                  <a:latin typeface="+mn-lt"/>
+                </a:defRPr>
+              </a:lvl7pPr>
+              <a:lvl8pPr marL="3429000" indent="-228600" algn="l" rtl="0" fontAlgn="base">
+                <a:spcBef>
+                  <a:spcPct val="20000"/>
+                </a:spcBef>
+                <a:spcAft>
+                  <a:spcPct val="0"/>
+                </a:spcAft>
+                <a:defRPr sz="1400">
+                  <a:solidFill>
+                    <a:srgbClr val="001D4B"/>
+                  </a:solidFill>
+                  <a:latin typeface="+mn-lt"/>
+                </a:defRPr>
+              </a:lvl8pPr>
+              <a:lvl9pPr marL="3886200" indent="-228600" algn="l" rtl="0" fontAlgn="base">
+                <a:spcBef>
+                  <a:spcPct val="20000"/>
+                </a:spcBef>
+                <a:spcAft>
+                  <a:spcPct val="0"/>
+                </a:spcAft>
+                <a:defRPr sz="1400">
+                  <a:solidFill>
+                    <a:srgbClr val="001D4B"/>
+                  </a:solidFill>
+                  <a:latin typeface="+mn-lt"/>
+                </a:defRPr>
+              </a:lvl9pPr>
+            </a:lstStyle>
+            <a:p>
+              <a:pPr algn="ctr" eaLnBrk="1" hangingPunct="1">
+                <a:defRPr/>
+              </a:pPr>
+              <a:r>
+                <a:rPr lang="en-US" sz="2800" b="1" i="1" dirty="0" smtClean="0">
+                  <a:solidFill>
+                    <a:schemeClr val="tx1"/>
+                  </a:solidFill>
+                  <a:ea typeface="+mn-ea"/>
+                  <a:cs typeface="+mn-cs"/>
+                </a:rPr>
+                <a:t>RACR</a:t>
+              </a:r>
+            </a:p>
+          </p:txBody>
+        </p:sp>
+        <p:sp>
+          <p:nvSpPr>
+            <p:cNvPr id="3" name="Rectangle 2"/>
+            <p:cNvSpPr/>
+            <p:nvPr/>
+          </p:nvSpPr>
+          <p:spPr bwMode="auto">
+            <a:xfrm>
+              <a:off x="980728" y="8049344"/>
+              <a:ext cx="2232248" cy="288032"/>
+            </a:xfrm>
+            <a:prstGeom prst="rect">
+              <a:avLst/>
+            </a:prstGeom>
+            <a:pattFill prst="dkVert">
+              <a:fgClr>
+                <a:srgbClr val="008000"/>
+              </a:fgClr>
+              <a:bgClr>
+                <a:srgbClr val="0000FF"/>
+              </a:bgClr>
+            </a:pattFill>
+            <a:ln w="9525" cap="flat" cmpd="sng" algn="ctr">
+              <a:noFill/>
+              <a:prstDash val="solid"/>
+              <a:round/>
+              <a:headEnd type="none" w="med" len="med"/>
+              <a:tailEnd type="none" w="med" len="med"/>
+            </a:ln>
+            <a:effectLst/>
+          </p:spPr>
+          <p:txBody>
+            <a:bodyPr vert="horz" wrap="square" lIns="91440" tIns="45720" rIns="91440" bIns="45720" numCol="1" rtlCol="0" anchor="t" anchorCtr="0" compatLnSpc="1">
+              <a:prstTxWarp prst="textNoShape">
+                <a:avLst/>
+              </a:prstTxWarp>
+            </a:bodyPr>
+            <a:lstStyle/>
+            <a:p>
+              <a:pPr marL="0" marR="0" indent="0" algn="l" defTabSz="914400" rtl="0" eaLnBrk="1" fontAlgn="base" latinLnBrk="0" hangingPunct="1">
+                <a:lnSpc>
+                  <a:spcPct val="100000"/>
+                </a:lnSpc>
+                <a:spcBef>
+                  <a:spcPct val="0"/>
+                </a:spcBef>
+                <a:spcAft>
+                  <a:spcPct val="0"/>
+                </a:spcAft>
+                <a:buClrTx/>
+                <a:buSzTx/>
+                <a:buFontTx/>
+                <a:buNone/>
+                <a:tabLst/>
+              </a:pPr>
+              <a:endParaRPr kumimoji="0" lang="en-GB" sz="1000" b="1" i="0" u="none" strike="noStrike" cap="none" normalizeH="0" baseline="0" smtClean="0">
+                <a:ln>
+                  <a:noFill/>
+                </a:ln>
                 <a:solidFill>
-                  <a:srgbClr val="001D4B"/>
+                  <a:schemeClr val="bg2"/>
                 </a:solidFill>
-                <a:latin typeface="+mn-lt"/>
-                <a:ea typeface="ＭＳ Ｐゴシック" charset="0"/>
-              </a:defRPr>
-            </a:lvl4pPr>
-            <a:lvl5pPr marL="2057400" indent="-228600" algn="l" rtl="0" eaLnBrk="0" fontAlgn="base" hangingPunct="0">
-              <a:spcBef>
-                <a:spcPct val="20000"/>
-              </a:spcBef>
-              <a:spcAft>
-                <a:spcPct val="0"/>
-              </a:spcAft>
-              <a:defRPr sz="1400">
+                <a:effectLst/>
+                <a:latin typeface="Microsoft Sans Serif" pitchFamily="34" charset="0"/>
+              </a:endParaRPr>
+            </a:p>
+          </p:txBody>
+        </p:sp>
+        <p:sp>
+          <p:nvSpPr>
+            <p:cNvPr id="466" name="Rectangle 465"/>
+            <p:cNvSpPr/>
+            <p:nvPr/>
+          </p:nvSpPr>
+          <p:spPr bwMode="auto">
+            <a:xfrm>
+              <a:off x="3212976" y="7705725"/>
+              <a:ext cx="792088" cy="343619"/>
+            </a:xfrm>
+            <a:prstGeom prst="rect">
+              <a:avLst/>
+            </a:prstGeom>
+            <a:pattFill prst="dkHorz">
+              <a:fgClr>
+                <a:srgbClr val="008000"/>
+              </a:fgClr>
+              <a:bgClr>
+                <a:srgbClr val="660066"/>
+              </a:bgClr>
+            </a:pattFill>
+            <a:ln w="9525" cap="flat" cmpd="sng" algn="ctr">
+              <a:noFill/>
+              <a:prstDash val="solid"/>
+              <a:round/>
+              <a:headEnd type="none" w="med" len="med"/>
+              <a:tailEnd type="none" w="med" len="med"/>
+            </a:ln>
+            <a:effectLst/>
+          </p:spPr>
+          <p:txBody>
+            <a:bodyPr vert="horz" wrap="square" lIns="91440" tIns="45720" rIns="91440" bIns="45720" numCol="1" rtlCol="0" anchor="t" anchorCtr="0" compatLnSpc="1">
+              <a:prstTxWarp prst="textNoShape">
+                <a:avLst/>
+              </a:prstTxWarp>
+            </a:bodyPr>
+            <a:lstStyle/>
+            <a:p>
+              <a:pPr marL="0" marR="0" indent="0" algn="l" defTabSz="914400" rtl="0" eaLnBrk="1" fontAlgn="base" latinLnBrk="0" hangingPunct="1">
+                <a:lnSpc>
+                  <a:spcPct val="100000"/>
+                </a:lnSpc>
+                <a:spcBef>
+                  <a:spcPct val="0"/>
+                </a:spcBef>
+                <a:spcAft>
+                  <a:spcPct val="0"/>
+                </a:spcAft>
+                <a:buClrTx/>
+                <a:buSzTx/>
+                <a:buFontTx/>
+                <a:buNone/>
+                <a:tabLst/>
+              </a:pPr>
+              <a:endParaRPr kumimoji="0" lang="en-GB" sz="1000" b="1" i="0" u="none" strike="noStrike" cap="none" normalizeH="0" baseline="0" smtClean="0">
+                <a:ln>
+                  <a:noFill/>
+                </a:ln>
                 <a:solidFill>
-                  <a:srgbClr val="001D4B"/>
+                  <a:schemeClr val="bg2"/>
                 </a:solidFill>
-                <a:latin typeface="+mn-lt"/>
-                <a:ea typeface="ＭＳ Ｐゴシック" charset="0"/>
-              </a:defRPr>
-            </a:lvl5pPr>
-            <a:lvl6pPr marL="2514600" indent="-228600" algn="l" rtl="0" fontAlgn="base">
-              <a:spcBef>
-                <a:spcPct val="20000"/>
-              </a:spcBef>
-              <a:spcAft>
-                <a:spcPct val="0"/>
-              </a:spcAft>
-              <a:defRPr sz="1400">
+                <a:effectLst/>
+                <a:latin typeface="Microsoft Sans Serif" pitchFamily="34" charset="0"/>
+              </a:endParaRPr>
+            </a:p>
+          </p:txBody>
+        </p:sp>
+        <p:sp>
+          <p:nvSpPr>
+            <p:cNvPr id="476" name="Rectangle 475"/>
+            <p:cNvSpPr/>
+            <p:nvPr/>
+          </p:nvSpPr>
+          <p:spPr bwMode="auto">
+            <a:xfrm>
+              <a:off x="4005064" y="8049344"/>
+              <a:ext cx="432048" cy="432048"/>
+            </a:xfrm>
+            <a:prstGeom prst="rect">
+              <a:avLst/>
+            </a:prstGeom>
+            <a:pattFill prst="wdUpDiag">
+              <a:fgClr>
+                <a:srgbClr val="0000FF"/>
+              </a:fgClr>
+              <a:bgClr>
+                <a:srgbClr val="660066"/>
+              </a:bgClr>
+            </a:pattFill>
+            <a:ln w="9525" cap="flat" cmpd="sng" algn="ctr">
+              <a:noFill/>
+              <a:prstDash val="solid"/>
+              <a:round/>
+              <a:headEnd type="none" w="med" len="med"/>
+              <a:tailEnd type="none" w="med" len="med"/>
+            </a:ln>
+            <a:effectLst/>
+          </p:spPr>
+          <p:txBody>
+            <a:bodyPr vert="horz" wrap="square" lIns="91440" tIns="45720" rIns="91440" bIns="45720" numCol="1" rtlCol="0" anchor="t" anchorCtr="0" compatLnSpc="1">
+              <a:prstTxWarp prst="textNoShape">
+                <a:avLst/>
+              </a:prstTxWarp>
+            </a:bodyPr>
+            <a:lstStyle/>
+            <a:p>
+              <a:pPr marL="0" marR="0" indent="0" algn="l" defTabSz="914400" rtl="0" eaLnBrk="1" fontAlgn="base" latinLnBrk="0" hangingPunct="1">
+                <a:lnSpc>
+                  <a:spcPct val="100000"/>
+                </a:lnSpc>
+                <a:spcBef>
+                  <a:spcPct val="0"/>
+                </a:spcBef>
+                <a:spcAft>
+                  <a:spcPct val="0"/>
+                </a:spcAft>
+                <a:buClrTx/>
+                <a:buSzTx/>
+                <a:buFontTx/>
+                <a:buNone/>
+                <a:tabLst/>
+              </a:pPr>
+              <a:endParaRPr kumimoji="0" lang="en-GB" sz="1000" b="1" i="0" u="none" strike="noStrike" cap="none" normalizeH="0" baseline="0" smtClean="0">
+                <a:ln>
+                  <a:noFill/>
+                </a:ln>
                 <a:solidFill>
-                  <a:srgbClr val="001D4B"/>
+                  <a:schemeClr val="bg2"/>
                 </a:solidFill>
-                <a:latin typeface="+mn-lt"/>
-              </a:defRPr>
-            </a:lvl6pPr>
-            <a:lvl7pPr marL="2971800" indent="-228600" algn="l" rtl="0" fontAlgn="base">
-              <a:spcBef>
-                <a:spcPct val="20000"/>
-              </a:spcBef>
-              <a:spcAft>
-                <a:spcPct val="0"/>
-              </a:spcAft>
-              <a:defRPr sz="1400">
+                <a:effectLst/>
+                <a:latin typeface="Microsoft Sans Serif" pitchFamily="34" charset="0"/>
+              </a:endParaRPr>
+            </a:p>
+          </p:txBody>
+        </p:sp>
+        <p:sp>
+          <p:nvSpPr>
+            <p:cNvPr id="491" name="Rectangle 490"/>
+            <p:cNvSpPr/>
+            <p:nvPr/>
+          </p:nvSpPr>
+          <p:spPr bwMode="auto">
+            <a:xfrm>
+              <a:off x="3212976" y="8049345"/>
+              <a:ext cx="792088" cy="288032"/>
+            </a:xfrm>
+            <a:prstGeom prst="rect">
+              <a:avLst/>
+            </a:prstGeom>
+            <a:pattFill prst="smCheck">
+              <a:fgClr>
+                <a:srgbClr val="0000FF"/>
+              </a:fgClr>
+              <a:bgClr>
+                <a:srgbClr val="660066"/>
+              </a:bgClr>
+            </a:pattFill>
+            <a:ln w="9525" cap="flat" cmpd="sng" algn="ctr">
+              <a:noFill/>
+              <a:prstDash val="solid"/>
+              <a:round/>
+              <a:headEnd type="none" w="med" len="med"/>
+              <a:tailEnd type="none" w="med" len="med"/>
+            </a:ln>
+            <a:effectLst/>
+          </p:spPr>
+          <p:txBody>
+            <a:bodyPr vert="horz" wrap="square" lIns="91440" tIns="45720" rIns="91440" bIns="45720" numCol="1" rtlCol="0" anchor="t" anchorCtr="0" compatLnSpc="1">
+              <a:prstTxWarp prst="textNoShape">
+                <a:avLst/>
+              </a:prstTxWarp>
+            </a:bodyPr>
+            <a:lstStyle/>
+            <a:p>
+              <a:pPr marL="0" marR="0" indent="0" algn="l" defTabSz="914400" rtl="0" eaLnBrk="1" fontAlgn="base" latinLnBrk="0" hangingPunct="1">
+                <a:lnSpc>
+                  <a:spcPct val="100000"/>
+                </a:lnSpc>
+                <a:spcBef>
+                  <a:spcPct val="0"/>
+                </a:spcBef>
+                <a:spcAft>
+                  <a:spcPct val="0"/>
+                </a:spcAft>
+                <a:buClrTx/>
+                <a:buSzTx/>
+                <a:buFontTx/>
+                <a:buNone/>
+                <a:tabLst/>
+              </a:pPr>
+              <a:endParaRPr kumimoji="0" lang="en-GB" sz="1000" b="1" i="0" u="none" strike="noStrike" cap="none" normalizeH="0" baseline="0" smtClean="0">
+                <a:ln>
+                  <a:noFill/>
+                </a:ln>
                 <a:solidFill>
-                  <a:srgbClr val="001D4B"/>
+                  <a:schemeClr val="bg2"/>
                 </a:solidFill>
-                <a:latin typeface="+mn-lt"/>
-              </a:defRPr>
-            </a:lvl7pPr>
-            <a:lvl8pPr marL="3429000" indent="-228600" algn="l" rtl="0" fontAlgn="base">
-              <a:spcBef>
-                <a:spcPct val="20000"/>
-              </a:spcBef>
-              <a:spcAft>
-                <a:spcPct val="0"/>
-              </a:spcAft>
-              <a:defRPr sz="1400">
+                <a:effectLst/>
+                <a:latin typeface="Microsoft Sans Serif" pitchFamily="34" charset="0"/>
+              </a:endParaRPr>
+            </a:p>
+          </p:txBody>
+        </p:sp>
+        <p:sp>
+          <p:nvSpPr>
+            <p:cNvPr id="492" name="Rectangle 491"/>
+            <p:cNvSpPr/>
+            <p:nvPr/>
+          </p:nvSpPr>
+          <p:spPr bwMode="auto">
+            <a:xfrm>
+              <a:off x="3212976" y="8337376"/>
+              <a:ext cx="792088" cy="144016"/>
+            </a:xfrm>
+            <a:prstGeom prst="rect">
+              <a:avLst/>
+            </a:prstGeom>
+            <a:pattFill prst="wdUpDiag">
+              <a:fgClr>
+                <a:srgbClr val="0000FF"/>
+              </a:fgClr>
+              <a:bgClr>
+                <a:srgbClr val="660066"/>
+              </a:bgClr>
+            </a:pattFill>
+            <a:ln w="9525" cap="flat" cmpd="sng" algn="ctr">
+              <a:noFill/>
+              <a:prstDash val="solid"/>
+              <a:round/>
+              <a:headEnd type="none" w="med" len="med"/>
+              <a:tailEnd type="none" w="med" len="med"/>
+            </a:ln>
+            <a:effectLst/>
+          </p:spPr>
+          <p:txBody>
+            <a:bodyPr vert="horz" wrap="square" lIns="91440" tIns="45720" rIns="91440" bIns="45720" numCol="1" rtlCol="0" anchor="t" anchorCtr="0" compatLnSpc="1">
+              <a:prstTxWarp prst="textNoShape">
+                <a:avLst/>
+              </a:prstTxWarp>
+            </a:bodyPr>
+            <a:lstStyle/>
+            <a:p>
+              <a:pPr marL="0" marR="0" indent="0" algn="l" defTabSz="914400" rtl="0" eaLnBrk="1" fontAlgn="base" latinLnBrk="0" hangingPunct="1">
+                <a:lnSpc>
+                  <a:spcPct val="100000"/>
+                </a:lnSpc>
+                <a:spcBef>
+                  <a:spcPct val="0"/>
+                </a:spcBef>
+                <a:spcAft>
+                  <a:spcPct val="0"/>
+                </a:spcAft>
+                <a:buClrTx/>
+                <a:buSzTx/>
+                <a:buFontTx/>
+                <a:buNone/>
+                <a:tabLst/>
+              </a:pPr>
+              <a:endParaRPr kumimoji="0" lang="en-GB" sz="1000" b="1" i="0" u="none" strike="noStrike" cap="none" normalizeH="0" baseline="0" smtClean="0">
+                <a:ln>
+                  <a:noFill/>
+                </a:ln>
                 <a:solidFill>
-                  <a:srgbClr val="001D4B"/>
+                  <a:schemeClr val="bg2"/>
                 </a:solidFill>
-                <a:latin typeface="+mn-lt"/>
-              </a:defRPr>
-            </a:lvl8pPr>
-            <a:lvl9pPr marL="3886200" indent="-228600" algn="l" rtl="0" fontAlgn="base">
-              <a:spcBef>
-                <a:spcPct val="20000"/>
-              </a:spcBef>
-              <a:spcAft>
-                <a:spcPct val="0"/>
-              </a:spcAft>
-              <a:defRPr sz="1400">
-                <a:solidFill>
-                  <a:srgbClr val="001D4B"/>
-                </a:solidFill>
-                <a:latin typeface="+mn-lt"/>
-              </a:defRPr>
-            </a:lvl9pPr>
-          </a:lstStyle>
-          <a:p>
-            <a:pPr algn="ctr" eaLnBrk="1" hangingPunct="1">
-              <a:defRPr/>
-            </a:pPr>
-            <a:r>
-              <a:rPr lang="en-US" sz="2800" b="1" i="1" dirty="0" smtClean="0">
-                <a:solidFill>
-                  <a:schemeClr val="tx1"/>
-                </a:solidFill>
-                <a:ea typeface="+mn-ea"/>
-                <a:cs typeface="+mn-cs"/>
-              </a:rPr>
-              <a:t>RACR</a:t>
-            </a:r>
-          </a:p>
-        </p:txBody>
-      </p:sp>
-      <p:sp>
-        <p:nvSpPr>
-          <p:cNvPr id="3" name="Rectangle 2"/>
-          <p:cNvSpPr/>
-          <p:nvPr/>
-        </p:nvSpPr>
-        <p:spPr bwMode="auto">
-          <a:xfrm>
-            <a:off x="980728" y="8049344"/>
-            <a:ext cx="2232248" cy="288032"/>
-          </a:xfrm>
-          <a:prstGeom prst="rect">
-            <a:avLst/>
-          </a:prstGeom>
-          <a:pattFill prst="dkVert">
-            <a:fgClr>
-              <a:srgbClr val="008000"/>
-            </a:fgClr>
-            <a:bgClr>
-              <a:srgbClr val="3366FF"/>
-            </a:bgClr>
-          </a:pattFill>
-          <a:ln w="9525" cap="flat" cmpd="sng" algn="ctr">
-            <a:noFill/>
-            <a:prstDash val="solid"/>
-            <a:round/>
-            <a:headEnd type="none" w="med" len="med"/>
-            <a:tailEnd type="none" w="med" len="med"/>
-          </a:ln>
-          <a:effectLst/>
-        </p:spPr>
-        <p:txBody>
-          <a:bodyPr vert="horz" wrap="square" lIns="91440" tIns="45720" rIns="91440" bIns="45720" numCol="1" rtlCol="0" anchor="t" anchorCtr="0" compatLnSpc="1">
-            <a:prstTxWarp prst="textNoShape">
-              <a:avLst/>
-            </a:prstTxWarp>
-          </a:bodyPr>
-          <a:lstStyle/>
-          <a:p>
-            <a:pPr marL="0" marR="0" indent="0" algn="l" defTabSz="914400" rtl="0" eaLnBrk="1" fontAlgn="base" latinLnBrk="0" hangingPunct="1">
-              <a:lnSpc>
-                <a:spcPct val="100000"/>
-              </a:lnSpc>
-              <a:spcBef>
-                <a:spcPct val="0"/>
-              </a:spcBef>
-              <a:spcAft>
-                <a:spcPct val="0"/>
-              </a:spcAft>
-              <a:buClrTx/>
-              <a:buSzTx/>
-              <a:buFontTx/>
-              <a:buNone/>
-              <a:tabLst/>
-            </a:pPr>
-            <a:endParaRPr kumimoji="0" lang="en-GB" sz="1000" b="1" i="0" u="none" strike="noStrike" cap="none" normalizeH="0" baseline="0" smtClean="0">
-              <a:ln>
-                <a:noFill/>
-              </a:ln>
-              <a:solidFill>
-                <a:schemeClr val="bg2"/>
-              </a:solidFill>
-              <a:effectLst/>
-              <a:latin typeface="Microsoft Sans Serif" pitchFamily="34" charset="0"/>
-            </a:endParaRPr>
-          </a:p>
-        </p:txBody>
-      </p:sp>
-      <p:sp>
-        <p:nvSpPr>
-          <p:cNvPr id="466" name="Rectangle 465"/>
-          <p:cNvSpPr/>
-          <p:nvPr/>
-        </p:nvSpPr>
-        <p:spPr bwMode="auto">
-          <a:xfrm>
-            <a:off x="3212976" y="7705725"/>
-            <a:ext cx="792088" cy="343619"/>
-          </a:xfrm>
-          <a:prstGeom prst="rect">
-            <a:avLst/>
-          </a:prstGeom>
-          <a:pattFill prst="dkHorz">
-            <a:fgClr>
-              <a:srgbClr val="008000"/>
-            </a:fgClr>
-            <a:bgClr>
-              <a:srgbClr val="660066"/>
-            </a:bgClr>
-          </a:pattFill>
-          <a:ln w="9525" cap="flat" cmpd="sng" algn="ctr">
-            <a:noFill/>
-            <a:prstDash val="solid"/>
-            <a:round/>
-            <a:headEnd type="none" w="med" len="med"/>
-            <a:tailEnd type="none" w="med" len="med"/>
-          </a:ln>
-          <a:effectLst/>
-        </p:spPr>
-        <p:txBody>
-          <a:bodyPr vert="horz" wrap="square" lIns="91440" tIns="45720" rIns="91440" bIns="45720" numCol="1" rtlCol="0" anchor="t" anchorCtr="0" compatLnSpc="1">
-            <a:prstTxWarp prst="textNoShape">
-              <a:avLst/>
-            </a:prstTxWarp>
-          </a:bodyPr>
-          <a:lstStyle/>
-          <a:p>
-            <a:pPr marL="0" marR="0" indent="0" algn="l" defTabSz="914400" rtl="0" eaLnBrk="1" fontAlgn="base" latinLnBrk="0" hangingPunct="1">
-              <a:lnSpc>
-                <a:spcPct val="100000"/>
-              </a:lnSpc>
-              <a:spcBef>
-                <a:spcPct val="0"/>
-              </a:spcBef>
-              <a:spcAft>
-                <a:spcPct val="0"/>
-              </a:spcAft>
-              <a:buClrTx/>
-              <a:buSzTx/>
-              <a:buFontTx/>
-              <a:buNone/>
-              <a:tabLst/>
-            </a:pPr>
-            <a:endParaRPr kumimoji="0" lang="en-GB" sz="1000" b="1" i="0" u="none" strike="noStrike" cap="none" normalizeH="0" baseline="0" smtClean="0">
-              <a:ln>
-                <a:noFill/>
-              </a:ln>
-              <a:solidFill>
-                <a:schemeClr val="bg2"/>
-              </a:solidFill>
-              <a:effectLst/>
-              <a:latin typeface="Microsoft Sans Serif" pitchFamily="34" charset="0"/>
-            </a:endParaRPr>
-          </a:p>
-        </p:txBody>
-      </p:sp>
-      <p:sp>
-        <p:nvSpPr>
-          <p:cNvPr id="476" name="Rectangle 475"/>
-          <p:cNvSpPr/>
-          <p:nvPr/>
-        </p:nvSpPr>
-        <p:spPr bwMode="auto">
-          <a:xfrm>
-            <a:off x="4005064" y="8049344"/>
-            <a:ext cx="432048" cy="432048"/>
-          </a:xfrm>
-          <a:prstGeom prst="rect">
-            <a:avLst/>
-          </a:prstGeom>
-          <a:pattFill prst="wdUpDiag">
-            <a:fgClr>
-              <a:srgbClr val="3366FF"/>
-            </a:fgClr>
-            <a:bgClr>
-              <a:srgbClr val="660066"/>
-            </a:bgClr>
-          </a:pattFill>
-          <a:ln w="9525" cap="flat" cmpd="sng" algn="ctr">
-            <a:noFill/>
-            <a:prstDash val="solid"/>
-            <a:round/>
-            <a:headEnd type="none" w="med" len="med"/>
-            <a:tailEnd type="none" w="med" len="med"/>
-          </a:ln>
-          <a:effectLst/>
-        </p:spPr>
-        <p:txBody>
-          <a:bodyPr vert="horz" wrap="square" lIns="91440" tIns="45720" rIns="91440" bIns="45720" numCol="1" rtlCol="0" anchor="t" anchorCtr="0" compatLnSpc="1">
-            <a:prstTxWarp prst="textNoShape">
-              <a:avLst/>
-            </a:prstTxWarp>
-          </a:bodyPr>
-          <a:lstStyle/>
-          <a:p>
-            <a:pPr marL="0" marR="0" indent="0" algn="l" defTabSz="914400" rtl="0" eaLnBrk="1" fontAlgn="base" latinLnBrk="0" hangingPunct="1">
-              <a:lnSpc>
-                <a:spcPct val="100000"/>
-              </a:lnSpc>
-              <a:spcBef>
-                <a:spcPct val="0"/>
-              </a:spcBef>
-              <a:spcAft>
-                <a:spcPct val="0"/>
-              </a:spcAft>
-              <a:buClrTx/>
-              <a:buSzTx/>
-              <a:buFontTx/>
-              <a:buNone/>
-              <a:tabLst/>
-            </a:pPr>
-            <a:endParaRPr kumimoji="0" lang="en-GB" sz="1000" b="1" i="0" u="none" strike="noStrike" cap="none" normalizeH="0" baseline="0" smtClean="0">
-              <a:ln>
-                <a:noFill/>
-              </a:ln>
-              <a:solidFill>
-                <a:schemeClr val="bg2"/>
-              </a:solidFill>
-              <a:effectLst/>
-              <a:latin typeface="Microsoft Sans Serif" pitchFamily="34" charset="0"/>
-            </a:endParaRPr>
-          </a:p>
-        </p:txBody>
-      </p:sp>
-      <p:sp>
-        <p:nvSpPr>
-          <p:cNvPr id="491" name="Rectangle 490"/>
-          <p:cNvSpPr/>
-          <p:nvPr/>
-        </p:nvSpPr>
-        <p:spPr bwMode="auto">
-          <a:xfrm>
-            <a:off x="3212976" y="8049345"/>
-            <a:ext cx="792088" cy="288032"/>
-          </a:xfrm>
-          <a:prstGeom prst="rect">
-            <a:avLst/>
-          </a:prstGeom>
-          <a:pattFill prst="smCheck">
-            <a:fgClr>
-              <a:srgbClr val="3366FF"/>
-            </a:fgClr>
-            <a:bgClr>
-              <a:srgbClr val="660066"/>
-            </a:bgClr>
-          </a:pattFill>
-          <a:ln w="9525" cap="flat" cmpd="sng" algn="ctr">
-            <a:noFill/>
-            <a:prstDash val="solid"/>
-            <a:round/>
-            <a:headEnd type="none" w="med" len="med"/>
-            <a:tailEnd type="none" w="med" len="med"/>
-          </a:ln>
-          <a:effectLst/>
-        </p:spPr>
-        <p:txBody>
-          <a:bodyPr vert="horz" wrap="square" lIns="91440" tIns="45720" rIns="91440" bIns="45720" numCol="1" rtlCol="0" anchor="t" anchorCtr="0" compatLnSpc="1">
-            <a:prstTxWarp prst="textNoShape">
-              <a:avLst/>
-            </a:prstTxWarp>
-          </a:bodyPr>
-          <a:lstStyle/>
-          <a:p>
-            <a:pPr marL="0" marR="0" indent="0" algn="l" defTabSz="914400" rtl="0" eaLnBrk="1" fontAlgn="base" latinLnBrk="0" hangingPunct="1">
-              <a:lnSpc>
-                <a:spcPct val="100000"/>
-              </a:lnSpc>
-              <a:spcBef>
-                <a:spcPct val="0"/>
-              </a:spcBef>
-              <a:spcAft>
-                <a:spcPct val="0"/>
-              </a:spcAft>
-              <a:buClrTx/>
-              <a:buSzTx/>
-              <a:buFontTx/>
-              <a:buNone/>
-              <a:tabLst/>
-            </a:pPr>
-            <a:endParaRPr kumimoji="0" lang="en-GB" sz="1000" b="1" i="0" u="none" strike="noStrike" cap="none" normalizeH="0" baseline="0" smtClean="0">
-              <a:ln>
-                <a:noFill/>
-              </a:ln>
-              <a:solidFill>
-                <a:schemeClr val="bg2"/>
-              </a:solidFill>
-              <a:effectLst/>
-              <a:latin typeface="Microsoft Sans Serif" pitchFamily="34" charset="0"/>
-            </a:endParaRPr>
-          </a:p>
-        </p:txBody>
-      </p:sp>
-      <p:sp>
-        <p:nvSpPr>
-          <p:cNvPr id="492" name="Rectangle 491"/>
-          <p:cNvSpPr/>
-          <p:nvPr/>
-        </p:nvSpPr>
-        <p:spPr bwMode="auto">
-          <a:xfrm>
-            <a:off x="3212976" y="8337376"/>
-            <a:ext cx="792088" cy="144016"/>
-          </a:xfrm>
-          <a:prstGeom prst="rect">
-            <a:avLst/>
-          </a:prstGeom>
-          <a:pattFill prst="wdUpDiag">
-            <a:fgClr>
-              <a:srgbClr val="3366FF"/>
-            </a:fgClr>
-            <a:bgClr>
-              <a:srgbClr val="660066"/>
-            </a:bgClr>
-          </a:pattFill>
-          <a:ln w="9525" cap="flat" cmpd="sng" algn="ctr">
-            <a:noFill/>
-            <a:prstDash val="solid"/>
-            <a:round/>
-            <a:headEnd type="none" w="med" len="med"/>
-            <a:tailEnd type="none" w="med" len="med"/>
-          </a:ln>
-          <a:effectLst/>
-        </p:spPr>
-        <p:txBody>
-          <a:bodyPr vert="horz" wrap="square" lIns="91440" tIns="45720" rIns="91440" bIns="45720" numCol="1" rtlCol="0" anchor="t" anchorCtr="0" compatLnSpc="1">
-            <a:prstTxWarp prst="textNoShape">
-              <a:avLst/>
-            </a:prstTxWarp>
-          </a:bodyPr>
-          <a:lstStyle/>
-          <a:p>
-            <a:pPr marL="0" marR="0" indent="0" algn="l" defTabSz="914400" rtl="0" eaLnBrk="1" fontAlgn="base" latinLnBrk="0" hangingPunct="1">
-              <a:lnSpc>
-                <a:spcPct val="100000"/>
-              </a:lnSpc>
-              <a:spcBef>
-                <a:spcPct val="0"/>
-              </a:spcBef>
-              <a:spcAft>
-                <a:spcPct val="0"/>
-              </a:spcAft>
-              <a:buClrTx/>
-              <a:buSzTx/>
-              <a:buFontTx/>
-              <a:buNone/>
-              <a:tabLst/>
-            </a:pPr>
-            <a:endParaRPr kumimoji="0" lang="en-GB" sz="1000" b="1" i="0" u="none" strike="noStrike" cap="none" normalizeH="0" baseline="0" smtClean="0">
-              <a:ln>
-                <a:noFill/>
-              </a:ln>
-              <a:solidFill>
-                <a:schemeClr val="bg2"/>
-              </a:solidFill>
-              <a:effectLst/>
-              <a:latin typeface="Microsoft Sans Serif" pitchFamily="34" charset="0"/>
-            </a:endParaRPr>
-          </a:p>
-        </p:txBody>
-      </p:sp>
+                <a:effectLst/>
+                <a:latin typeface="Microsoft Sans Serif" pitchFamily="34" charset="0"/>
+              </a:endParaRPr>
+            </a:p>
+          </p:txBody>
+        </p:sp>
+      </p:grpSp>
       <p:sp>
         <p:nvSpPr>
           <p:cNvPr id="6" name="Donut 5"/>

</xml_diff>